<commit_message>
Clear recap slides for week 2
</commit_message>
<xml_diff>
--- a/2015/week2__recap_and_warmup_slides.pptx
+++ b/2015/week2__recap_and_warmup_slides.pptx
@@ -6113,7 +6113,7 @@
           <a:graphicData uri="http://schemas.openxmlformats.org/presentationml/2006/ole">
             <mc:AlternateContent xmlns:mc="http://schemas.openxmlformats.org/markup-compatibility/2006">
               <mc:Choice xmlns:v="urn:schemas-microsoft-com:vml" Requires="v">
-                <p:oleObj spid="_x0000_s1915" r:id="rId15" imgW="1038370" imgH="980952" progId="">
+                <p:oleObj spid="_x0000_s1916" r:id="rId15" imgW="1038370" imgH="980952" progId="">
                   <p:embed/>
                 </p:oleObj>
               </mc:Choice>
@@ -7107,13 +7107,13 @@
           <a:p>
             <a:pPr algn="l"/>
             <a:r>
-              <a:rPr lang="en-US" sz="2400" b="1" dirty="0" smtClean="0">
+              <a:rPr lang="en-US" sz="2400" b="1" smtClean="0">
                 <a:solidFill>
                   <a:schemeClr val="bg1"/>
                 </a:solidFill>
                 <a:latin typeface="Segoe UI" panose="020B0502040204020203" pitchFamily="34" charset="0"/>
               </a:rPr>
-              <a:t>Die </a:t>
+              <a:t>Diese </a:t>
             </a:r>
             <a:r>
               <a:rPr lang="en-US" sz="2400" b="1" dirty="0" err="1" smtClean="0">
@@ -8211,544 +8211,6 @@
               <a:buFontTx/>
               <a:buChar char="-"/>
             </a:pPr>
-            <a:r>
-              <a:rPr lang="en-US" dirty="0" smtClean="0"/>
-              <a:t>Die VM-Images </a:t>
-            </a:r>
-            <a:r>
-              <a:rPr lang="en-US" dirty="0" err="1" smtClean="0"/>
-              <a:t>liegen</a:t>
-            </a:r>
-            <a:r>
-              <a:rPr lang="en-US" dirty="0" smtClean="0"/>
-              <a:t> auf </a:t>
-            </a:r>
-            <a:r>
-              <a:rPr lang="en-US" dirty="0" err="1" smtClean="0"/>
-              <a:t>dem</a:t>
-            </a:r>
-            <a:r>
-              <a:rPr lang="en-US" dirty="0" smtClean="0"/>
-              <a:t> </a:t>
-            </a:r>
-            <a:r>
-              <a:rPr lang="en-US" dirty="0" err="1" smtClean="0"/>
-              <a:t>jeweiligen</a:t>
-            </a:r>
-            <a:r>
-              <a:rPr lang="en-US" dirty="0" smtClean="0"/>
-              <a:t> Pool-PC und </a:t>
-            </a:r>
-            <a:r>
-              <a:rPr lang="en-US" dirty="0" err="1" smtClean="0"/>
-              <a:t>werden</a:t>
-            </a:r>
-            <a:r>
-              <a:rPr lang="en-US" dirty="0" smtClean="0"/>
-              <a:t> </a:t>
-            </a:r>
-            <a:r>
-              <a:rPr lang="en-US" b="1" dirty="0" err="1" smtClean="0"/>
-              <a:t>nicht</a:t>
-            </a:r>
-            <a:r>
-              <a:rPr lang="en-US" dirty="0"/>
-              <a:t> </a:t>
-            </a:r>
-            <a:r>
-              <a:rPr lang="en-US" dirty="0" err="1" smtClean="0"/>
-              <a:t>im</a:t>
-            </a:r>
-            <a:r>
-              <a:rPr lang="en-US" dirty="0" smtClean="0"/>
-              <a:t> </a:t>
-            </a:r>
-            <a:r>
-              <a:rPr lang="en-US" dirty="0" err="1" smtClean="0"/>
-              <a:t>Profil</a:t>
-            </a:r>
-            <a:r>
-              <a:rPr lang="en-US" dirty="0" smtClean="0"/>
-              <a:t> </a:t>
-            </a:r>
-            <a:r>
-              <a:rPr lang="en-US" dirty="0" err="1" smtClean="0"/>
-              <a:t>gespeichert</a:t>
-            </a:r>
-            <a:endParaRPr lang="en-US" dirty="0" smtClean="0"/>
-          </a:p>
-          <a:p>
-            <a:pPr marL="342900" indent="-342900">
-              <a:buFontTx/>
-              <a:buChar char="-"/>
-            </a:pPr>
-            <a:r>
-              <a:rPr lang="en-US" dirty="0" smtClean="0"/>
-              <a:t>C++-</a:t>
-            </a:r>
-            <a:r>
-              <a:rPr lang="en-US" dirty="0" err="1" smtClean="0"/>
-              <a:t>Fehler</a:t>
-            </a:r>
-            <a:r>
-              <a:rPr lang="en-US" dirty="0" smtClean="0"/>
-              <a:t> </a:t>
-            </a:r>
-            <a:r>
-              <a:rPr lang="en-US" dirty="0" err="1" smtClean="0"/>
-              <a:t>immer</a:t>
-            </a:r>
-            <a:r>
-              <a:rPr lang="en-US" dirty="0" smtClean="0"/>
-              <a:t> </a:t>
-            </a:r>
-            <a:r>
-              <a:rPr lang="en-US" b="1" dirty="0" smtClean="0"/>
-              <a:t>von </a:t>
-            </a:r>
-            <a:r>
-              <a:rPr lang="en-US" b="1" dirty="0" err="1" smtClean="0"/>
-              <a:t>oben</a:t>
-            </a:r>
-            <a:r>
-              <a:rPr lang="en-US" b="1" dirty="0" smtClean="0"/>
-              <a:t> </a:t>
-            </a:r>
-            <a:r>
-              <a:rPr lang="en-US" b="1" dirty="0" err="1" smtClean="0"/>
-              <a:t>nach</a:t>
-            </a:r>
-            <a:r>
-              <a:rPr lang="en-US" b="1" dirty="0" smtClean="0"/>
-              <a:t> </a:t>
-            </a:r>
-            <a:r>
-              <a:rPr lang="en-US" b="1" dirty="0" err="1" smtClean="0"/>
-              <a:t>unten</a:t>
-            </a:r>
-            <a:r>
-              <a:rPr lang="en-US" b="1" dirty="0" smtClean="0"/>
-              <a:t> </a:t>
-            </a:r>
-            <a:r>
-              <a:rPr lang="en-US" dirty="0" err="1" smtClean="0"/>
-              <a:t>durchgehen</a:t>
-            </a:r>
-            <a:endParaRPr lang="en-US" dirty="0" smtClean="0"/>
-          </a:p>
-          <a:p>
-            <a:pPr marL="342900" indent="-342900">
-              <a:buFontTx/>
-              <a:buChar char="-"/>
-            </a:pPr>
-            <a:r>
-              <a:rPr lang="en-US" dirty="0" err="1" smtClean="0"/>
-              <a:t>Veränderungen</a:t>
-            </a:r>
-            <a:r>
-              <a:rPr lang="en-US" dirty="0" smtClean="0"/>
-              <a:t> am </a:t>
-            </a:r>
-            <a:r>
-              <a:rPr lang="en-US" dirty="0" err="1" smtClean="0"/>
-              <a:t>Aufzugssimulator</a:t>
-            </a:r>
-            <a:r>
-              <a:rPr lang="en-US" dirty="0" smtClean="0"/>
-              <a:t> </a:t>
-            </a:r>
-            <a:r>
-              <a:rPr lang="en-US" b="1" dirty="0" err="1" smtClean="0"/>
-              <a:t>inkrementell</a:t>
-            </a:r>
-            <a:r>
-              <a:rPr lang="en-US" b="1" dirty="0" smtClean="0"/>
-              <a:t> </a:t>
-            </a:r>
-            <a:r>
-              <a:rPr lang="en-US" b="1" dirty="0" err="1" smtClean="0"/>
-              <a:t>durchführen</a:t>
-            </a:r>
-            <a:r>
-              <a:rPr lang="en-US" dirty="0" smtClean="0"/>
-              <a:t>, </a:t>
-            </a:r>
-            <a:r>
-              <a:rPr lang="en-US" dirty="0" err="1" smtClean="0"/>
-              <a:t>nicht</a:t>
-            </a:r>
-            <a:r>
-              <a:rPr lang="en-US" dirty="0" smtClean="0"/>
-              <a:t> </a:t>
-            </a:r>
-            <a:r>
-              <a:rPr lang="en-US" dirty="0" err="1" smtClean="0"/>
-              <a:t>alles</a:t>
-            </a:r>
-            <a:r>
-              <a:rPr lang="en-US" dirty="0" smtClean="0"/>
-              <a:t> auf </a:t>
-            </a:r>
-            <a:r>
-              <a:rPr lang="en-US" dirty="0" err="1" smtClean="0"/>
-              <a:t>einmal</a:t>
-            </a:r>
-            <a:endParaRPr lang="en-US" dirty="0" smtClean="0"/>
-          </a:p>
-          <a:p>
-            <a:pPr marL="342900" indent="-342900">
-              <a:buFontTx/>
-              <a:buChar char="-"/>
-            </a:pPr>
-            <a:r>
-              <a:rPr lang="en-US" dirty="0" err="1" smtClean="0"/>
-              <a:t>Probleme</a:t>
-            </a:r>
-            <a:r>
-              <a:rPr lang="en-US" dirty="0" smtClean="0"/>
-              <a:t> </a:t>
-            </a:r>
-            <a:r>
-              <a:rPr lang="en-US" dirty="0" err="1" smtClean="0"/>
-              <a:t>mit</a:t>
-            </a:r>
-            <a:r>
-              <a:rPr lang="en-US" dirty="0" smtClean="0"/>
-              <a:t> </a:t>
-            </a:r>
-            <a:r>
-              <a:rPr lang="en-US" dirty="0" err="1" smtClean="0">
-                <a:latin typeface="Consolas" panose="020B0609020204030204" pitchFamily="49" charset="0"/>
-                <a:cs typeface="Consolas" panose="020B0609020204030204" pitchFamily="49" charset="0"/>
-              </a:rPr>
-              <a:t>typedef</a:t>
-            </a:r>
-            <a:r>
-              <a:rPr lang="en-US" dirty="0" smtClean="0">
-                <a:latin typeface="Consolas" panose="020B0609020204030204" pitchFamily="49" charset="0"/>
-                <a:cs typeface="Consolas" panose="020B0609020204030204" pitchFamily="49" charset="0"/>
-              </a:rPr>
-              <a:t> </a:t>
-            </a:r>
-            <a:r>
-              <a:rPr lang="en-US" dirty="0" err="1" smtClean="0">
-                <a:latin typeface="Consolas" panose="020B0609020204030204" pitchFamily="49" charset="0"/>
-                <a:cs typeface="Consolas" panose="020B0609020204030204" pitchFamily="49" charset="0"/>
-              </a:rPr>
-              <a:t>std</a:t>
-            </a:r>
-            <a:r>
-              <a:rPr lang="en-US" dirty="0" smtClean="0">
-                <a:latin typeface="Consolas" panose="020B0609020204030204" pitchFamily="49" charset="0"/>
-                <a:cs typeface="Consolas" panose="020B0609020204030204" pitchFamily="49" charset="0"/>
-              </a:rPr>
-              <a:t>::</a:t>
-            </a:r>
-            <a:r>
-              <a:rPr lang="en-US" dirty="0" err="1" smtClean="0">
-                <a:latin typeface="Consolas" panose="020B0609020204030204" pitchFamily="49" charset="0"/>
-                <a:cs typeface="Consolas" panose="020B0609020204030204" pitchFamily="49" charset="0"/>
-              </a:rPr>
-              <a:t>shared_ptr</a:t>
-            </a:r>
-            <a:r>
-              <a:rPr lang="en-US" dirty="0" smtClean="0">
-                <a:latin typeface="Consolas" panose="020B0609020204030204" pitchFamily="49" charset="0"/>
-                <a:cs typeface="Consolas" panose="020B0609020204030204" pitchFamily="49" charset="0"/>
-              </a:rPr>
-              <a:t>&lt;Person&gt; </a:t>
-            </a:r>
-            <a:r>
-              <a:rPr lang="en-US" dirty="0" err="1" smtClean="0">
-                <a:latin typeface="Consolas" panose="020B0609020204030204" pitchFamily="49" charset="0"/>
-                <a:cs typeface="Consolas" panose="020B0609020204030204" pitchFamily="49" charset="0"/>
-              </a:rPr>
-              <a:t>PersonPtr</a:t>
-            </a:r>
-            <a:endParaRPr lang="en-US" dirty="0" smtClean="0">
-              <a:latin typeface="Consolas" panose="020B0609020204030204" pitchFamily="49" charset="0"/>
-              <a:cs typeface="Consolas" panose="020B0609020204030204" pitchFamily="49" charset="0"/>
-            </a:endParaRPr>
-          </a:p>
-          <a:p>
-            <a:pPr marL="692150" lvl="1" indent="-342900">
-              <a:buFontTx/>
-              <a:buChar char="-"/>
-            </a:pPr>
-            <a:r>
-              <a:rPr lang="en-US" dirty="0" err="1" smtClean="0"/>
-              <a:t>Es</a:t>
-            </a:r>
-            <a:r>
-              <a:rPr lang="en-US" dirty="0" smtClean="0"/>
-              <a:t> </a:t>
-            </a:r>
-            <a:r>
-              <a:rPr lang="en-US" dirty="0" err="1" smtClean="0"/>
-              <a:t>gibt</a:t>
-            </a:r>
-            <a:r>
-              <a:rPr lang="en-US" dirty="0" smtClean="0"/>
-              <a:t> </a:t>
-            </a:r>
-            <a:r>
-              <a:rPr lang="en-US" dirty="0" err="1" smtClean="0"/>
-              <a:t>eine</a:t>
-            </a:r>
-            <a:r>
-              <a:rPr lang="en-US" dirty="0" smtClean="0"/>
-              <a:t> </a:t>
-            </a:r>
-            <a:r>
-              <a:rPr lang="en-US" dirty="0" err="1" smtClean="0"/>
-              <a:t>Lösung</a:t>
-            </a:r>
-            <a:r>
-              <a:rPr lang="en-US" dirty="0" smtClean="0"/>
-              <a:t>! </a:t>
-            </a:r>
-            <a:r>
-              <a:rPr lang="en-US" dirty="0" smtClean="0">
-                <a:sym typeface="Wingdings" panose="05000000000000000000" pitchFamily="2" charset="2"/>
-              </a:rPr>
-              <a:t> </a:t>
-            </a:r>
-          </a:p>
-          <a:p>
-            <a:pPr marL="692150" lvl="1" indent="-342900">
-              <a:buFontTx/>
-              <a:buChar char="-"/>
-            </a:pPr>
-            <a:r>
-              <a:rPr lang="en-US" b="1" dirty="0" smtClean="0">
-                <a:sym typeface="Wingdings" panose="05000000000000000000" pitchFamily="2" charset="2"/>
-              </a:rPr>
-              <a:t>Window -&gt; Preferences -&gt; C/C++ / Code Analysis -&gt; Syntax and Semantic Errors </a:t>
-            </a:r>
-            <a:r>
-              <a:rPr lang="en-US" b="1" dirty="0" err="1" smtClean="0">
-                <a:sym typeface="Wingdings" panose="05000000000000000000" pitchFamily="2" charset="2"/>
-              </a:rPr>
-              <a:t>deaktivieren</a:t>
-            </a:r>
-            <a:r>
-              <a:rPr lang="en-US" b="1" dirty="0" smtClean="0">
-                <a:sym typeface="Wingdings" panose="05000000000000000000" pitchFamily="2" charset="2"/>
-              </a:rPr>
-              <a:t> </a:t>
-            </a:r>
-            <a:r>
-              <a:rPr lang="en-US" dirty="0" smtClean="0">
-                <a:sym typeface="Wingdings" panose="05000000000000000000" pitchFamily="2" charset="2"/>
-              </a:rPr>
-              <a:t>(</a:t>
-            </a:r>
-            <a:r>
-              <a:rPr lang="en-US" dirty="0" err="1" smtClean="0">
-                <a:sym typeface="Wingdings" panose="05000000000000000000" pitchFamily="2" charset="2"/>
-              </a:rPr>
-              <a:t>oder</a:t>
-            </a:r>
-            <a:r>
-              <a:rPr lang="en-US" dirty="0" smtClean="0">
-                <a:sym typeface="Wingdings" panose="05000000000000000000" pitchFamily="2" charset="2"/>
-              </a:rPr>
-              <a:t> </a:t>
-            </a:r>
-            <a:r>
-              <a:rPr lang="en-US" dirty="0" err="1" smtClean="0">
-                <a:sym typeface="Wingdings" panose="05000000000000000000" pitchFamily="2" charset="2"/>
-              </a:rPr>
-              <a:t>auch</a:t>
-            </a:r>
-            <a:r>
-              <a:rPr lang="en-US" dirty="0" smtClean="0">
-                <a:sym typeface="Wingdings" panose="05000000000000000000" pitchFamily="2" charset="2"/>
-              </a:rPr>
-              <a:t> </a:t>
-            </a:r>
-            <a:r>
-              <a:rPr lang="en-US" dirty="0" err="1" smtClean="0">
-                <a:sym typeface="Wingdings" panose="05000000000000000000" pitchFamily="2" charset="2"/>
-              </a:rPr>
-              <a:t>feingranularar</a:t>
-            </a:r>
-            <a:r>
-              <a:rPr lang="en-US" dirty="0" smtClean="0">
-                <a:sym typeface="Wingdings" panose="05000000000000000000" pitchFamily="2" charset="2"/>
-              </a:rPr>
-              <a:t>)</a:t>
-            </a:r>
-            <a:endParaRPr lang="en-US" b="1" dirty="0" smtClean="0"/>
-          </a:p>
-          <a:p>
-            <a:pPr marL="342900" indent="-342900">
-              <a:buFontTx/>
-              <a:buChar char="-"/>
-            </a:pPr>
-            <a:r>
-              <a:rPr lang="en-US" dirty="0" smtClean="0"/>
-              <a:t>Updates (Pull </a:t>
-            </a:r>
-            <a:r>
-              <a:rPr lang="en-US" dirty="0" smtClean="0">
-                <a:sym typeface="Wingdings" panose="05000000000000000000" pitchFamily="2" charset="2"/>
-              </a:rPr>
-              <a:t> )</a:t>
-            </a:r>
-          </a:p>
-          <a:p>
-            <a:pPr marL="692150" lvl="1" indent="-342900">
-              <a:buFontTx/>
-              <a:buChar char="-"/>
-            </a:pPr>
-            <a:r>
-              <a:rPr lang="en-US" dirty="0" err="1" smtClean="0">
-                <a:sym typeface="Wingdings" panose="05000000000000000000" pitchFamily="2" charset="2"/>
-              </a:rPr>
-              <a:t>Korrektur</a:t>
-            </a:r>
-            <a:r>
-              <a:rPr lang="en-US" dirty="0" smtClean="0">
-                <a:sym typeface="Wingdings" panose="05000000000000000000" pitchFamily="2" charset="2"/>
-              </a:rPr>
-              <a:t> an </a:t>
-            </a:r>
-            <a:r>
-              <a:rPr lang="en-US" dirty="0" err="1" smtClean="0">
-                <a:sym typeface="Wingdings" panose="05000000000000000000" pitchFamily="2" charset="2"/>
-              </a:rPr>
-              <a:t>Folie</a:t>
-            </a:r>
-            <a:r>
-              <a:rPr lang="en-US" dirty="0" smtClean="0">
-                <a:sym typeface="Wingdings" panose="05000000000000000000" pitchFamily="2" charset="2"/>
-              </a:rPr>
-              <a:t> 118 (</a:t>
-            </a:r>
-            <a:r>
-              <a:rPr lang="en-US" dirty="0" err="1" smtClean="0">
-                <a:sym typeface="Wingdings" panose="05000000000000000000" pitchFamily="2" charset="2"/>
-              </a:rPr>
-              <a:t>korrigierter</a:t>
-            </a:r>
-            <a:r>
-              <a:rPr lang="en-US" dirty="0" smtClean="0">
-                <a:sym typeface="Wingdings" panose="05000000000000000000" pitchFamily="2" charset="2"/>
-              </a:rPr>
-              <a:t> Code </a:t>
-            </a:r>
-            <a:r>
-              <a:rPr lang="en-US" dirty="0" err="1" smtClean="0">
-                <a:sym typeface="Wingdings" panose="05000000000000000000" pitchFamily="2" charset="2"/>
-              </a:rPr>
-              <a:t>für</a:t>
-            </a:r>
-            <a:r>
-              <a:rPr lang="en-US" dirty="0" smtClean="0">
-                <a:sym typeface="Wingdings" panose="05000000000000000000" pitchFamily="2" charset="2"/>
-              </a:rPr>
-              <a:t> </a:t>
-            </a:r>
-            <a:r>
-              <a:rPr lang="en-US" dirty="0" err="1" smtClean="0">
-                <a:sym typeface="Wingdings" panose="05000000000000000000" pitchFamily="2" charset="2"/>
-              </a:rPr>
-              <a:t>Mehrfachvererbung</a:t>
-            </a:r>
-            <a:r>
-              <a:rPr lang="en-US" dirty="0" smtClean="0">
-                <a:sym typeface="Wingdings" panose="05000000000000000000" pitchFamily="2" charset="2"/>
-              </a:rPr>
-              <a:t>)</a:t>
-            </a:r>
-          </a:p>
-          <a:p>
-            <a:pPr marL="692150" lvl="1" indent="-342900">
-              <a:buFontTx/>
-              <a:buChar char="-"/>
-            </a:pPr>
-            <a:r>
-              <a:rPr lang="en-US" dirty="0" err="1" smtClean="0">
-                <a:sym typeface="Wingdings" panose="05000000000000000000" pitchFamily="2" charset="2"/>
-              </a:rPr>
-              <a:t>ExpressionTree-Aufgabe</a:t>
-            </a:r>
-            <a:r>
-              <a:rPr lang="en-US" dirty="0" smtClean="0">
-                <a:sym typeface="Wingdings" panose="05000000000000000000" pitchFamily="2" charset="2"/>
-              </a:rPr>
-              <a:t> </a:t>
-            </a:r>
-            <a:r>
-              <a:rPr lang="en-US" dirty="0" err="1" smtClean="0">
-                <a:sym typeface="Wingdings" panose="05000000000000000000" pitchFamily="2" charset="2"/>
-              </a:rPr>
-              <a:t>überarbeitet</a:t>
-            </a:r>
-            <a:r>
-              <a:rPr lang="en-US" dirty="0" smtClean="0">
-                <a:sym typeface="Wingdings" panose="05000000000000000000" pitchFamily="2" charset="2"/>
-              </a:rPr>
-              <a:t> (</a:t>
-            </a:r>
-            <a:r>
-              <a:rPr lang="en-US" dirty="0" err="1" smtClean="0">
-                <a:sym typeface="Wingdings" panose="05000000000000000000" pitchFamily="2" charset="2"/>
-              </a:rPr>
-              <a:t>kein</a:t>
-            </a:r>
-            <a:r>
-              <a:rPr lang="en-US" dirty="0" smtClean="0">
-                <a:sym typeface="Wingdings" panose="05000000000000000000" pitchFamily="2" charset="2"/>
-              </a:rPr>
-              <a:t> </a:t>
-            </a:r>
-            <a:r>
-              <a:rPr lang="en-US" dirty="0" smtClean="0">
-                <a:latin typeface="Consolas" panose="020B0609020204030204" pitchFamily="49" charset="0"/>
-                <a:cs typeface="Consolas" panose="020B0609020204030204" pitchFamily="49" charset="0"/>
-                <a:sym typeface="Wingdings" panose="05000000000000000000" pitchFamily="2" charset="2"/>
-              </a:rPr>
-              <a:t>delete</a:t>
-            </a:r>
-            <a:r>
-              <a:rPr lang="en-US" dirty="0" smtClean="0">
-                <a:sym typeface="Wingdings" panose="05000000000000000000" pitchFamily="2" charset="2"/>
-              </a:rPr>
-              <a:t> </a:t>
-            </a:r>
-            <a:r>
-              <a:rPr lang="en-US" dirty="0" err="1" smtClean="0">
-                <a:sym typeface="Wingdings" panose="05000000000000000000" pitchFamily="2" charset="2"/>
-              </a:rPr>
-              <a:t>mehr</a:t>
-            </a:r>
-            <a:r>
-              <a:rPr lang="en-US" dirty="0" smtClean="0">
-                <a:sym typeface="Wingdings" panose="05000000000000000000" pitchFamily="2" charset="2"/>
-              </a:rPr>
-              <a:t> </a:t>
-            </a:r>
-            <a:r>
-              <a:rPr lang="en-US" dirty="0" err="1" smtClean="0">
-                <a:sym typeface="Wingdings" panose="05000000000000000000" pitchFamily="2" charset="2"/>
-              </a:rPr>
-              <a:t>im</a:t>
-            </a:r>
-            <a:r>
-              <a:rPr lang="en-US" dirty="0" smtClean="0">
-                <a:sym typeface="Wingdings" panose="05000000000000000000" pitchFamily="2" charset="2"/>
-              </a:rPr>
-              <a:t> Destruktor)</a:t>
-            </a:r>
-            <a:endParaRPr lang="en-US" dirty="0" smtClean="0"/>
-          </a:p>
-          <a:p>
-            <a:pPr marL="342900" indent="-342900">
-              <a:buFontTx/>
-              <a:buChar char="-"/>
-            </a:pPr>
             <a:endParaRPr lang="en-US" dirty="0"/>
           </a:p>
         </p:txBody>
@@ -8784,10 +8246,15 @@
                             </p:stCondLst>
                             <p:childTnLst>
                               <p:par>
-                                <p:cTn id="5" presetID="1" presetClass="entr" presetSubtype="0" fill="hold" nodeType="clickEffect">
+                                <p:cTn id="5" presetID="1" presetClass="entr" presetSubtype="0" fill="hold" nodeType="clickEffect" nodePh="1">
                                   <p:stCondLst>
                                     <p:cond delay="0"/>
                                   </p:stCondLst>
+                                  <p:endCondLst>
+                                    <p:cond evt="begin" delay="0">
+                                      <p:tn val="5"/>
+                                    </p:cond>
+                                  </p:endCondLst>
                                   <p:childTnLst>
                                     <p:set>
                                       <p:cBhvr>
@@ -8800,326 +8267,6 @@
                                           <p:spTgt spid="3">
                                             <p:txEl>
                                               <p:pRg st="0" end="0"/>
-                                            </p:txEl>
-                                          </p:spTgt>
-                                        </p:tgtEl>
-                                        <p:attrNameLst>
-                                          <p:attrName>style.visibility</p:attrName>
-                                        </p:attrNameLst>
-                                      </p:cBhvr>
-                                      <p:to>
-                                        <p:strVal val="visible"/>
-                                      </p:to>
-                                    </p:set>
-                                  </p:childTnLst>
-                                </p:cTn>
-                              </p:par>
-                            </p:childTnLst>
-                          </p:cTn>
-                        </p:par>
-                      </p:childTnLst>
-                    </p:cTn>
-                  </p:par>
-                  <p:par>
-                    <p:cTn id="7" fill="hold">
-                      <p:stCondLst>
-                        <p:cond delay="indefinite"/>
-                      </p:stCondLst>
-                      <p:childTnLst>
-                        <p:par>
-                          <p:cTn id="8" fill="hold">
-                            <p:stCondLst>
-                              <p:cond delay="0"/>
-                            </p:stCondLst>
-                            <p:childTnLst>
-                              <p:par>
-                                <p:cTn id="9" presetID="1" presetClass="entr" presetSubtype="0" fill="hold" nodeType="clickEffect">
-                                  <p:stCondLst>
-                                    <p:cond delay="0"/>
-                                  </p:stCondLst>
-                                  <p:childTnLst>
-                                    <p:set>
-                                      <p:cBhvr>
-                                        <p:cTn id="10" dur="1" fill="hold">
-                                          <p:stCondLst>
-                                            <p:cond delay="0"/>
-                                          </p:stCondLst>
-                                        </p:cTn>
-                                        <p:tgtEl>
-                                          <p:spTgt spid="3">
-                                            <p:txEl>
-                                              <p:pRg st="1" end="1"/>
-                                            </p:txEl>
-                                          </p:spTgt>
-                                        </p:tgtEl>
-                                        <p:attrNameLst>
-                                          <p:attrName>style.visibility</p:attrName>
-                                        </p:attrNameLst>
-                                      </p:cBhvr>
-                                      <p:to>
-                                        <p:strVal val="visible"/>
-                                      </p:to>
-                                    </p:set>
-                                  </p:childTnLst>
-                                </p:cTn>
-                              </p:par>
-                            </p:childTnLst>
-                          </p:cTn>
-                        </p:par>
-                      </p:childTnLst>
-                    </p:cTn>
-                  </p:par>
-                  <p:par>
-                    <p:cTn id="11" fill="hold">
-                      <p:stCondLst>
-                        <p:cond delay="indefinite"/>
-                      </p:stCondLst>
-                      <p:childTnLst>
-                        <p:par>
-                          <p:cTn id="12" fill="hold">
-                            <p:stCondLst>
-                              <p:cond delay="0"/>
-                            </p:stCondLst>
-                            <p:childTnLst>
-                              <p:par>
-                                <p:cTn id="13" presetID="1" presetClass="entr" presetSubtype="0" fill="hold" nodeType="clickEffect">
-                                  <p:stCondLst>
-                                    <p:cond delay="0"/>
-                                  </p:stCondLst>
-                                  <p:childTnLst>
-                                    <p:set>
-                                      <p:cBhvr>
-                                        <p:cTn id="14" dur="1" fill="hold">
-                                          <p:stCondLst>
-                                            <p:cond delay="0"/>
-                                          </p:stCondLst>
-                                        </p:cTn>
-                                        <p:tgtEl>
-                                          <p:spTgt spid="3">
-                                            <p:txEl>
-                                              <p:pRg st="2" end="2"/>
-                                            </p:txEl>
-                                          </p:spTgt>
-                                        </p:tgtEl>
-                                        <p:attrNameLst>
-                                          <p:attrName>style.visibility</p:attrName>
-                                        </p:attrNameLst>
-                                      </p:cBhvr>
-                                      <p:to>
-                                        <p:strVal val="visible"/>
-                                      </p:to>
-                                    </p:set>
-                                  </p:childTnLst>
-                                </p:cTn>
-                              </p:par>
-                            </p:childTnLst>
-                          </p:cTn>
-                        </p:par>
-                      </p:childTnLst>
-                    </p:cTn>
-                  </p:par>
-                  <p:par>
-                    <p:cTn id="15" fill="hold">
-                      <p:stCondLst>
-                        <p:cond delay="indefinite"/>
-                      </p:stCondLst>
-                      <p:childTnLst>
-                        <p:par>
-                          <p:cTn id="16" fill="hold">
-                            <p:stCondLst>
-                              <p:cond delay="0"/>
-                            </p:stCondLst>
-                            <p:childTnLst>
-                              <p:par>
-                                <p:cTn id="17" presetID="1" presetClass="entr" presetSubtype="0" fill="hold" nodeType="clickEffect">
-                                  <p:stCondLst>
-                                    <p:cond delay="0"/>
-                                  </p:stCondLst>
-                                  <p:childTnLst>
-                                    <p:set>
-                                      <p:cBhvr>
-                                        <p:cTn id="18" dur="1" fill="hold">
-                                          <p:stCondLst>
-                                            <p:cond delay="0"/>
-                                          </p:stCondLst>
-                                        </p:cTn>
-                                        <p:tgtEl>
-                                          <p:spTgt spid="3">
-                                            <p:txEl>
-                                              <p:pRg st="3" end="3"/>
-                                            </p:txEl>
-                                          </p:spTgt>
-                                        </p:tgtEl>
-                                        <p:attrNameLst>
-                                          <p:attrName>style.visibility</p:attrName>
-                                        </p:attrNameLst>
-                                      </p:cBhvr>
-                                      <p:to>
-                                        <p:strVal val="visible"/>
-                                      </p:to>
-                                    </p:set>
-                                  </p:childTnLst>
-                                </p:cTn>
-                              </p:par>
-                              <p:par>
-                                <p:cTn id="19" presetID="1" presetClass="entr" presetSubtype="0" fill="hold" nodeType="withEffect">
-                                  <p:stCondLst>
-                                    <p:cond delay="0"/>
-                                  </p:stCondLst>
-                                  <p:childTnLst>
-                                    <p:set>
-                                      <p:cBhvr>
-                                        <p:cTn id="20" dur="1" fill="hold">
-                                          <p:stCondLst>
-                                            <p:cond delay="0"/>
-                                          </p:stCondLst>
-                                        </p:cTn>
-                                        <p:tgtEl>
-                                          <p:spTgt spid="3">
-                                            <p:txEl>
-                                              <p:pRg st="4" end="4"/>
-                                            </p:txEl>
-                                          </p:spTgt>
-                                        </p:tgtEl>
-                                        <p:attrNameLst>
-                                          <p:attrName>style.visibility</p:attrName>
-                                        </p:attrNameLst>
-                                      </p:cBhvr>
-                                      <p:to>
-                                        <p:strVal val="visible"/>
-                                      </p:to>
-                                    </p:set>
-                                  </p:childTnLst>
-                                </p:cTn>
-                              </p:par>
-                              <p:par>
-                                <p:cTn id="21" presetID="1" presetClass="entr" presetSubtype="0" fill="hold" nodeType="withEffect">
-                                  <p:stCondLst>
-                                    <p:cond delay="0"/>
-                                  </p:stCondLst>
-                                  <p:childTnLst>
-                                    <p:set>
-                                      <p:cBhvr>
-                                        <p:cTn id="22" dur="1" fill="hold">
-                                          <p:stCondLst>
-                                            <p:cond delay="0"/>
-                                          </p:stCondLst>
-                                        </p:cTn>
-                                        <p:tgtEl>
-                                          <p:spTgt spid="3">
-                                            <p:txEl>
-                                              <p:pRg st="5" end="5"/>
-                                            </p:txEl>
-                                          </p:spTgt>
-                                        </p:tgtEl>
-                                        <p:attrNameLst>
-                                          <p:attrName>style.visibility</p:attrName>
-                                        </p:attrNameLst>
-                                      </p:cBhvr>
-                                      <p:to>
-                                        <p:strVal val="visible"/>
-                                      </p:to>
-                                    </p:set>
-                                  </p:childTnLst>
-                                </p:cTn>
-                              </p:par>
-                            </p:childTnLst>
-                          </p:cTn>
-                        </p:par>
-                      </p:childTnLst>
-                    </p:cTn>
-                  </p:par>
-                  <p:par>
-                    <p:cTn id="23" fill="hold">
-                      <p:stCondLst>
-                        <p:cond delay="indefinite"/>
-                      </p:stCondLst>
-                      <p:childTnLst>
-                        <p:par>
-                          <p:cTn id="24" fill="hold">
-                            <p:stCondLst>
-                              <p:cond delay="0"/>
-                            </p:stCondLst>
-                            <p:childTnLst>
-                              <p:par>
-                                <p:cTn id="25" presetID="1" presetClass="entr" presetSubtype="0" fill="hold" nodeType="clickEffect">
-                                  <p:stCondLst>
-                                    <p:cond delay="0"/>
-                                  </p:stCondLst>
-                                  <p:childTnLst>
-                                    <p:set>
-                                      <p:cBhvr>
-                                        <p:cTn id="26" dur="1" fill="hold">
-                                          <p:stCondLst>
-                                            <p:cond delay="0"/>
-                                          </p:stCondLst>
-                                        </p:cTn>
-                                        <p:tgtEl>
-                                          <p:spTgt spid="3">
-                                            <p:txEl>
-                                              <p:pRg st="6" end="6"/>
-                                            </p:txEl>
-                                          </p:spTgt>
-                                        </p:tgtEl>
-                                        <p:attrNameLst>
-                                          <p:attrName>style.visibility</p:attrName>
-                                        </p:attrNameLst>
-                                      </p:cBhvr>
-                                      <p:to>
-                                        <p:strVal val="visible"/>
-                                      </p:to>
-                                    </p:set>
-                                  </p:childTnLst>
-                                </p:cTn>
-                              </p:par>
-                              <p:par>
-                                <p:cTn id="27" presetID="1" presetClass="entr" presetSubtype="0" fill="hold" nodeType="withEffect">
-                                  <p:stCondLst>
-                                    <p:cond delay="0"/>
-                                  </p:stCondLst>
-                                  <p:childTnLst>
-                                    <p:set>
-                                      <p:cBhvr>
-                                        <p:cTn id="28" dur="1" fill="hold">
-                                          <p:stCondLst>
-                                            <p:cond delay="0"/>
-                                          </p:stCondLst>
-                                        </p:cTn>
-                                        <p:tgtEl>
-                                          <p:spTgt spid="3">
-                                            <p:txEl>
-                                              <p:pRg st="7" end="7"/>
-                                            </p:txEl>
-                                          </p:spTgt>
-                                        </p:tgtEl>
-                                        <p:attrNameLst>
-                                          <p:attrName>style.visibility</p:attrName>
-                                        </p:attrNameLst>
-                                      </p:cBhvr>
-                                      <p:to>
-                                        <p:strVal val="visible"/>
-                                      </p:to>
-                                    </p:set>
-                                  </p:childTnLst>
-                                </p:cTn>
-                              </p:par>
-                              <p:par>
-                                <p:cTn id="29" presetID="1" presetClass="entr" presetSubtype="0" fill="hold" nodeType="withEffect">
-                                  <p:stCondLst>
-                                    <p:cond delay="0"/>
-                                  </p:stCondLst>
-                                  <p:childTnLst>
-                                    <p:set>
-                                      <p:cBhvr>
-                                        <p:cTn id="30" dur="1" fill="hold">
-                                          <p:stCondLst>
-                                            <p:cond delay="0"/>
-                                          </p:stCondLst>
-                                        </p:cTn>
-                                        <p:tgtEl>
-                                          <p:spTgt spid="3">
-                                            <p:txEl>
-                                              <p:pRg st="8" end="8"/>
                                             </p:txEl>
                                           </p:spTgt>
                                         </p:tgtEl>
@@ -9214,7 +8361,7 @@
       </p:sp>
       <p:sp>
         <p:nvSpPr>
-          <p:cNvPr id="3" name="Inhaltsplatzhalter 2"/>
+          <p:cNvPr id="5" name="Inhaltsplatzhalter 4"/>
           <p:cNvSpPr>
             <a:spLocks noGrp="1"/>
           </p:cNvSpPr>
@@ -9227,667 +8374,7 @@
           <a:bodyPr/>
           <a:lstStyle/>
           <a:p>
-            <a:r>
-              <a:rPr lang="en-US" dirty="0" err="1" smtClean="0"/>
-              <a:t>Warum</a:t>
-            </a:r>
-            <a:r>
-              <a:rPr lang="en-US" dirty="0" smtClean="0"/>
-              <a:t> </a:t>
-            </a:r>
-            <a:r>
-              <a:rPr lang="en-US" dirty="0" err="1" smtClean="0"/>
-              <a:t>ist</a:t>
-            </a:r>
-            <a:r>
-              <a:rPr lang="en-US" dirty="0" smtClean="0"/>
-              <a:t> </a:t>
-            </a:r>
-            <a:r>
-              <a:rPr lang="en-US" dirty="0" err="1" smtClean="0"/>
-              <a:t>hier</a:t>
-            </a:r>
-            <a:r>
-              <a:rPr lang="en-US" dirty="0" smtClean="0"/>
-              <a:t> </a:t>
-            </a:r>
-            <a:r>
-              <a:rPr lang="en-US" dirty="0" err="1" smtClean="0"/>
-              <a:t>const</a:t>
-            </a:r>
-            <a:r>
-              <a:rPr lang="en-US" dirty="0" smtClean="0"/>
-              <a:t> </a:t>
-            </a:r>
-            <a:r>
-              <a:rPr lang="en-US" dirty="0" err="1" smtClean="0"/>
-              <a:t>als</a:t>
-            </a:r>
-            <a:r>
-              <a:rPr lang="en-US" dirty="0" smtClean="0"/>
-              <a:t> </a:t>
-            </a:r>
-            <a:r>
-              <a:rPr lang="en-US" dirty="0" err="1" smtClean="0"/>
-              <a:t>Rückgabewert</a:t>
-            </a:r>
-            <a:r>
-              <a:rPr lang="en-US" dirty="0" smtClean="0"/>
-              <a:t>-Modifier </a:t>
-            </a:r>
-            <a:r>
-              <a:rPr lang="en-US" dirty="0" err="1" smtClean="0"/>
-              <a:t>nicht</a:t>
-            </a:r>
-            <a:r>
-              <a:rPr lang="en-US" dirty="0" smtClean="0"/>
-              <a:t> </a:t>
-            </a:r>
-            <a:r>
-              <a:rPr lang="en-US" dirty="0" err="1" smtClean="0"/>
-              <a:t>sinnvoll</a:t>
-            </a:r>
-            <a:r>
-              <a:rPr lang="en-US" dirty="0" smtClean="0"/>
-              <a:t>?</a:t>
-            </a:r>
-          </a:p>
-          <a:p>
-            <a:endParaRPr lang="en-US" dirty="0"/>
-          </a:p>
-          <a:p>
-            <a:endParaRPr lang="en-US" dirty="0" smtClean="0"/>
-          </a:p>
-          <a:p>
-            <a:endParaRPr lang="en-US" dirty="0"/>
-          </a:p>
-          <a:p>
-            <a:endParaRPr lang="en-US" dirty="0" smtClean="0"/>
-          </a:p>
-          <a:p>
-            <a:endParaRPr lang="en-US" dirty="0"/>
-          </a:p>
-          <a:p>
-            <a:endParaRPr lang="en-US" dirty="0" smtClean="0"/>
-          </a:p>
-          <a:p>
-            <a:endParaRPr lang="en-US" dirty="0"/>
-          </a:p>
-          <a:p>
-            <a:endParaRPr lang="en-US" dirty="0" smtClean="0"/>
-          </a:p>
-          <a:p>
-            <a:endParaRPr lang="en-US" dirty="0"/>
-          </a:p>
-          <a:p>
-            <a:r>
-              <a:rPr lang="en-US" dirty="0" err="1" smtClean="0"/>
-              <a:t>Wiederholung</a:t>
-            </a:r>
-            <a:r>
-              <a:rPr lang="en-US" dirty="0" smtClean="0"/>
-              <a:t>: </a:t>
-            </a:r>
-            <a:r>
-              <a:rPr lang="en-US" dirty="0" err="1" smtClean="0"/>
-              <a:t>Polymorphie</a:t>
-            </a:r>
-            <a:r>
-              <a:rPr lang="en-US" dirty="0" smtClean="0"/>
-              <a:t>?</a:t>
-            </a:r>
-            <a:endParaRPr lang="en-US" dirty="0"/>
-          </a:p>
-        </p:txBody>
-      </p:sp>
-      <p:sp>
-        <p:nvSpPr>
-          <p:cNvPr id="4" name="Inhaltsplatzhalter 2"/>
-          <p:cNvSpPr txBox="1">
-            <a:spLocks/>
-          </p:cNvSpPr>
-          <p:nvPr/>
-        </p:nvSpPr>
-        <p:spPr bwMode="auto">
-          <a:xfrm>
-            <a:off x="363995" y="1988840"/>
-            <a:ext cx="4249167" cy="2550371"/>
-          </a:xfrm>
-          <a:prstGeom prst="foldedCorner">
-            <a:avLst/>
-          </a:prstGeom>
-          <a:noFill/>
-          <a:ln w="9525">
-            <a:solidFill>
-              <a:srgbClr val="000000"/>
-            </a:solidFill>
-            <a:miter lim="800000"/>
-            <a:headEnd/>
-            <a:tailEnd/>
-          </a:ln>
-          <a:extLst>
-            <a:ext uri="{909E8E84-426E-40DD-AFC4-6F175D3DCCD1}">
-              <a14:hiddenFill xmlns:a14="http://schemas.microsoft.com/office/drawing/2010/main">
-                <a:solidFill>
-                  <a:srgbClr val="FFFFFF"/>
-                </a:solidFill>
-              </a14:hiddenFill>
-            </a:ext>
-          </a:extLst>
-        </p:spPr>
-        <p:txBody>
-          <a:bodyPr vert="horz" wrap="square" lIns="91440" tIns="45720" rIns="91440" bIns="45720" numCol="1" anchor="t" anchorCtr="0" compatLnSpc="1">
-            <a:prstTxWarp prst="textNoShape">
-              <a:avLst/>
-            </a:prstTxWarp>
-          </a:bodyPr>
-          <a:lstStyle>
-            <a:lvl1pPr marL="0" indent="0" algn="l" rtl="0" eaLnBrk="0" fontAlgn="base" hangingPunct="0">
-              <a:spcBef>
-                <a:spcPct val="20000"/>
-              </a:spcBef>
-              <a:spcAft>
-                <a:spcPct val="0"/>
-              </a:spcAft>
-              <a:buFont typeface="Wingdings" pitchFamily="2" charset="2"/>
-              <a:buNone/>
-              <a:defRPr sz="2000" b="0">
-                <a:solidFill>
-                  <a:schemeClr val="tx1"/>
-                </a:solidFill>
-                <a:latin typeface="+mn-lt"/>
-                <a:ea typeface="+mn-ea"/>
-                <a:cs typeface="+mn-cs"/>
-              </a:defRPr>
-            </a:lvl1pPr>
-            <a:lvl2pPr marL="349250" indent="-168275" algn="l" rtl="0" eaLnBrk="0" fontAlgn="base" hangingPunct="0">
-              <a:spcBef>
-                <a:spcPct val="20000"/>
-              </a:spcBef>
-              <a:spcAft>
-                <a:spcPct val="0"/>
-              </a:spcAft>
-              <a:buFont typeface="Wingdings" pitchFamily="2" charset="2"/>
-              <a:buChar char="§"/>
-              <a:defRPr>
-                <a:solidFill>
-                  <a:schemeClr val="tx1"/>
-                </a:solidFill>
-                <a:latin typeface="+mn-lt"/>
-              </a:defRPr>
-            </a:lvl2pPr>
-            <a:lvl3pPr marL="538163" indent="-187325" algn="l" rtl="0" eaLnBrk="0" fontAlgn="base" hangingPunct="0">
-              <a:spcBef>
-                <a:spcPct val="20000"/>
-              </a:spcBef>
-              <a:spcAft>
-                <a:spcPct val="0"/>
-              </a:spcAft>
-              <a:buFont typeface="Wingdings" pitchFamily="2" charset="2"/>
-              <a:buChar char="§"/>
-              <a:defRPr>
-                <a:solidFill>
-                  <a:schemeClr val="tx1"/>
-                </a:solidFill>
-                <a:latin typeface="+mn-lt"/>
-              </a:defRPr>
-            </a:lvl3pPr>
-            <a:lvl4pPr marL="717550" indent="-173038" algn="l" rtl="0" eaLnBrk="0" fontAlgn="base" hangingPunct="0">
-              <a:spcBef>
-                <a:spcPct val="20000"/>
-              </a:spcBef>
-              <a:spcAft>
-                <a:spcPct val="0"/>
-              </a:spcAft>
-              <a:buFont typeface="Wingdings" pitchFamily="2" charset="2"/>
-              <a:buChar char="§"/>
-              <a:defRPr sz="1600">
-                <a:solidFill>
-                  <a:schemeClr val="tx1"/>
-                </a:solidFill>
-                <a:latin typeface="+mn-lt"/>
-              </a:defRPr>
-            </a:lvl4pPr>
-            <a:lvl5pPr marL="908050" indent="-188913" algn="l" rtl="0" eaLnBrk="0" fontAlgn="base" hangingPunct="0">
-              <a:spcBef>
-                <a:spcPct val="20000"/>
-              </a:spcBef>
-              <a:spcAft>
-                <a:spcPct val="0"/>
-              </a:spcAft>
-              <a:buFont typeface="Wingdings" pitchFamily="2" charset="2"/>
-              <a:buChar char="§"/>
-              <a:defRPr sz="1600">
-                <a:solidFill>
-                  <a:schemeClr val="tx1"/>
-                </a:solidFill>
-                <a:latin typeface="+mn-lt"/>
-              </a:defRPr>
-            </a:lvl5pPr>
-            <a:lvl6pPr marL="1365250" indent="-188913" algn="l" rtl="0" fontAlgn="base">
-              <a:spcBef>
-                <a:spcPct val="20000"/>
-              </a:spcBef>
-              <a:spcAft>
-                <a:spcPct val="0"/>
-              </a:spcAft>
-              <a:buFont typeface="Wingdings" pitchFamily="2" charset="2"/>
-              <a:buChar char="§"/>
-              <a:defRPr sz="1600">
-                <a:solidFill>
-                  <a:schemeClr val="tx1"/>
-                </a:solidFill>
-                <a:latin typeface="+mn-lt"/>
-              </a:defRPr>
-            </a:lvl6pPr>
-            <a:lvl7pPr marL="1822450" indent="-188913" algn="l" rtl="0" fontAlgn="base">
-              <a:spcBef>
-                <a:spcPct val="20000"/>
-              </a:spcBef>
-              <a:spcAft>
-                <a:spcPct val="0"/>
-              </a:spcAft>
-              <a:buFont typeface="Wingdings" pitchFamily="2" charset="2"/>
-              <a:buChar char="§"/>
-              <a:defRPr sz="1600">
-                <a:solidFill>
-                  <a:schemeClr val="tx1"/>
-                </a:solidFill>
-                <a:latin typeface="+mn-lt"/>
-              </a:defRPr>
-            </a:lvl7pPr>
-            <a:lvl8pPr marL="2279650" indent="-188913" algn="l" rtl="0" fontAlgn="base">
-              <a:spcBef>
-                <a:spcPct val="20000"/>
-              </a:spcBef>
-              <a:spcAft>
-                <a:spcPct val="0"/>
-              </a:spcAft>
-              <a:buFont typeface="Wingdings" pitchFamily="2" charset="2"/>
-              <a:buChar char="§"/>
-              <a:defRPr sz="1600">
-                <a:solidFill>
-                  <a:schemeClr val="tx1"/>
-                </a:solidFill>
-                <a:latin typeface="+mn-lt"/>
-              </a:defRPr>
-            </a:lvl8pPr>
-            <a:lvl9pPr marL="2736850" indent="-188913" algn="l" rtl="0" fontAlgn="base">
-              <a:spcBef>
-                <a:spcPct val="20000"/>
-              </a:spcBef>
-              <a:spcAft>
-                <a:spcPct val="0"/>
-              </a:spcAft>
-              <a:buFont typeface="Wingdings" pitchFamily="2" charset="2"/>
-              <a:buChar char="§"/>
-              <a:defRPr sz="1600">
-                <a:solidFill>
-                  <a:schemeClr val="tx1"/>
-                </a:solidFill>
-                <a:latin typeface="+mn-lt"/>
-              </a:defRPr>
-            </a:lvl9pPr>
-          </a:lstStyle>
-          <a:p>
-            <a:pPr defTabSz="914400">
-              <a:lnSpc>
-                <a:spcPct val="100000"/>
-              </a:lnSpc>
-              <a:buClrTx/>
-              <a:buSzTx/>
-              <a:tabLst>
-                <a:tab pos="533400" algn="l"/>
-              </a:tabLst>
-            </a:pPr>
-            <a:r>
-              <a:rPr lang="en-US" sz="1600" b="1" kern="0" dirty="0" err="1" smtClean="0">
-                <a:solidFill>
-                  <a:srgbClr val="7F0055"/>
-                </a:solidFill>
-                <a:latin typeface="Consolas" panose="020B0609020204030204" pitchFamily="49" charset="0"/>
-                <a:cs typeface="Consolas" panose="020B0609020204030204" pitchFamily="49" charset="0"/>
-              </a:rPr>
-              <a:t>const</a:t>
-            </a:r>
-            <a:r>
-              <a:rPr lang="en-US" sz="1600" b="1" kern="0" dirty="0" smtClean="0">
-                <a:solidFill>
-                  <a:srgbClr val="7F0055"/>
-                </a:solidFill>
-                <a:latin typeface="Consolas" panose="020B0609020204030204" pitchFamily="49" charset="0"/>
-                <a:cs typeface="Consolas" panose="020B0609020204030204" pitchFamily="49" charset="0"/>
-              </a:rPr>
-              <a:t> </a:t>
-            </a:r>
-            <a:r>
-              <a:rPr lang="en-US" sz="1600" b="1" kern="0" dirty="0" err="1" smtClean="0">
-                <a:solidFill>
-                  <a:srgbClr val="7F0055"/>
-                </a:solidFill>
-                <a:latin typeface="Consolas" panose="020B0609020204030204" pitchFamily="49" charset="0"/>
-                <a:cs typeface="Consolas" panose="020B0609020204030204" pitchFamily="49" charset="0"/>
-              </a:rPr>
-              <a:t>int</a:t>
-            </a:r>
-            <a:r>
-              <a:rPr lang="en-US" sz="1600" b="1" kern="0" dirty="0" smtClean="0">
-                <a:solidFill>
-                  <a:srgbClr val="7F0055"/>
-                </a:solidFill>
-                <a:latin typeface="Consolas" panose="020B0609020204030204" pitchFamily="49" charset="0"/>
-                <a:cs typeface="Consolas" panose="020B0609020204030204" pitchFamily="49" charset="0"/>
-              </a:rPr>
-              <a:t> </a:t>
-            </a:r>
-            <a:r>
-              <a:rPr lang="en-US" sz="1600" b="1" kern="0" dirty="0" err="1" smtClean="0">
-                <a:solidFill>
-                  <a:srgbClr val="000000"/>
-                </a:solidFill>
-                <a:latin typeface="Consolas" panose="020B0609020204030204" pitchFamily="49" charset="0"/>
-                <a:cs typeface="Consolas" panose="020B0609020204030204" pitchFamily="49" charset="0"/>
-              </a:rPr>
-              <a:t>myFunction</a:t>
-            </a:r>
-            <a:r>
-              <a:rPr lang="en-US" sz="1600" b="1" kern="0" dirty="0" smtClean="0">
-                <a:solidFill>
-                  <a:srgbClr val="000000"/>
-                </a:solidFill>
-                <a:latin typeface="Consolas" panose="020B0609020204030204" pitchFamily="49" charset="0"/>
-                <a:cs typeface="Consolas" panose="020B0609020204030204" pitchFamily="49" charset="0"/>
-              </a:rPr>
-              <a:t>(</a:t>
-            </a:r>
-            <a:r>
-              <a:rPr lang="en-US" sz="1600" b="1" kern="0" dirty="0" smtClean="0">
-                <a:solidFill>
-                  <a:srgbClr val="005032"/>
-                </a:solidFill>
-                <a:latin typeface="Consolas" panose="020B0609020204030204" pitchFamily="49" charset="0"/>
-                <a:cs typeface="Consolas" panose="020B0609020204030204" pitchFamily="49" charset="0"/>
-              </a:rPr>
-              <a:t>C</a:t>
-            </a:r>
-            <a:r>
-              <a:rPr lang="en-US" sz="1600" b="1" kern="0" dirty="0" smtClean="0">
-                <a:solidFill>
-                  <a:srgbClr val="000000"/>
-                </a:solidFill>
-                <a:latin typeface="Consolas" panose="020B0609020204030204" pitchFamily="49" charset="0"/>
-                <a:cs typeface="Consolas" panose="020B0609020204030204" pitchFamily="49" charset="0"/>
-              </a:rPr>
-              <a:t> c) {</a:t>
-            </a:r>
-          </a:p>
-          <a:p>
-            <a:pPr defTabSz="914400">
-              <a:lnSpc>
-                <a:spcPct val="100000"/>
-              </a:lnSpc>
-              <a:buClrTx/>
-              <a:buSzTx/>
-              <a:tabLst>
-                <a:tab pos="533400" algn="l"/>
-              </a:tabLst>
-            </a:pPr>
-            <a:r>
-              <a:rPr lang="en-US" sz="1600" kern="0" dirty="0">
-                <a:solidFill>
-                  <a:srgbClr val="000000"/>
-                </a:solidFill>
-                <a:latin typeface="Consolas" panose="020B0609020204030204" pitchFamily="49" charset="0"/>
-                <a:cs typeface="Consolas" panose="020B0609020204030204" pitchFamily="49" charset="0"/>
-              </a:rPr>
-              <a:t>	</a:t>
-            </a:r>
-            <a:r>
-              <a:rPr lang="en-US" sz="1600" b="1" kern="0" dirty="0" smtClean="0">
-                <a:solidFill>
-                  <a:srgbClr val="7F0055"/>
-                </a:solidFill>
-                <a:latin typeface="Consolas" panose="020B0609020204030204" pitchFamily="49" charset="0"/>
-                <a:cs typeface="Consolas" panose="020B0609020204030204" pitchFamily="49" charset="0"/>
-              </a:rPr>
-              <a:t>return</a:t>
-            </a:r>
-            <a:r>
-              <a:rPr lang="en-US" sz="1600" b="1" kern="0" dirty="0" smtClean="0">
-                <a:solidFill>
-                  <a:srgbClr val="000000"/>
-                </a:solidFill>
-                <a:latin typeface="Consolas" panose="020B0609020204030204" pitchFamily="49" charset="0"/>
-                <a:cs typeface="Consolas" panose="020B0609020204030204" pitchFamily="49" charset="0"/>
-              </a:rPr>
-              <a:t> -13;</a:t>
-            </a:r>
-          </a:p>
-          <a:p>
-            <a:pPr defTabSz="914400">
-              <a:lnSpc>
-                <a:spcPct val="100000"/>
-              </a:lnSpc>
-              <a:buClrTx/>
-              <a:buSzTx/>
-              <a:tabLst>
-                <a:tab pos="533400" algn="l"/>
-              </a:tabLst>
-            </a:pPr>
-            <a:r>
-              <a:rPr lang="en-US" sz="1600" kern="0" dirty="0" smtClean="0">
-                <a:solidFill>
-                  <a:srgbClr val="000000"/>
-                </a:solidFill>
-                <a:latin typeface="Consolas" panose="020B0609020204030204" pitchFamily="49" charset="0"/>
-                <a:cs typeface="Consolas" panose="020B0609020204030204" pitchFamily="49" charset="0"/>
-              </a:rPr>
-              <a:t>}</a:t>
-            </a:r>
-          </a:p>
-          <a:p>
-            <a:pPr defTabSz="914400">
-              <a:lnSpc>
-                <a:spcPct val="100000"/>
-              </a:lnSpc>
-              <a:buClrTx/>
-              <a:buSzTx/>
-              <a:tabLst>
-                <a:tab pos="533400" algn="l"/>
-              </a:tabLst>
-            </a:pPr>
-            <a:endParaRPr lang="en-US" sz="1600" kern="0" dirty="0" smtClean="0">
-              <a:latin typeface="Consolas" panose="020B0609020204030204" pitchFamily="49" charset="0"/>
-              <a:cs typeface="Consolas" panose="020B0609020204030204" pitchFamily="49" charset="0"/>
-            </a:endParaRPr>
-          </a:p>
-          <a:p>
-            <a:pPr defTabSz="914400">
-              <a:lnSpc>
-                <a:spcPct val="100000"/>
-              </a:lnSpc>
-              <a:buClrTx/>
-              <a:buSzTx/>
-              <a:tabLst>
-                <a:tab pos="533400" algn="l"/>
-              </a:tabLst>
-            </a:pPr>
-            <a:r>
-              <a:rPr lang="en-US" sz="1600" b="1" kern="0" dirty="0" err="1" smtClean="0">
-                <a:solidFill>
-                  <a:srgbClr val="7F0055"/>
-                </a:solidFill>
-                <a:latin typeface="Consolas" panose="020B0609020204030204" pitchFamily="49" charset="0"/>
-                <a:cs typeface="Consolas" panose="020B0609020204030204" pitchFamily="49" charset="0"/>
-              </a:rPr>
-              <a:t>int</a:t>
-            </a:r>
-            <a:r>
-              <a:rPr lang="en-US" sz="1600" b="1" kern="0" dirty="0" smtClean="0">
-                <a:solidFill>
-                  <a:srgbClr val="000000"/>
-                </a:solidFill>
-                <a:latin typeface="Consolas" panose="020B0609020204030204" pitchFamily="49" charset="0"/>
-                <a:cs typeface="Consolas" panose="020B0609020204030204" pitchFamily="49" charset="0"/>
-              </a:rPr>
-              <a:t> main() {</a:t>
-            </a:r>
-          </a:p>
-          <a:p>
-            <a:pPr defTabSz="914400">
-              <a:lnSpc>
-                <a:spcPct val="100000"/>
-              </a:lnSpc>
-              <a:buClrTx/>
-              <a:buSzTx/>
-              <a:tabLst>
-                <a:tab pos="533400" algn="l"/>
-              </a:tabLst>
-            </a:pPr>
-            <a:r>
-              <a:rPr lang="en-US" sz="1600" kern="0" dirty="0" smtClean="0">
-                <a:solidFill>
-                  <a:srgbClr val="000000"/>
-                </a:solidFill>
-                <a:latin typeface="Consolas" panose="020B0609020204030204" pitchFamily="49" charset="0"/>
-                <a:cs typeface="Consolas" panose="020B0609020204030204" pitchFamily="49" charset="0"/>
-              </a:rPr>
-              <a:t>	</a:t>
-            </a:r>
-            <a:r>
-              <a:rPr lang="en-US" sz="1600" b="1" dirty="0" err="1" smtClean="0">
-                <a:solidFill>
-                  <a:srgbClr val="7F0055"/>
-                </a:solidFill>
-                <a:latin typeface="Consolas" panose="020B0609020204030204" pitchFamily="49" charset="0"/>
-                <a:cs typeface="Consolas" panose="020B0609020204030204" pitchFamily="49" charset="0"/>
-              </a:rPr>
-              <a:t>int</a:t>
-            </a:r>
-            <a:r>
-              <a:rPr lang="en-US" sz="1600" b="1" dirty="0" smtClean="0">
-                <a:solidFill>
-                  <a:srgbClr val="000000"/>
-                </a:solidFill>
-                <a:latin typeface="Consolas" panose="020B0609020204030204" pitchFamily="49" charset="0"/>
-                <a:cs typeface="Consolas" panose="020B0609020204030204" pitchFamily="49" charset="0"/>
-              </a:rPr>
-              <a:t> </a:t>
-            </a:r>
-            <a:r>
-              <a:rPr lang="en-US" sz="1600" b="1" dirty="0" err="1" smtClean="0">
-                <a:solidFill>
-                  <a:srgbClr val="0000C0"/>
-                </a:solidFill>
-                <a:latin typeface="Consolas" panose="020B0609020204030204" pitchFamily="49" charset="0"/>
-                <a:cs typeface="Consolas" panose="020B0609020204030204" pitchFamily="49" charset="0"/>
-              </a:rPr>
-              <a:t>i</a:t>
-            </a:r>
-            <a:r>
-              <a:rPr lang="en-US" sz="1600" b="1" dirty="0" smtClean="0">
-                <a:solidFill>
-                  <a:srgbClr val="0000C0"/>
-                </a:solidFill>
-                <a:latin typeface="Consolas" panose="020B0609020204030204" pitchFamily="49" charset="0"/>
-                <a:cs typeface="Consolas" panose="020B0609020204030204" pitchFamily="49" charset="0"/>
-              </a:rPr>
-              <a:t> = </a:t>
-            </a:r>
-            <a:r>
-              <a:rPr lang="en-US" sz="1600" kern="0" dirty="0" err="1" smtClean="0">
-                <a:solidFill>
-                  <a:srgbClr val="000000"/>
-                </a:solidFill>
-                <a:latin typeface="Consolas" panose="020B0609020204030204" pitchFamily="49" charset="0"/>
-                <a:cs typeface="Consolas" panose="020B0609020204030204" pitchFamily="49" charset="0"/>
-              </a:rPr>
-              <a:t>myFunction</a:t>
-            </a:r>
-            <a:r>
-              <a:rPr lang="en-US" sz="1600" kern="0" dirty="0" smtClean="0">
-                <a:solidFill>
-                  <a:srgbClr val="000000"/>
-                </a:solidFill>
-                <a:latin typeface="Consolas" panose="020B0609020204030204" pitchFamily="49" charset="0"/>
-                <a:cs typeface="Consolas" panose="020B0609020204030204" pitchFamily="49" charset="0"/>
-              </a:rPr>
-              <a:t>(3);</a:t>
-            </a:r>
-            <a:endParaRPr lang="en-US" sz="1600" kern="0" dirty="0" smtClean="0">
-              <a:latin typeface="Consolas" panose="020B0609020204030204" pitchFamily="49" charset="0"/>
-              <a:cs typeface="Consolas" panose="020B0609020204030204" pitchFamily="49" charset="0"/>
-            </a:endParaRPr>
-          </a:p>
-          <a:p>
-            <a:pPr defTabSz="914400">
-              <a:lnSpc>
-                <a:spcPct val="100000"/>
-              </a:lnSpc>
-              <a:buClrTx/>
-              <a:buSzTx/>
-              <a:tabLst>
-                <a:tab pos="533400" algn="l"/>
-              </a:tabLst>
-            </a:pPr>
-            <a:r>
-              <a:rPr lang="en-US" sz="1600" b="1" kern="0" dirty="0" smtClean="0">
-                <a:solidFill>
-                  <a:srgbClr val="7F0055"/>
-                </a:solidFill>
-                <a:latin typeface="Consolas" panose="020B0609020204030204" pitchFamily="49" charset="0"/>
-                <a:cs typeface="Consolas" panose="020B0609020204030204" pitchFamily="49" charset="0"/>
-              </a:rPr>
-              <a:t>	return</a:t>
-            </a:r>
-            <a:r>
-              <a:rPr lang="en-US" sz="1600" b="1" kern="0" dirty="0" smtClean="0">
-                <a:solidFill>
-                  <a:srgbClr val="000000"/>
-                </a:solidFill>
-                <a:latin typeface="Consolas" panose="020B0609020204030204" pitchFamily="49" charset="0"/>
-                <a:cs typeface="Consolas" panose="020B0609020204030204" pitchFamily="49" charset="0"/>
-              </a:rPr>
-              <a:t> 0;</a:t>
-            </a:r>
-          </a:p>
-          <a:p>
-            <a:pPr defTabSz="914400">
-              <a:lnSpc>
-                <a:spcPct val="100000"/>
-              </a:lnSpc>
-              <a:buClrTx/>
-              <a:buSzTx/>
-              <a:tabLst>
-                <a:tab pos="533400" algn="l"/>
-              </a:tabLst>
-            </a:pPr>
-            <a:r>
-              <a:rPr lang="en-US" sz="1600" kern="0" dirty="0" smtClean="0">
-                <a:solidFill>
-                  <a:srgbClr val="000000"/>
-                </a:solidFill>
-                <a:latin typeface="Consolas" panose="020B0609020204030204" pitchFamily="49" charset="0"/>
-                <a:cs typeface="Consolas" panose="020B0609020204030204" pitchFamily="49" charset="0"/>
-              </a:rPr>
-              <a:t>}</a:t>
-            </a:r>
-          </a:p>
-          <a:p>
-            <a:pPr defTabSz="914400">
-              <a:lnSpc>
-                <a:spcPct val="100000"/>
-              </a:lnSpc>
-              <a:buClrTx/>
-              <a:buSzTx/>
-              <a:tabLst>
-                <a:tab pos="533400" algn="l"/>
-              </a:tabLst>
-            </a:pPr>
-            <a:endParaRPr lang="en-US" sz="1600" kern="0" dirty="0">
-              <a:latin typeface="Consolas" panose="020B0609020204030204" pitchFamily="49" charset="0"/>
-              <a:cs typeface="Consolas" panose="020B0609020204030204" pitchFamily="49" charset="0"/>
-            </a:endParaRPr>
+            <a:endParaRPr lang="en-US"/>
           </a:p>
         </p:txBody>
       </p:sp>
@@ -9978,294 +8465,10 @@
               <a:buFont typeface="Wingdings" panose="05000000000000000000" pitchFamily="2" charset="2"/>
               <a:buChar char="§"/>
             </a:pPr>
-            <a:r>
-              <a:rPr lang="en-US" b="1" dirty="0" err="1" smtClean="0"/>
-              <a:t>Schalter</a:t>
-            </a:r>
-            <a:r>
-              <a:rPr lang="en-US" b="1" dirty="0" smtClean="0"/>
-              <a:t>-Score</a:t>
-            </a:r>
-            <a:r>
-              <a:rPr lang="en-US" dirty="0" smtClean="0"/>
-              <a:t> Tag 4: </a:t>
-            </a:r>
-            <a:r>
-              <a:rPr lang="en-US" sz="3600" b="1" dirty="0" smtClean="0"/>
-              <a:t>4</a:t>
-            </a:r>
-            <a:r>
-              <a:rPr lang="en-US" dirty="0" smtClean="0"/>
-              <a:t/>
-            </a:r>
-            <a:br>
-              <a:rPr lang="en-US" dirty="0" smtClean="0"/>
-            </a:br>
-            <a:r>
-              <a:rPr lang="en-US" dirty="0" smtClean="0"/>
-              <a:t/>
-            </a:r>
-            <a:br>
-              <a:rPr lang="en-US" dirty="0" smtClean="0"/>
-            </a:br>
-            <a:r>
-              <a:rPr lang="en-US" dirty="0" smtClean="0"/>
-              <a:t/>
-            </a:r>
-            <a:br>
-              <a:rPr lang="en-US" dirty="0" smtClean="0"/>
-            </a:br>
-            <a:r>
-              <a:rPr lang="en-US" dirty="0" smtClean="0"/>
-              <a:t/>
-            </a:r>
-            <a:br>
-              <a:rPr lang="en-US" dirty="0" smtClean="0"/>
-            </a:br>
-            <a:endParaRPr lang="en-US" dirty="0" smtClean="0"/>
-          </a:p>
-          <a:p>
-            <a:pPr marL="342900" indent="-342900">
-              <a:buFont typeface="Wingdings" panose="05000000000000000000" pitchFamily="2" charset="2"/>
-              <a:buChar char="§"/>
-            </a:pPr>
-            <a:r>
-              <a:rPr lang="en-US" dirty="0" err="1" smtClean="0"/>
-              <a:t>Empfohlener</a:t>
-            </a:r>
-            <a:r>
-              <a:rPr lang="en-US" dirty="0" smtClean="0"/>
-              <a:t> </a:t>
-            </a:r>
-            <a:r>
-              <a:rPr lang="en-US" dirty="0" err="1" smtClean="0"/>
-              <a:t>Artikel</a:t>
-            </a:r>
-            <a:r>
-              <a:rPr lang="en-US" dirty="0" smtClean="0"/>
-              <a:t> </a:t>
-            </a:r>
-            <a:r>
-              <a:rPr lang="en-US" dirty="0" err="1" smtClean="0"/>
-              <a:t>zur</a:t>
-            </a:r>
-            <a:r>
-              <a:rPr lang="en-US" dirty="0" smtClean="0"/>
-              <a:t> </a:t>
-            </a:r>
-            <a:r>
-              <a:rPr lang="en-US" b="1" dirty="0" err="1" smtClean="0"/>
-              <a:t>Const</a:t>
-            </a:r>
-            <a:r>
-              <a:rPr lang="en-US" b="1" dirty="0" smtClean="0"/>
-              <a:t> Correctness</a:t>
-            </a:r>
-            <a:r>
-              <a:rPr lang="en-US" dirty="0" smtClean="0"/>
-              <a:t>:</a:t>
-            </a:r>
-          </a:p>
-          <a:p>
-            <a:pPr marL="692150" lvl="1" indent="-342900"/>
-            <a:r>
-              <a:rPr lang="en-US" dirty="0" smtClean="0">
-                <a:hlinkClick r:id="rId2"/>
-              </a:rPr>
-              <a:t>https</a:t>
-            </a:r>
-            <a:r>
-              <a:rPr lang="en-US" dirty="0">
-                <a:hlinkClick r:id="rId2"/>
-              </a:rPr>
-              <a:t>://</a:t>
-            </a:r>
-            <a:r>
-              <a:rPr lang="en-US" dirty="0" smtClean="0">
-                <a:hlinkClick r:id="rId2"/>
-              </a:rPr>
-              <a:t>isocpp.org/wiki/faq/const-correctness</a:t>
-            </a:r>
-            <a:r>
-              <a:rPr lang="en-US" dirty="0" smtClean="0"/>
-              <a:t> </a:t>
-            </a:r>
-          </a:p>
-          <a:p>
-            <a:pPr marL="692150" lvl="1" indent="-342900"/>
-            <a:r>
-              <a:rPr lang="en-US" dirty="0" err="1" smtClean="0"/>
-              <a:t>Allgemein</a:t>
-            </a:r>
-            <a:r>
-              <a:rPr lang="en-US" dirty="0" smtClean="0"/>
-              <a:t>: </a:t>
-            </a:r>
-            <a:r>
-              <a:rPr lang="en-US" dirty="0" err="1" smtClean="0"/>
-              <a:t>sehr</a:t>
-            </a:r>
-            <a:r>
-              <a:rPr lang="en-US" dirty="0" smtClean="0"/>
-              <a:t> </a:t>
-            </a:r>
-            <a:r>
-              <a:rPr lang="en-US" dirty="0" err="1" smtClean="0"/>
-              <a:t>interessante</a:t>
-            </a:r>
-            <a:r>
-              <a:rPr lang="en-US" dirty="0" smtClean="0"/>
-              <a:t> </a:t>
-            </a:r>
-            <a:r>
-              <a:rPr lang="en-US" dirty="0" err="1" smtClean="0"/>
-              <a:t>Artikel</a:t>
-            </a:r>
-            <a:r>
-              <a:rPr lang="en-US" dirty="0" smtClean="0"/>
-              <a:t> in </a:t>
-            </a:r>
-            <a:r>
-              <a:rPr lang="en-US" dirty="0" err="1" smtClean="0"/>
-              <a:t>diesem</a:t>
-            </a:r>
-            <a:r>
-              <a:rPr lang="en-US" dirty="0" smtClean="0"/>
-              <a:t> Wiki!</a:t>
-            </a:r>
-            <a:r>
-              <a:rPr lang="en-US" dirty="0"/>
-              <a:t/>
-            </a:r>
-            <a:br>
-              <a:rPr lang="en-US" dirty="0"/>
-            </a:br>
-            <a:r>
-              <a:rPr lang="en-US" dirty="0" smtClean="0"/>
-              <a:t/>
-            </a:r>
-            <a:br>
-              <a:rPr lang="en-US" dirty="0" smtClean="0"/>
-            </a:br>
-            <a:r>
-              <a:rPr lang="en-US" dirty="0" smtClean="0"/>
-              <a:t/>
-            </a:r>
-            <a:br>
-              <a:rPr lang="en-US" dirty="0" smtClean="0"/>
-            </a:br>
-            <a:endParaRPr lang="en-US" dirty="0" smtClean="0"/>
-          </a:p>
-          <a:p>
-            <a:pPr marL="342900" indent="-342900">
-              <a:buFont typeface="Wingdings" panose="05000000000000000000" pitchFamily="2" charset="2"/>
-              <a:buChar char="§"/>
-            </a:pPr>
-            <a:r>
-              <a:rPr lang="en-US" dirty="0" smtClean="0"/>
-              <a:t>Morgen: </a:t>
-            </a:r>
-            <a:r>
-              <a:rPr lang="en-US" b="1" dirty="0" err="1" smtClean="0"/>
-              <a:t>Gastvortrag</a:t>
-            </a:r>
-            <a:r>
-              <a:rPr lang="en-US" b="1" dirty="0" smtClean="0"/>
-              <a:t>, Evaluation</a:t>
-            </a:r>
-            <a:r>
-              <a:rPr lang="en-US" dirty="0" smtClean="0"/>
-              <a:t> </a:t>
-            </a:r>
-            <a:br>
-              <a:rPr lang="en-US" dirty="0" smtClean="0"/>
-            </a:br>
-            <a:r>
-              <a:rPr lang="en-US" dirty="0" smtClean="0"/>
-              <a:t>	und </a:t>
-            </a:r>
-            <a:r>
-              <a:rPr lang="en-US" b="1" dirty="0" smtClean="0"/>
-              <a:t>µC-</a:t>
-            </a:r>
-            <a:r>
-              <a:rPr lang="en-US" b="1" dirty="0" err="1" smtClean="0"/>
-              <a:t>Projekt</a:t>
-            </a:r>
             <a:endParaRPr lang="en-US" b="1" dirty="0" smtClean="0"/>
           </a:p>
         </p:txBody>
       </p:sp>
-      <p:pic>
-        <p:nvPicPr>
-          <p:cNvPr id="4" name="Grafik 3"/>
-          <p:cNvPicPr>
-            <a:picLocks noChangeAspect="1"/>
-          </p:cNvPicPr>
-          <p:nvPr/>
-        </p:nvPicPr>
-        <p:blipFill rotWithShape="1">
-          <a:blip r:embed="rId3" cstate="print">
-            <a:extLst>
-              <a:ext uri="{28A0092B-C50C-407E-A947-70E740481C1C}">
-                <a14:useLocalDpi xmlns:a14="http://schemas.microsoft.com/office/drawing/2010/main" val="0"/>
-              </a:ext>
-            </a:extLst>
-          </a:blip>
-          <a:srcRect l="29525" t="17348" r="31100" b="8001"/>
-          <a:stretch/>
-        </p:blipFill>
-        <p:spPr>
-          <a:xfrm>
-            <a:off x="7308528" y="1561081"/>
-            <a:ext cx="1295449" cy="1381556"/>
-          </a:xfrm>
-          <a:prstGeom prst="rect">
-            <a:avLst/>
-          </a:prstGeom>
-        </p:spPr>
-      </p:pic>
-      <p:pic>
-        <p:nvPicPr>
-          <p:cNvPr id="2050" name="Picture 2" descr="http://classicgaming.cc/classics/asteroids/wallpaper/ast_scrshot_800x600.gif"/>
-          <p:cNvPicPr>
-            <a:picLocks noChangeAspect="1" noChangeArrowheads="1"/>
-          </p:cNvPicPr>
-          <p:nvPr/>
-        </p:nvPicPr>
-        <p:blipFill>
-          <a:blip r:embed="rId4" cstate="print">
-            <a:extLst>
-              <a:ext uri="{28A0092B-C50C-407E-A947-70E740481C1C}">
-                <a14:useLocalDpi xmlns:a14="http://schemas.microsoft.com/office/drawing/2010/main" val="0"/>
-              </a:ext>
-            </a:extLst>
-          </a:blip>
-          <a:srcRect/>
-          <a:stretch>
-            <a:fillRect/>
-          </a:stretch>
-        </p:blipFill>
-        <p:spPr bwMode="auto">
-          <a:xfrm>
-            <a:off x="5867673" y="4400960"/>
-            <a:ext cx="2736304" cy="2052228"/>
-          </a:xfrm>
-          <a:prstGeom prst="rect">
-            <a:avLst/>
-          </a:prstGeom>
-          <a:noFill/>
-          <a:extLst>
-            <a:ext uri="{909E8E84-426E-40DD-AFC4-6F175D3DCCD1}">
-              <a14:hiddenFill xmlns:a14="http://schemas.microsoft.com/office/drawing/2010/main">
-                <a:solidFill>
-                  <a:srgbClr val="FFFFFF"/>
-                </a:solidFill>
-              </a14:hiddenFill>
-            </a:ext>
-          </a:extLst>
-        </p:spPr>
-      </p:pic>
     </p:spTree>
     <p:extLst>
       <p:ext uri="{BB962C8B-B14F-4D97-AF65-F5344CB8AC3E}">
@@ -10297,10 +8500,15 @@
                             </p:stCondLst>
                             <p:childTnLst>
                               <p:par>
-                                <p:cTn id="5" presetID="1" presetClass="entr" presetSubtype="0" fill="hold" grpId="0" nodeType="clickEffect">
+                                <p:cTn id="5" presetID="1" presetClass="entr" presetSubtype="0" fill="hold" grpId="0" nodeType="clickEffect" nodePh="1">
                                   <p:stCondLst>
                                     <p:cond delay="0"/>
                                   </p:stCondLst>
+                                  <p:endCondLst>
+                                    <p:cond evt="begin" delay="0">
+                                      <p:tn val="5"/>
+                                    </p:cond>
+                                  </p:endCondLst>
                                   <p:childTnLst>
                                     <p:set>
                                       <p:cBhvr>
@@ -10313,166 +8521,6 @@
                                           <p:spTgt spid="3">
                                             <p:txEl>
                                               <p:pRg st="0" end="0"/>
-                                            </p:txEl>
-                                          </p:spTgt>
-                                        </p:tgtEl>
-                                        <p:attrNameLst>
-                                          <p:attrName>style.visibility</p:attrName>
-                                        </p:attrNameLst>
-                                      </p:cBhvr>
-                                      <p:to>
-                                        <p:strVal val="visible"/>
-                                      </p:to>
-                                    </p:set>
-                                  </p:childTnLst>
-                                </p:cTn>
-                              </p:par>
-                            </p:childTnLst>
-                          </p:cTn>
-                        </p:par>
-                      </p:childTnLst>
-                    </p:cTn>
-                  </p:par>
-                  <p:par>
-                    <p:cTn id="7" fill="hold">
-                      <p:stCondLst>
-                        <p:cond delay="indefinite"/>
-                      </p:stCondLst>
-                      <p:childTnLst>
-                        <p:par>
-                          <p:cTn id="8" fill="hold">
-                            <p:stCondLst>
-                              <p:cond delay="0"/>
-                            </p:stCondLst>
-                            <p:childTnLst>
-                              <p:par>
-                                <p:cTn id="9" presetID="1" presetClass="entr" presetSubtype="0" fill="hold" grpId="0" nodeType="clickEffect">
-                                  <p:stCondLst>
-                                    <p:cond delay="0"/>
-                                  </p:stCondLst>
-                                  <p:childTnLst>
-                                    <p:set>
-                                      <p:cBhvr>
-                                        <p:cTn id="10" dur="1" fill="hold">
-                                          <p:stCondLst>
-                                            <p:cond delay="0"/>
-                                          </p:stCondLst>
-                                        </p:cTn>
-                                        <p:tgtEl>
-                                          <p:spTgt spid="3">
-                                            <p:txEl>
-                                              <p:pRg st="1" end="1"/>
-                                            </p:txEl>
-                                          </p:spTgt>
-                                        </p:tgtEl>
-                                        <p:attrNameLst>
-                                          <p:attrName>style.visibility</p:attrName>
-                                        </p:attrNameLst>
-                                      </p:cBhvr>
-                                      <p:to>
-                                        <p:strVal val="visible"/>
-                                      </p:to>
-                                    </p:set>
-                                  </p:childTnLst>
-                                </p:cTn>
-                              </p:par>
-                              <p:par>
-                                <p:cTn id="11" presetID="1" presetClass="entr" presetSubtype="0" fill="hold" grpId="0" nodeType="withEffect">
-                                  <p:stCondLst>
-                                    <p:cond delay="0"/>
-                                  </p:stCondLst>
-                                  <p:childTnLst>
-                                    <p:set>
-                                      <p:cBhvr>
-                                        <p:cTn id="12" dur="1" fill="hold">
-                                          <p:stCondLst>
-                                            <p:cond delay="0"/>
-                                          </p:stCondLst>
-                                        </p:cTn>
-                                        <p:tgtEl>
-                                          <p:spTgt spid="3">
-                                            <p:txEl>
-                                              <p:pRg st="2" end="2"/>
-                                            </p:txEl>
-                                          </p:spTgt>
-                                        </p:tgtEl>
-                                        <p:attrNameLst>
-                                          <p:attrName>style.visibility</p:attrName>
-                                        </p:attrNameLst>
-                                      </p:cBhvr>
-                                      <p:to>
-                                        <p:strVal val="visible"/>
-                                      </p:to>
-                                    </p:set>
-                                  </p:childTnLst>
-                                </p:cTn>
-                              </p:par>
-                              <p:par>
-                                <p:cTn id="13" presetID="1" presetClass="entr" presetSubtype="0" fill="hold" grpId="0" nodeType="withEffect">
-                                  <p:stCondLst>
-                                    <p:cond delay="0"/>
-                                  </p:stCondLst>
-                                  <p:childTnLst>
-                                    <p:set>
-                                      <p:cBhvr>
-                                        <p:cTn id="14" dur="1" fill="hold">
-                                          <p:stCondLst>
-                                            <p:cond delay="0"/>
-                                          </p:stCondLst>
-                                        </p:cTn>
-                                        <p:tgtEl>
-                                          <p:spTgt spid="3">
-                                            <p:txEl>
-                                              <p:pRg st="3" end="3"/>
-                                            </p:txEl>
-                                          </p:spTgt>
-                                        </p:tgtEl>
-                                        <p:attrNameLst>
-                                          <p:attrName>style.visibility</p:attrName>
-                                        </p:attrNameLst>
-                                      </p:cBhvr>
-                                      <p:to>
-                                        <p:strVal val="visible"/>
-                                      </p:to>
-                                    </p:set>
-                                  </p:childTnLst>
-                                </p:cTn>
-                              </p:par>
-                            </p:childTnLst>
-                          </p:cTn>
-                        </p:par>
-                      </p:childTnLst>
-                    </p:cTn>
-                  </p:par>
-                  <p:par>
-                    <p:cTn id="15" fill="hold">
-                      <p:stCondLst>
-                        <p:cond delay="indefinite"/>
-                      </p:stCondLst>
-                      <p:childTnLst>
-                        <p:par>
-                          <p:cTn id="16" fill="hold">
-                            <p:stCondLst>
-                              <p:cond delay="0"/>
-                            </p:stCondLst>
-                            <p:childTnLst>
-                              <p:par>
-                                <p:cTn id="17" presetID="1" presetClass="entr" presetSubtype="0" fill="hold" grpId="0" nodeType="clickEffect">
-                                  <p:stCondLst>
-                                    <p:cond delay="0"/>
-                                  </p:stCondLst>
-                                  <p:childTnLst>
-                                    <p:set>
-                                      <p:cBhvr>
-                                        <p:cTn id="18" dur="1" fill="hold">
-                                          <p:stCondLst>
-                                            <p:cond delay="0"/>
-                                          </p:stCondLst>
-                                        </p:cTn>
-                                        <p:tgtEl>
-                                          <p:spTgt spid="3">
-                                            <p:txEl>
-                                              <p:pRg st="4" end="4"/>
                                             </p:txEl>
                                           </p:spTgt>
                                         </p:tgtEl>
@@ -10581,1335 +8629,7 @@
           <a:bodyPr/>
           <a:lstStyle/>
           <a:p>
-            <a:r>
-              <a:rPr lang="en-US" b="1" dirty="0" smtClean="0"/>
-              <a:t>Der “to-the-right”-</a:t>
-            </a:r>
-            <a:r>
-              <a:rPr lang="en-US" b="1" dirty="0" err="1" smtClean="0"/>
-              <a:t>Stil</a:t>
-            </a:r>
-            <a:r>
-              <a:rPr lang="en-US" b="1" dirty="0" smtClean="0"/>
-              <a:t> </a:t>
-            </a:r>
-            <a:r>
-              <a:rPr lang="en-US" b="1" dirty="0" err="1" smtClean="0"/>
-              <a:t>für</a:t>
-            </a:r>
-            <a:r>
-              <a:rPr lang="en-US" b="1" dirty="0" smtClean="0"/>
-              <a:t> </a:t>
-            </a:r>
-            <a:r>
-              <a:rPr lang="en-US" b="1" dirty="0" err="1" smtClean="0"/>
-              <a:t>c</a:t>
-            </a:r>
-            <a:r>
-              <a:rPr lang="en-US" b="1" dirty="0" err="1" smtClean="0">
-                <a:latin typeface="Consolas" panose="020B0609020204030204" pitchFamily="49" charset="0"/>
-                <a:cs typeface="Consolas" panose="020B0609020204030204" pitchFamily="49" charset="0"/>
-              </a:rPr>
-              <a:t>onst</a:t>
-            </a:r>
             <a:endParaRPr lang="en-US" b="1" dirty="0">
-              <a:latin typeface="Consolas" panose="020B0609020204030204" pitchFamily="49" charset="0"/>
-              <a:cs typeface="Consolas" panose="020B0609020204030204" pitchFamily="49" charset="0"/>
-            </a:endParaRPr>
-          </a:p>
-        </p:txBody>
-      </p:sp>
-      <p:sp>
-        <p:nvSpPr>
-          <p:cNvPr id="4" name="Textfeld 3"/>
-          <p:cNvSpPr txBox="1"/>
-          <p:nvPr/>
-        </p:nvSpPr>
-        <p:spPr>
-          <a:xfrm>
-            <a:off x="250825" y="1916832"/>
-            <a:ext cx="7879080" cy="4500591"/>
-          </a:xfrm>
-          <a:prstGeom prst="rect">
-            <a:avLst/>
-          </a:prstGeom>
-          <a:noFill/>
-        </p:spPr>
-        <p:txBody>
-          <a:bodyPr wrap="none" rtlCol="0">
-            <a:spAutoFit/>
-          </a:bodyPr>
-          <a:lstStyle/>
-          <a:p>
-            <a:pPr algn="l">
-              <a:tabLst>
-                <a:tab pos="174625" algn="l"/>
-              </a:tabLst>
-            </a:pPr>
-            <a:r>
-              <a:rPr lang="en-US" sz="1400" b="1" dirty="0">
-                <a:solidFill>
-                  <a:srgbClr val="7F0055"/>
-                </a:solidFill>
-                <a:latin typeface="Consolas" panose="020B0609020204030204" pitchFamily="49" charset="0"/>
-                <a:cs typeface="Consolas" panose="020B0609020204030204" pitchFamily="49" charset="0"/>
-              </a:rPr>
-              <a:t>class</a:t>
-            </a:r>
-            <a:r>
-              <a:rPr lang="en-US" sz="1400" b="1" dirty="0">
-                <a:solidFill>
-                  <a:srgbClr val="000000"/>
-                </a:solidFill>
-                <a:latin typeface="Consolas" panose="020B0609020204030204" pitchFamily="49" charset="0"/>
-                <a:cs typeface="Consolas" panose="020B0609020204030204" pitchFamily="49" charset="0"/>
-              </a:rPr>
-              <a:t> </a:t>
-            </a:r>
-            <a:r>
-              <a:rPr lang="en-US" sz="1400" b="1" dirty="0">
-                <a:solidFill>
-                  <a:srgbClr val="005032"/>
-                </a:solidFill>
-                <a:latin typeface="Consolas" panose="020B0609020204030204" pitchFamily="49" charset="0"/>
-                <a:cs typeface="Consolas" panose="020B0609020204030204" pitchFamily="49" charset="0"/>
-              </a:rPr>
-              <a:t>C</a:t>
-            </a:r>
-            <a:r>
-              <a:rPr lang="en-US" sz="1400" b="1" dirty="0">
-                <a:solidFill>
-                  <a:srgbClr val="000000"/>
-                </a:solidFill>
-                <a:latin typeface="Consolas" panose="020B0609020204030204" pitchFamily="49" charset="0"/>
-                <a:cs typeface="Consolas" panose="020B0609020204030204" pitchFamily="49" charset="0"/>
-              </a:rPr>
-              <a:t> {</a:t>
-            </a:r>
-          </a:p>
-          <a:p>
-            <a:pPr algn="l">
-              <a:tabLst>
-                <a:tab pos="174625" algn="l"/>
-              </a:tabLst>
-            </a:pPr>
-            <a:r>
-              <a:rPr lang="en-US" sz="1400" b="1" dirty="0" smtClean="0">
-                <a:solidFill>
-                  <a:srgbClr val="7F0055"/>
-                </a:solidFill>
-                <a:latin typeface="Consolas" panose="020B0609020204030204" pitchFamily="49" charset="0"/>
-                <a:cs typeface="Consolas" panose="020B0609020204030204" pitchFamily="49" charset="0"/>
-              </a:rPr>
-              <a:t>	</a:t>
-            </a:r>
-            <a:r>
-              <a:rPr lang="en-US" sz="1400" b="1" dirty="0" err="1" smtClean="0">
-                <a:solidFill>
-                  <a:srgbClr val="7F0055"/>
-                </a:solidFill>
-                <a:latin typeface="Consolas" panose="020B0609020204030204" pitchFamily="49" charset="0"/>
-                <a:cs typeface="Consolas" panose="020B0609020204030204" pitchFamily="49" charset="0"/>
-              </a:rPr>
-              <a:t>int</a:t>
-            </a:r>
-            <a:r>
-              <a:rPr lang="en-US" sz="1400" b="1" dirty="0" smtClean="0">
-                <a:solidFill>
-                  <a:srgbClr val="000000"/>
-                </a:solidFill>
-                <a:latin typeface="Consolas" panose="020B0609020204030204" pitchFamily="49" charset="0"/>
-                <a:cs typeface="Consolas" panose="020B0609020204030204" pitchFamily="49" charset="0"/>
-              </a:rPr>
-              <a:t> </a:t>
-            </a:r>
-            <a:r>
-              <a:rPr lang="en-US" sz="1400" b="1" dirty="0">
-                <a:solidFill>
-                  <a:srgbClr val="000000"/>
-                </a:solidFill>
-                <a:latin typeface="Consolas" panose="020B0609020204030204" pitchFamily="49" charset="0"/>
-                <a:cs typeface="Consolas" panose="020B0609020204030204" pitchFamily="49" charset="0"/>
-              </a:rPr>
-              <a:t>inspect() </a:t>
-            </a:r>
-            <a:r>
-              <a:rPr lang="en-US" sz="1400" b="1" dirty="0" err="1">
-                <a:solidFill>
-                  <a:srgbClr val="7F0055"/>
-                </a:solidFill>
-                <a:latin typeface="Consolas" panose="020B0609020204030204" pitchFamily="49" charset="0"/>
-                <a:cs typeface="Consolas" panose="020B0609020204030204" pitchFamily="49" charset="0"/>
-              </a:rPr>
-              <a:t>const</a:t>
-            </a:r>
-            <a:r>
-              <a:rPr lang="en-US" sz="1400" b="1" dirty="0">
-                <a:solidFill>
-                  <a:srgbClr val="000000"/>
-                </a:solidFill>
-                <a:latin typeface="Consolas" panose="020B0609020204030204" pitchFamily="49" charset="0"/>
-                <a:cs typeface="Consolas" panose="020B0609020204030204" pitchFamily="49" charset="0"/>
-              </a:rPr>
-              <a:t>;</a:t>
-            </a:r>
-          </a:p>
-          <a:p>
-            <a:pPr algn="l">
-              <a:tabLst>
-                <a:tab pos="174625" algn="l"/>
-              </a:tabLst>
-            </a:pPr>
-            <a:r>
-              <a:rPr lang="en-US" sz="1400" dirty="0">
-                <a:solidFill>
-                  <a:srgbClr val="000000"/>
-                </a:solidFill>
-                <a:latin typeface="Consolas" panose="020B0609020204030204" pitchFamily="49" charset="0"/>
-                <a:cs typeface="Consolas" panose="020B0609020204030204" pitchFamily="49" charset="0"/>
-              </a:rPr>
-              <a:t>};</a:t>
-            </a:r>
-          </a:p>
-          <a:p>
-            <a:pPr lvl="1" algn="l">
-              <a:tabLst>
-                <a:tab pos="174625" algn="l"/>
-              </a:tabLst>
-            </a:pPr>
-            <a:endParaRPr lang="en-US" sz="1400" dirty="0" smtClean="0">
-              <a:latin typeface="Consolas" panose="020B0609020204030204" pitchFamily="49" charset="0"/>
-              <a:cs typeface="Consolas" panose="020B0609020204030204" pitchFamily="49" charset="0"/>
-            </a:endParaRPr>
-          </a:p>
-          <a:p>
-            <a:pPr algn="l">
-              <a:tabLst>
-                <a:tab pos="174625" algn="l"/>
-              </a:tabLst>
-            </a:pPr>
-            <a:r>
-              <a:rPr lang="en-US" sz="1400" b="1" dirty="0" err="1" smtClean="0">
-                <a:solidFill>
-                  <a:srgbClr val="7F0055"/>
-                </a:solidFill>
-                <a:latin typeface="Consolas" panose="020B0609020204030204" pitchFamily="49" charset="0"/>
-                <a:cs typeface="Consolas" panose="020B0609020204030204" pitchFamily="49" charset="0"/>
-              </a:rPr>
-              <a:t>int</a:t>
-            </a:r>
-            <a:r>
-              <a:rPr lang="en-US" sz="1400" b="1" dirty="0" smtClean="0">
-                <a:solidFill>
-                  <a:srgbClr val="000000"/>
-                </a:solidFill>
-                <a:latin typeface="Consolas" panose="020B0609020204030204" pitchFamily="49" charset="0"/>
-                <a:cs typeface="Consolas" panose="020B0609020204030204" pitchFamily="49" charset="0"/>
-              </a:rPr>
-              <a:t> </a:t>
-            </a:r>
-            <a:r>
-              <a:rPr lang="en-US" sz="1400" b="1" dirty="0">
-                <a:solidFill>
-                  <a:srgbClr val="000000"/>
-                </a:solidFill>
-                <a:latin typeface="Consolas" panose="020B0609020204030204" pitchFamily="49" charset="0"/>
-                <a:cs typeface="Consolas" panose="020B0609020204030204" pitchFamily="49" charset="0"/>
-              </a:rPr>
-              <a:t>main(</a:t>
-            </a:r>
-            <a:r>
-              <a:rPr lang="en-US" sz="1400" b="1" dirty="0" err="1">
-                <a:solidFill>
-                  <a:srgbClr val="7F0055"/>
-                </a:solidFill>
-                <a:latin typeface="Consolas" panose="020B0609020204030204" pitchFamily="49" charset="0"/>
-                <a:cs typeface="Consolas" panose="020B0609020204030204" pitchFamily="49" charset="0"/>
-              </a:rPr>
-              <a:t>int</a:t>
-            </a:r>
-            <a:r>
-              <a:rPr lang="en-US" sz="1400" b="1" dirty="0">
-                <a:solidFill>
-                  <a:srgbClr val="000000"/>
-                </a:solidFill>
-                <a:latin typeface="Consolas" panose="020B0609020204030204" pitchFamily="49" charset="0"/>
-                <a:cs typeface="Consolas" panose="020B0609020204030204" pitchFamily="49" charset="0"/>
-              </a:rPr>
-              <a:t> </a:t>
-            </a:r>
-            <a:r>
-              <a:rPr lang="en-US" sz="1400" b="1" dirty="0" err="1">
-                <a:solidFill>
-                  <a:srgbClr val="000000"/>
-                </a:solidFill>
-                <a:latin typeface="Consolas" panose="020B0609020204030204" pitchFamily="49" charset="0"/>
-                <a:cs typeface="Consolas" panose="020B0609020204030204" pitchFamily="49" charset="0"/>
-              </a:rPr>
-              <a:t>argc</a:t>
-            </a:r>
-            <a:r>
-              <a:rPr lang="en-US" sz="1400" b="1" dirty="0">
-                <a:solidFill>
-                  <a:srgbClr val="000000"/>
-                </a:solidFill>
-                <a:latin typeface="Consolas" panose="020B0609020204030204" pitchFamily="49" charset="0"/>
-                <a:cs typeface="Consolas" panose="020B0609020204030204" pitchFamily="49" charset="0"/>
-              </a:rPr>
-              <a:t>, </a:t>
-            </a:r>
-            <a:r>
-              <a:rPr lang="en-US" sz="1400" b="1" dirty="0">
-                <a:solidFill>
-                  <a:srgbClr val="7F0055"/>
-                </a:solidFill>
-                <a:latin typeface="Consolas" panose="020B0609020204030204" pitchFamily="49" charset="0"/>
-                <a:cs typeface="Consolas" panose="020B0609020204030204" pitchFamily="49" charset="0"/>
-              </a:rPr>
-              <a:t>char</a:t>
-            </a:r>
-            <a:r>
-              <a:rPr lang="en-US" sz="1400" b="1" dirty="0">
-                <a:solidFill>
-                  <a:srgbClr val="000000"/>
-                </a:solidFill>
-                <a:latin typeface="Consolas" panose="020B0609020204030204" pitchFamily="49" charset="0"/>
-                <a:cs typeface="Consolas" panose="020B0609020204030204" pitchFamily="49" charset="0"/>
-              </a:rPr>
-              <a:t>** </a:t>
-            </a:r>
-            <a:r>
-              <a:rPr lang="en-US" sz="1400" b="1" dirty="0" err="1">
-                <a:solidFill>
-                  <a:srgbClr val="000000"/>
-                </a:solidFill>
-                <a:latin typeface="Consolas" panose="020B0609020204030204" pitchFamily="49" charset="0"/>
-                <a:cs typeface="Consolas" panose="020B0609020204030204" pitchFamily="49" charset="0"/>
-              </a:rPr>
-              <a:t>argv</a:t>
-            </a:r>
-            <a:r>
-              <a:rPr lang="en-US" sz="1400" b="1" dirty="0">
-                <a:solidFill>
-                  <a:srgbClr val="000000"/>
-                </a:solidFill>
-                <a:latin typeface="Consolas" panose="020B0609020204030204" pitchFamily="49" charset="0"/>
-                <a:cs typeface="Consolas" panose="020B0609020204030204" pitchFamily="49" charset="0"/>
-              </a:rPr>
-              <a:t>) {</a:t>
-            </a:r>
-          </a:p>
-          <a:p>
-            <a:pPr algn="l">
-              <a:tabLst>
-                <a:tab pos="174625" algn="l"/>
-              </a:tabLst>
-            </a:pPr>
-            <a:r>
-              <a:rPr lang="en-US" sz="1400" b="1" dirty="0" smtClean="0">
-                <a:solidFill>
-                  <a:srgbClr val="7F0055"/>
-                </a:solidFill>
-                <a:latin typeface="Consolas" panose="020B0609020204030204" pitchFamily="49" charset="0"/>
-                <a:cs typeface="Consolas" panose="020B0609020204030204" pitchFamily="49" charset="0"/>
-              </a:rPr>
-              <a:t>	</a:t>
-            </a:r>
-            <a:br>
-              <a:rPr lang="en-US" sz="1400" b="1" dirty="0" smtClean="0">
-                <a:solidFill>
-                  <a:srgbClr val="7F0055"/>
-                </a:solidFill>
-                <a:latin typeface="Consolas" panose="020B0609020204030204" pitchFamily="49" charset="0"/>
-                <a:cs typeface="Consolas" panose="020B0609020204030204" pitchFamily="49" charset="0"/>
-              </a:rPr>
-            </a:br>
-            <a:r>
-              <a:rPr lang="en-US" sz="1400" b="1" dirty="0" err="1" smtClean="0">
-                <a:solidFill>
-                  <a:srgbClr val="7F0055"/>
-                </a:solidFill>
-                <a:latin typeface="Consolas" panose="020B0609020204030204" pitchFamily="49" charset="0"/>
-                <a:cs typeface="Consolas" panose="020B0609020204030204" pitchFamily="49" charset="0"/>
-              </a:rPr>
-              <a:t>int</a:t>
-            </a:r>
-            <a:r>
-              <a:rPr lang="en-US" sz="1400" b="1" dirty="0" smtClean="0">
-                <a:solidFill>
-                  <a:srgbClr val="000000"/>
-                </a:solidFill>
-                <a:latin typeface="Consolas" panose="020B0609020204030204" pitchFamily="49" charset="0"/>
-                <a:cs typeface="Consolas" panose="020B0609020204030204" pitchFamily="49" charset="0"/>
-              </a:rPr>
-              <a:t> </a:t>
-            </a:r>
-            <a:r>
-              <a:rPr lang="en-US" sz="1400" b="1" dirty="0" err="1">
-                <a:solidFill>
-                  <a:srgbClr val="7F0055"/>
-                </a:solidFill>
-                <a:latin typeface="Consolas" panose="020B0609020204030204" pitchFamily="49" charset="0"/>
-                <a:cs typeface="Consolas" panose="020B0609020204030204" pitchFamily="49" charset="0"/>
-              </a:rPr>
-              <a:t>const</a:t>
-            </a:r>
-            <a:r>
-              <a:rPr lang="en-US" sz="1400" b="1" dirty="0">
-                <a:solidFill>
-                  <a:srgbClr val="000000"/>
-                </a:solidFill>
-                <a:latin typeface="Consolas" panose="020B0609020204030204" pitchFamily="49" charset="0"/>
-                <a:cs typeface="Consolas" panose="020B0609020204030204" pitchFamily="49" charset="0"/>
-              </a:rPr>
-              <a:t> j = 3</a:t>
-            </a:r>
-            <a:r>
-              <a:rPr lang="en-US" sz="1400" b="1" dirty="0" smtClean="0">
-                <a:solidFill>
-                  <a:srgbClr val="000000"/>
-                </a:solidFill>
-                <a:latin typeface="Consolas" panose="020B0609020204030204" pitchFamily="49" charset="0"/>
-                <a:cs typeface="Consolas" panose="020B0609020204030204" pitchFamily="49" charset="0"/>
-              </a:rPr>
-              <a:t>;			</a:t>
-            </a:r>
-            <a:r>
-              <a:rPr lang="en-US" sz="1400" dirty="0">
-                <a:solidFill>
-                  <a:srgbClr val="3F7F5F"/>
-                </a:solidFill>
-                <a:latin typeface="Consolas" panose="020B0609020204030204" pitchFamily="49" charset="0"/>
-                <a:cs typeface="Consolas" panose="020B0609020204030204" pitchFamily="49" charset="0"/>
-              </a:rPr>
-              <a:t>// </a:t>
-            </a:r>
-            <a:r>
-              <a:rPr lang="en-US" sz="1400" dirty="0" smtClean="0">
-                <a:solidFill>
-                  <a:srgbClr val="3F7F5F"/>
-                </a:solidFill>
-                <a:latin typeface="Consolas" panose="020B0609020204030204" pitchFamily="49" charset="0"/>
-                <a:cs typeface="Consolas" panose="020B0609020204030204" pitchFamily="49" charset="0"/>
-              </a:rPr>
-              <a:t>equiv. to </a:t>
-            </a:r>
-            <a:r>
-              <a:rPr lang="en-US" sz="1400" dirty="0" err="1" smtClean="0">
-                <a:solidFill>
-                  <a:srgbClr val="3F7F5F"/>
-                </a:solidFill>
-                <a:latin typeface="Consolas" panose="020B0609020204030204" pitchFamily="49" charset="0"/>
-                <a:cs typeface="Consolas" panose="020B0609020204030204" pitchFamily="49" charset="0"/>
-              </a:rPr>
-              <a:t>const</a:t>
-            </a:r>
-            <a:r>
-              <a:rPr lang="en-US" sz="1400" dirty="0" smtClean="0">
-                <a:solidFill>
-                  <a:srgbClr val="3F7F5F"/>
-                </a:solidFill>
-                <a:latin typeface="Consolas" panose="020B0609020204030204" pitchFamily="49" charset="0"/>
-                <a:cs typeface="Consolas" panose="020B0609020204030204" pitchFamily="49" charset="0"/>
-              </a:rPr>
-              <a:t> </a:t>
-            </a:r>
-            <a:r>
-              <a:rPr lang="en-US" sz="1400" dirty="0" err="1" smtClean="0">
-                <a:solidFill>
-                  <a:srgbClr val="3F7F5F"/>
-                </a:solidFill>
-                <a:latin typeface="Consolas" panose="020B0609020204030204" pitchFamily="49" charset="0"/>
-                <a:cs typeface="Consolas" panose="020B0609020204030204" pitchFamily="49" charset="0"/>
-              </a:rPr>
-              <a:t>int</a:t>
-            </a:r>
-            <a:r>
-              <a:rPr lang="en-US" sz="1400" dirty="0" smtClean="0">
-                <a:solidFill>
-                  <a:srgbClr val="3F7F5F"/>
-                </a:solidFill>
-                <a:latin typeface="Consolas" panose="020B0609020204030204" pitchFamily="49" charset="0"/>
-                <a:cs typeface="Consolas" panose="020B0609020204030204" pitchFamily="49" charset="0"/>
-              </a:rPr>
-              <a:t> j = 3;</a:t>
-            </a:r>
-            <a:endParaRPr lang="en-US" sz="1400" b="1" dirty="0">
-              <a:solidFill>
-                <a:srgbClr val="000000"/>
-              </a:solidFill>
-              <a:latin typeface="Consolas" panose="020B0609020204030204" pitchFamily="49" charset="0"/>
-              <a:cs typeface="Consolas" panose="020B0609020204030204" pitchFamily="49" charset="0"/>
-            </a:endParaRPr>
-          </a:p>
-          <a:p>
-            <a:pPr algn="l">
-              <a:tabLst>
-                <a:tab pos="174625" algn="l"/>
-              </a:tabLst>
-            </a:pPr>
-            <a:endParaRPr lang="en-US" sz="1400" dirty="0">
-              <a:latin typeface="Consolas" panose="020B0609020204030204" pitchFamily="49" charset="0"/>
-              <a:cs typeface="Consolas" panose="020B0609020204030204" pitchFamily="49" charset="0"/>
-            </a:endParaRPr>
-          </a:p>
-          <a:p>
-            <a:pPr algn="l">
-              <a:tabLst>
-                <a:tab pos="174625" algn="l"/>
-              </a:tabLst>
-            </a:pPr>
-            <a:r>
-              <a:rPr lang="en-US" sz="1400" b="1" dirty="0" smtClean="0">
-                <a:solidFill>
-                  <a:srgbClr val="7F0055"/>
-                </a:solidFill>
-                <a:latin typeface="Consolas" panose="020B0609020204030204" pitchFamily="49" charset="0"/>
-                <a:cs typeface="Consolas" panose="020B0609020204030204" pitchFamily="49" charset="0"/>
-              </a:rPr>
-              <a:t>	</a:t>
-            </a:r>
-            <a:r>
-              <a:rPr lang="en-US" sz="1400" b="1" dirty="0" err="1" smtClean="0">
-                <a:solidFill>
-                  <a:srgbClr val="7F0055"/>
-                </a:solidFill>
-                <a:latin typeface="Consolas" panose="020B0609020204030204" pitchFamily="49" charset="0"/>
-                <a:cs typeface="Consolas" panose="020B0609020204030204" pitchFamily="49" charset="0"/>
-              </a:rPr>
-              <a:t>int</a:t>
-            </a:r>
-            <a:r>
-              <a:rPr lang="en-US" sz="1400" b="1" dirty="0" smtClean="0">
-                <a:solidFill>
-                  <a:srgbClr val="000000"/>
-                </a:solidFill>
-                <a:latin typeface="Consolas" panose="020B0609020204030204" pitchFamily="49" charset="0"/>
-                <a:cs typeface="Consolas" panose="020B0609020204030204" pitchFamily="49" charset="0"/>
-              </a:rPr>
-              <a:t> </a:t>
-            </a:r>
-            <a:r>
-              <a:rPr lang="en-US" sz="1400" b="1" dirty="0">
-                <a:solidFill>
-                  <a:srgbClr val="000000"/>
-                </a:solidFill>
-                <a:latin typeface="Consolas" panose="020B0609020204030204" pitchFamily="49" charset="0"/>
-                <a:cs typeface="Consolas" panose="020B0609020204030204" pitchFamily="49" charset="0"/>
-              </a:rPr>
-              <a:t>k = 3;</a:t>
-            </a:r>
-          </a:p>
-          <a:p>
-            <a:pPr algn="l">
-              <a:tabLst>
-                <a:tab pos="174625" algn="l"/>
-              </a:tabLst>
-            </a:pPr>
-            <a:endParaRPr lang="en-US" sz="1400" dirty="0">
-              <a:latin typeface="Consolas" panose="020B0609020204030204" pitchFamily="49" charset="0"/>
-              <a:cs typeface="Consolas" panose="020B0609020204030204" pitchFamily="49" charset="0"/>
-            </a:endParaRPr>
-          </a:p>
-          <a:p>
-            <a:pPr algn="l">
-              <a:tabLst>
-                <a:tab pos="174625" algn="l"/>
-              </a:tabLst>
-            </a:pPr>
-            <a:r>
-              <a:rPr lang="en-US" sz="1400" b="1" dirty="0" smtClean="0">
-                <a:solidFill>
-                  <a:srgbClr val="7F0055"/>
-                </a:solidFill>
-                <a:latin typeface="Consolas" panose="020B0609020204030204" pitchFamily="49" charset="0"/>
-                <a:cs typeface="Consolas" panose="020B0609020204030204" pitchFamily="49" charset="0"/>
-              </a:rPr>
-              <a:t>	</a:t>
-            </a:r>
-            <a:r>
-              <a:rPr lang="en-US" sz="1400" b="1" dirty="0" err="1" smtClean="0">
-                <a:solidFill>
-                  <a:srgbClr val="7F0055"/>
-                </a:solidFill>
-                <a:latin typeface="Consolas" panose="020B0609020204030204" pitchFamily="49" charset="0"/>
-                <a:cs typeface="Consolas" panose="020B0609020204030204" pitchFamily="49" charset="0"/>
-              </a:rPr>
-              <a:t>int</a:t>
-            </a:r>
-            <a:r>
-              <a:rPr lang="en-US" sz="1400" b="1" dirty="0" smtClean="0">
-                <a:solidFill>
-                  <a:srgbClr val="000000"/>
-                </a:solidFill>
-                <a:latin typeface="Consolas" panose="020B0609020204030204" pitchFamily="49" charset="0"/>
-                <a:cs typeface="Consolas" panose="020B0609020204030204" pitchFamily="49" charset="0"/>
-              </a:rPr>
-              <a:t> </a:t>
-            </a:r>
-            <a:r>
-              <a:rPr lang="en-US" sz="1400" b="1" dirty="0" err="1">
-                <a:solidFill>
-                  <a:srgbClr val="7F0055"/>
-                </a:solidFill>
-                <a:latin typeface="Consolas" panose="020B0609020204030204" pitchFamily="49" charset="0"/>
-                <a:cs typeface="Consolas" panose="020B0609020204030204" pitchFamily="49" charset="0"/>
-              </a:rPr>
-              <a:t>const</a:t>
-            </a:r>
-            <a:r>
-              <a:rPr lang="en-US" sz="1400" b="1" dirty="0">
-                <a:solidFill>
-                  <a:srgbClr val="000000"/>
-                </a:solidFill>
-                <a:latin typeface="Consolas" panose="020B0609020204030204" pitchFamily="49" charset="0"/>
-                <a:cs typeface="Consolas" panose="020B0609020204030204" pitchFamily="49" charset="0"/>
-              </a:rPr>
-              <a:t> * </a:t>
-            </a:r>
-            <a:r>
-              <a:rPr lang="en-US" sz="1400" b="1" dirty="0" err="1">
-                <a:solidFill>
-                  <a:srgbClr val="000000"/>
-                </a:solidFill>
-                <a:latin typeface="Consolas" panose="020B0609020204030204" pitchFamily="49" charset="0"/>
-                <a:cs typeface="Consolas" panose="020B0609020204030204" pitchFamily="49" charset="0"/>
-              </a:rPr>
-              <a:t>iP</a:t>
-            </a:r>
-            <a:r>
-              <a:rPr lang="en-US" sz="1400" b="1" dirty="0">
-                <a:solidFill>
-                  <a:srgbClr val="000000"/>
-                </a:solidFill>
-                <a:latin typeface="Consolas" panose="020B0609020204030204" pitchFamily="49" charset="0"/>
-                <a:cs typeface="Consolas" panose="020B0609020204030204" pitchFamily="49" charset="0"/>
-              </a:rPr>
-              <a:t> = &amp;</a:t>
-            </a:r>
-            <a:r>
-              <a:rPr lang="en-US" sz="1400" b="1" dirty="0" err="1">
-                <a:solidFill>
-                  <a:srgbClr val="000000"/>
-                </a:solidFill>
-                <a:latin typeface="Consolas" panose="020B0609020204030204" pitchFamily="49" charset="0"/>
-                <a:cs typeface="Consolas" panose="020B0609020204030204" pitchFamily="49" charset="0"/>
-              </a:rPr>
-              <a:t>i</a:t>
-            </a:r>
-            <a:r>
-              <a:rPr lang="en-US" sz="1400" b="1" dirty="0" smtClean="0">
-                <a:solidFill>
-                  <a:srgbClr val="000000"/>
-                </a:solidFill>
-                <a:latin typeface="Consolas" panose="020B0609020204030204" pitchFamily="49" charset="0"/>
-                <a:cs typeface="Consolas" panose="020B0609020204030204" pitchFamily="49" charset="0"/>
-              </a:rPr>
-              <a:t>;		</a:t>
-            </a:r>
-            <a:r>
-              <a:rPr lang="en-US" sz="1400" dirty="0" smtClean="0">
-                <a:solidFill>
-                  <a:srgbClr val="3F7F5F"/>
-                </a:solidFill>
-                <a:latin typeface="Consolas" panose="020B0609020204030204" pitchFamily="49" charset="0"/>
-                <a:cs typeface="Consolas" panose="020B0609020204030204" pitchFamily="49" charset="0"/>
-              </a:rPr>
-              <a:t>// </a:t>
-            </a:r>
-            <a:r>
-              <a:rPr lang="en-US" sz="1400" dirty="0">
-                <a:solidFill>
-                  <a:srgbClr val="3F7F5F"/>
-                </a:solidFill>
-                <a:latin typeface="Consolas" panose="020B0609020204030204" pitchFamily="49" charset="0"/>
-                <a:cs typeface="Consolas" panose="020B0609020204030204" pitchFamily="49" charset="0"/>
-              </a:rPr>
-              <a:t>pointer to </a:t>
-            </a:r>
-            <a:r>
-              <a:rPr lang="en-US" sz="1400" u="sng" dirty="0" err="1">
-                <a:solidFill>
-                  <a:srgbClr val="3F7F5F"/>
-                </a:solidFill>
-                <a:latin typeface="Consolas" panose="020B0609020204030204" pitchFamily="49" charset="0"/>
-                <a:cs typeface="Consolas" panose="020B0609020204030204" pitchFamily="49" charset="0"/>
-              </a:rPr>
-              <a:t>const</a:t>
-            </a:r>
-            <a:endParaRPr lang="en-US" sz="1400" u="sng" dirty="0">
-              <a:solidFill>
-                <a:srgbClr val="3F7F5F"/>
-              </a:solidFill>
-              <a:latin typeface="Consolas" panose="020B0609020204030204" pitchFamily="49" charset="0"/>
-              <a:cs typeface="Consolas" panose="020B0609020204030204" pitchFamily="49" charset="0"/>
-            </a:endParaRPr>
-          </a:p>
-          <a:p>
-            <a:pPr algn="l">
-              <a:tabLst>
-                <a:tab pos="174625" algn="l"/>
-              </a:tabLst>
-            </a:pPr>
-            <a:r>
-              <a:rPr lang="en-US" sz="1400" b="1" dirty="0" smtClean="0">
-                <a:solidFill>
-                  <a:srgbClr val="7F0055"/>
-                </a:solidFill>
-                <a:latin typeface="Consolas" panose="020B0609020204030204" pitchFamily="49" charset="0"/>
-                <a:cs typeface="Consolas" panose="020B0609020204030204" pitchFamily="49" charset="0"/>
-              </a:rPr>
-              <a:t>	</a:t>
-            </a:r>
-            <a:r>
-              <a:rPr lang="en-US" sz="1400" b="1" dirty="0" err="1" smtClean="0">
-                <a:solidFill>
-                  <a:srgbClr val="7F0055"/>
-                </a:solidFill>
-                <a:latin typeface="Consolas" panose="020B0609020204030204" pitchFamily="49" charset="0"/>
-                <a:cs typeface="Consolas" panose="020B0609020204030204" pitchFamily="49" charset="0"/>
-              </a:rPr>
-              <a:t>int</a:t>
-            </a:r>
-            <a:r>
-              <a:rPr lang="en-US" sz="1400" b="1" dirty="0" smtClean="0">
-                <a:solidFill>
-                  <a:srgbClr val="000000"/>
-                </a:solidFill>
-                <a:latin typeface="Consolas" panose="020B0609020204030204" pitchFamily="49" charset="0"/>
-                <a:cs typeface="Consolas" panose="020B0609020204030204" pitchFamily="49" charset="0"/>
-              </a:rPr>
-              <a:t> </a:t>
-            </a:r>
-            <a:r>
-              <a:rPr lang="en-US" sz="1400" b="1" dirty="0" err="1">
-                <a:solidFill>
-                  <a:srgbClr val="7F0055"/>
-                </a:solidFill>
-                <a:latin typeface="Consolas" panose="020B0609020204030204" pitchFamily="49" charset="0"/>
-                <a:cs typeface="Consolas" panose="020B0609020204030204" pitchFamily="49" charset="0"/>
-              </a:rPr>
-              <a:t>const</a:t>
-            </a:r>
-            <a:r>
-              <a:rPr lang="en-US" sz="1400" b="1" dirty="0">
-                <a:solidFill>
-                  <a:srgbClr val="000000"/>
-                </a:solidFill>
-                <a:latin typeface="Consolas" panose="020B0609020204030204" pitchFamily="49" charset="0"/>
-                <a:cs typeface="Consolas" panose="020B0609020204030204" pitchFamily="49" charset="0"/>
-              </a:rPr>
-              <a:t> &amp;</a:t>
-            </a:r>
-            <a:r>
-              <a:rPr lang="en-US" sz="1400" b="1" dirty="0" err="1">
-                <a:solidFill>
-                  <a:srgbClr val="000000"/>
-                </a:solidFill>
-                <a:latin typeface="Consolas" panose="020B0609020204030204" pitchFamily="49" charset="0"/>
-                <a:cs typeface="Consolas" panose="020B0609020204030204" pitchFamily="49" charset="0"/>
-              </a:rPr>
-              <a:t>iR</a:t>
-            </a:r>
-            <a:r>
-              <a:rPr lang="en-US" sz="1400" b="1" dirty="0">
-                <a:solidFill>
-                  <a:srgbClr val="000000"/>
-                </a:solidFill>
-                <a:latin typeface="Consolas" panose="020B0609020204030204" pitchFamily="49" charset="0"/>
-                <a:cs typeface="Consolas" panose="020B0609020204030204" pitchFamily="49" charset="0"/>
-              </a:rPr>
-              <a:t> = </a:t>
-            </a:r>
-            <a:r>
-              <a:rPr lang="en-US" sz="1400" b="1" dirty="0" err="1">
-                <a:solidFill>
-                  <a:srgbClr val="000000"/>
-                </a:solidFill>
-                <a:latin typeface="Consolas" panose="020B0609020204030204" pitchFamily="49" charset="0"/>
-                <a:cs typeface="Consolas" panose="020B0609020204030204" pitchFamily="49" charset="0"/>
-              </a:rPr>
-              <a:t>i</a:t>
-            </a:r>
-            <a:r>
-              <a:rPr lang="en-US" sz="1400" b="1" dirty="0" smtClean="0">
-                <a:solidFill>
-                  <a:srgbClr val="000000"/>
-                </a:solidFill>
-                <a:latin typeface="Consolas" panose="020B0609020204030204" pitchFamily="49" charset="0"/>
-                <a:cs typeface="Consolas" panose="020B0609020204030204" pitchFamily="49" charset="0"/>
-              </a:rPr>
-              <a:t>;		</a:t>
-            </a:r>
-            <a:r>
-              <a:rPr lang="en-US" sz="1400" dirty="0" smtClean="0">
-                <a:solidFill>
-                  <a:srgbClr val="3F7F5F"/>
-                </a:solidFill>
-                <a:latin typeface="Consolas" panose="020B0609020204030204" pitchFamily="49" charset="0"/>
-                <a:cs typeface="Consolas" panose="020B0609020204030204" pitchFamily="49" charset="0"/>
-              </a:rPr>
-              <a:t>// </a:t>
-            </a:r>
-            <a:r>
-              <a:rPr lang="en-US" sz="1400" dirty="0">
-                <a:solidFill>
-                  <a:srgbClr val="3F7F5F"/>
-                </a:solidFill>
-                <a:latin typeface="Consolas" panose="020B0609020204030204" pitchFamily="49" charset="0"/>
-                <a:cs typeface="Consolas" panose="020B0609020204030204" pitchFamily="49" charset="0"/>
-              </a:rPr>
-              <a:t>reference to </a:t>
-            </a:r>
-            <a:r>
-              <a:rPr lang="en-US" sz="1400" u="sng" dirty="0" err="1">
-                <a:solidFill>
-                  <a:srgbClr val="3F7F5F"/>
-                </a:solidFill>
-                <a:latin typeface="Consolas" panose="020B0609020204030204" pitchFamily="49" charset="0"/>
-                <a:cs typeface="Consolas" panose="020B0609020204030204" pitchFamily="49" charset="0"/>
-              </a:rPr>
-              <a:t>const</a:t>
-            </a:r>
-            <a:endParaRPr lang="en-US" sz="1400" u="sng" dirty="0">
-              <a:solidFill>
-                <a:srgbClr val="3F7F5F"/>
-              </a:solidFill>
-              <a:latin typeface="Consolas" panose="020B0609020204030204" pitchFamily="49" charset="0"/>
-              <a:cs typeface="Consolas" panose="020B0609020204030204" pitchFamily="49" charset="0"/>
-            </a:endParaRPr>
-          </a:p>
-          <a:p>
-            <a:pPr algn="l">
-              <a:tabLst>
-                <a:tab pos="174625" algn="l"/>
-              </a:tabLst>
-            </a:pPr>
-            <a:endParaRPr lang="en-US" sz="1400" dirty="0">
-              <a:latin typeface="Consolas" panose="020B0609020204030204" pitchFamily="49" charset="0"/>
-              <a:cs typeface="Consolas" panose="020B0609020204030204" pitchFamily="49" charset="0"/>
-            </a:endParaRPr>
-          </a:p>
-          <a:p>
-            <a:pPr algn="l">
-              <a:tabLst>
-                <a:tab pos="174625" algn="l"/>
-              </a:tabLst>
-            </a:pPr>
-            <a:r>
-              <a:rPr lang="en-US" sz="1400" b="1" dirty="0" smtClean="0">
-                <a:solidFill>
-                  <a:srgbClr val="7F0055"/>
-                </a:solidFill>
-                <a:latin typeface="Consolas" panose="020B0609020204030204" pitchFamily="49" charset="0"/>
-                <a:cs typeface="Consolas" panose="020B0609020204030204" pitchFamily="49" charset="0"/>
-              </a:rPr>
-              <a:t>	</a:t>
-            </a:r>
-            <a:r>
-              <a:rPr lang="en-US" sz="1400" b="1" dirty="0" err="1" smtClean="0">
-                <a:solidFill>
-                  <a:srgbClr val="7F0055"/>
-                </a:solidFill>
-                <a:latin typeface="Consolas" panose="020B0609020204030204" pitchFamily="49" charset="0"/>
-                <a:cs typeface="Consolas" panose="020B0609020204030204" pitchFamily="49" charset="0"/>
-              </a:rPr>
-              <a:t>int</a:t>
-            </a:r>
-            <a:r>
-              <a:rPr lang="en-US" sz="1400" b="1" dirty="0" smtClean="0">
-                <a:solidFill>
-                  <a:srgbClr val="000000"/>
-                </a:solidFill>
-                <a:latin typeface="Consolas" panose="020B0609020204030204" pitchFamily="49" charset="0"/>
-                <a:cs typeface="Consolas" panose="020B0609020204030204" pitchFamily="49" charset="0"/>
-              </a:rPr>
-              <a:t> </a:t>
-            </a:r>
-            <a:r>
-              <a:rPr lang="en-US" sz="1400" b="1" dirty="0">
-                <a:solidFill>
-                  <a:srgbClr val="000000"/>
-                </a:solidFill>
-                <a:latin typeface="Consolas" panose="020B0609020204030204" pitchFamily="49" charset="0"/>
-                <a:cs typeface="Consolas" panose="020B0609020204030204" pitchFamily="49" charset="0"/>
-              </a:rPr>
-              <a:t>* </a:t>
-            </a:r>
-            <a:r>
-              <a:rPr lang="en-US" sz="1400" b="1" dirty="0" err="1">
-                <a:solidFill>
-                  <a:srgbClr val="7F0055"/>
-                </a:solidFill>
-                <a:latin typeface="Consolas" panose="020B0609020204030204" pitchFamily="49" charset="0"/>
-                <a:cs typeface="Consolas" panose="020B0609020204030204" pitchFamily="49" charset="0"/>
-              </a:rPr>
-              <a:t>const</a:t>
-            </a:r>
-            <a:r>
-              <a:rPr lang="en-US" sz="1400" b="1" dirty="0">
-                <a:solidFill>
-                  <a:srgbClr val="000000"/>
-                </a:solidFill>
-                <a:latin typeface="Consolas" panose="020B0609020204030204" pitchFamily="49" charset="0"/>
-                <a:cs typeface="Consolas" panose="020B0609020204030204" pitchFamily="49" charset="0"/>
-              </a:rPr>
-              <a:t> iP2 = &amp;k; </a:t>
-            </a:r>
-            <a:r>
-              <a:rPr lang="en-US" sz="1400" b="1" dirty="0" smtClean="0">
-                <a:solidFill>
-                  <a:srgbClr val="000000"/>
-                </a:solidFill>
-                <a:latin typeface="Consolas" panose="020B0609020204030204" pitchFamily="49" charset="0"/>
-                <a:cs typeface="Consolas" panose="020B0609020204030204" pitchFamily="49" charset="0"/>
-              </a:rPr>
-              <a:t>	</a:t>
-            </a:r>
-            <a:r>
-              <a:rPr lang="en-US" sz="1400" dirty="0" smtClean="0">
-                <a:solidFill>
-                  <a:srgbClr val="3F7F5F"/>
-                </a:solidFill>
-                <a:latin typeface="Consolas" panose="020B0609020204030204" pitchFamily="49" charset="0"/>
-                <a:cs typeface="Consolas" panose="020B0609020204030204" pitchFamily="49" charset="0"/>
-              </a:rPr>
-              <a:t>// </a:t>
-            </a:r>
-            <a:r>
-              <a:rPr lang="en-US" sz="1400" dirty="0" err="1" smtClean="0">
-                <a:solidFill>
-                  <a:srgbClr val="3F7F5F"/>
-                </a:solidFill>
-                <a:latin typeface="Consolas" panose="020B0609020204030204" pitchFamily="49" charset="0"/>
-                <a:cs typeface="Consolas" panose="020B0609020204030204" pitchFamily="49" charset="0"/>
-              </a:rPr>
-              <a:t>const</a:t>
-            </a:r>
-            <a:r>
-              <a:rPr lang="en-US" sz="1400" dirty="0" smtClean="0">
-                <a:solidFill>
-                  <a:srgbClr val="3F7F5F"/>
-                </a:solidFill>
-                <a:latin typeface="Consolas" panose="020B0609020204030204" pitchFamily="49" charset="0"/>
-                <a:cs typeface="Consolas" panose="020B0609020204030204" pitchFamily="49" charset="0"/>
-              </a:rPr>
-              <a:t> pointer</a:t>
-            </a:r>
-            <a:endParaRPr lang="en-US" sz="1400" dirty="0">
-              <a:solidFill>
-                <a:srgbClr val="3F7F5F"/>
-              </a:solidFill>
-              <a:latin typeface="Consolas" panose="020B0609020204030204" pitchFamily="49" charset="0"/>
-              <a:cs typeface="Consolas" panose="020B0609020204030204" pitchFamily="49" charset="0"/>
-            </a:endParaRPr>
-          </a:p>
-          <a:p>
-            <a:pPr algn="l">
-              <a:tabLst>
-                <a:tab pos="174625" algn="l"/>
-              </a:tabLst>
-            </a:pPr>
-            <a:r>
-              <a:rPr lang="en-US" sz="1400" dirty="0" smtClean="0">
-                <a:solidFill>
-                  <a:srgbClr val="3F7F5F"/>
-                </a:solidFill>
-                <a:latin typeface="Consolas" panose="020B0609020204030204" pitchFamily="49" charset="0"/>
-                <a:cs typeface="Consolas" panose="020B0609020204030204" pitchFamily="49" charset="0"/>
-              </a:rPr>
-              <a:t>	//</a:t>
-            </a:r>
-            <a:r>
-              <a:rPr lang="en-US" sz="1400" dirty="0" err="1">
-                <a:solidFill>
-                  <a:srgbClr val="3F7F5F"/>
-                </a:solidFill>
-                <a:latin typeface="Consolas" panose="020B0609020204030204" pitchFamily="49" charset="0"/>
-                <a:cs typeface="Consolas" panose="020B0609020204030204" pitchFamily="49" charset="0"/>
-              </a:rPr>
-              <a:t>int</a:t>
-            </a:r>
-            <a:r>
-              <a:rPr lang="en-US" sz="1400" dirty="0">
-                <a:solidFill>
-                  <a:srgbClr val="3F7F5F"/>
-                </a:solidFill>
-                <a:latin typeface="Consolas" panose="020B0609020204030204" pitchFamily="49" charset="0"/>
-                <a:cs typeface="Consolas" panose="020B0609020204030204" pitchFamily="49" charset="0"/>
-              </a:rPr>
-              <a:t> &amp; </a:t>
-            </a:r>
-            <a:r>
-              <a:rPr lang="en-US" sz="1400" dirty="0" err="1">
-                <a:solidFill>
-                  <a:srgbClr val="3F7F5F"/>
-                </a:solidFill>
-                <a:latin typeface="Consolas" panose="020B0609020204030204" pitchFamily="49" charset="0"/>
-                <a:cs typeface="Consolas" panose="020B0609020204030204" pitchFamily="49" charset="0"/>
-              </a:rPr>
-              <a:t>const</a:t>
-            </a:r>
-            <a:r>
-              <a:rPr lang="en-US" sz="1400" dirty="0">
-                <a:solidFill>
-                  <a:srgbClr val="3F7F5F"/>
-                </a:solidFill>
-                <a:latin typeface="Consolas" panose="020B0609020204030204" pitchFamily="49" charset="0"/>
-                <a:cs typeface="Consolas" panose="020B0609020204030204" pitchFamily="49" charset="0"/>
-              </a:rPr>
-              <a:t> iR2 = </a:t>
-            </a:r>
-            <a:r>
-              <a:rPr lang="en-US" sz="1400" dirty="0" smtClean="0">
-                <a:solidFill>
-                  <a:srgbClr val="3F7F5F"/>
-                </a:solidFill>
-                <a:latin typeface="Consolas" panose="020B0609020204030204" pitchFamily="49" charset="0"/>
-                <a:cs typeface="Consolas" panose="020B0609020204030204" pitchFamily="49" charset="0"/>
-              </a:rPr>
-              <a:t>j;	// </a:t>
-            </a:r>
-            <a:r>
-              <a:rPr lang="en-US" sz="1400" dirty="0" err="1">
-                <a:solidFill>
-                  <a:srgbClr val="3F7F5F"/>
-                </a:solidFill>
-                <a:latin typeface="Consolas" panose="020B0609020204030204" pitchFamily="49" charset="0"/>
-                <a:cs typeface="Consolas" panose="020B0609020204030204" pitchFamily="49" charset="0"/>
-              </a:rPr>
-              <a:t>const</a:t>
-            </a:r>
-            <a:r>
-              <a:rPr lang="en-US" sz="1400" dirty="0">
-                <a:solidFill>
-                  <a:srgbClr val="3F7F5F"/>
-                </a:solidFill>
-                <a:latin typeface="Consolas" panose="020B0609020204030204" pitchFamily="49" charset="0"/>
-                <a:cs typeface="Consolas" panose="020B0609020204030204" pitchFamily="49" charset="0"/>
-              </a:rPr>
-              <a:t> reference = nonsense</a:t>
-            </a:r>
-          </a:p>
-          <a:p>
-            <a:pPr>
-              <a:tabLst>
-                <a:tab pos="174625" algn="l"/>
-              </a:tabLst>
-            </a:pPr>
-            <a:endParaRPr lang="en-US" sz="1400" dirty="0">
-              <a:latin typeface="Courier New" panose="02070309020205020404" pitchFamily="49" charset="0"/>
-            </a:endParaRPr>
-          </a:p>
-          <a:p>
-            <a:pPr algn="l">
-              <a:tabLst>
-                <a:tab pos="174625" algn="l"/>
-              </a:tabLst>
-            </a:pPr>
-            <a:r>
-              <a:rPr lang="en-US" sz="1400" dirty="0" smtClean="0">
-                <a:solidFill>
-                  <a:srgbClr val="3F7F5F"/>
-                </a:solidFill>
-                <a:latin typeface="Courier New" panose="02070309020205020404" pitchFamily="49" charset="0"/>
-              </a:rPr>
-              <a:t>	// </a:t>
-            </a:r>
-            <a:r>
-              <a:rPr lang="en-US" sz="1400" dirty="0">
-                <a:solidFill>
-                  <a:srgbClr val="3F7F5F"/>
-                </a:solidFill>
-                <a:latin typeface="Courier New" panose="02070309020205020404" pitchFamily="49" charset="0"/>
-              </a:rPr>
-              <a:t>1st </a:t>
-            </a:r>
-            <a:r>
-              <a:rPr lang="en-US" sz="1400" u="sng" dirty="0" err="1">
-                <a:solidFill>
-                  <a:srgbClr val="3F7F5F"/>
-                </a:solidFill>
-                <a:latin typeface="Courier New" panose="02070309020205020404" pitchFamily="49" charset="0"/>
-              </a:rPr>
-              <a:t>const</a:t>
-            </a:r>
-            <a:r>
-              <a:rPr lang="en-US" sz="1400" u="sng" dirty="0">
-                <a:solidFill>
-                  <a:srgbClr val="3F7F5F"/>
-                </a:solidFill>
-                <a:latin typeface="Courier New" panose="02070309020205020404" pitchFamily="49" charset="0"/>
-              </a:rPr>
-              <a:t> : the strings in the array are constant</a:t>
-            </a:r>
-          </a:p>
-          <a:p>
-            <a:pPr algn="l">
-              <a:tabLst>
-                <a:tab pos="174625" algn="l"/>
-              </a:tabLst>
-            </a:pPr>
-            <a:r>
-              <a:rPr lang="en-US" sz="1400" dirty="0" smtClean="0">
-                <a:solidFill>
-                  <a:srgbClr val="3F7F5F"/>
-                </a:solidFill>
-                <a:latin typeface="Courier New" panose="02070309020205020404" pitchFamily="49" charset="0"/>
-              </a:rPr>
-              <a:t>	// </a:t>
-            </a:r>
-            <a:r>
-              <a:rPr lang="en-US" sz="1400" dirty="0">
-                <a:solidFill>
-                  <a:srgbClr val="3F7F5F"/>
-                </a:solidFill>
-                <a:latin typeface="Courier New" panose="02070309020205020404" pitchFamily="49" charset="0"/>
-              </a:rPr>
-              <a:t>2nd </a:t>
-            </a:r>
-            <a:r>
-              <a:rPr lang="en-US" sz="1400" u="sng" dirty="0" err="1">
-                <a:solidFill>
-                  <a:srgbClr val="3F7F5F"/>
-                </a:solidFill>
-                <a:latin typeface="Courier New" panose="02070309020205020404" pitchFamily="49" charset="0"/>
-              </a:rPr>
-              <a:t>const</a:t>
-            </a:r>
-            <a:r>
-              <a:rPr lang="en-US" sz="1400" u="sng" dirty="0">
-                <a:solidFill>
-                  <a:srgbClr val="3F7F5F"/>
-                </a:solidFill>
-                <a:latin typeface="Courier New" panose="02070309020205020404" pitchFamily="49" charset="0"/>
-              </a:rPr>
-              <a:t> : the array of pointers to the strings cannot be modified</a:t>
-            </a:r>
-          </a:p>
-          <a:p>
-            <a:pPr algn="l">
-              <a:tabLst>
-                <a:tab pos="174625" algn="l"/>
-              </a:tabLst>
-            </a:pPr>
-            <a:r>
-              <a:rPr lang="en-US" sz="1400" dirty="0" smtClean="0">
-                <a:solidFill>
-                  <a:srgbClr val="3F7F5F"/>
-                </a:solidFill>
-                <a:latin typeface="Courier New" panose="02070309020205020404" pitchFamily="49" charset="0"/>
-              </a:rPr>
-              <a:t>	// </a:t>
-            </a:r>
-            <a:r>
-              <a:rPr lang="en-US" sz="1400" dirty="0">
-                <a:solidFill>
-                  <a:srgbClr val="3F7F5F"/>
-                </a:solidFill>
-                <a:latin typeface="Courier New" panose="02070309020205020404" pitchFamily="49" charset="0"/>
-              </a:rPr>
-              <a:t>3rd </a:t>
-            </a:r>
-            <a:r>
-              <a:rPr lang="en-US" sz="1400" u="sng" dirty="0" err="1">
-                <a:solidFill>
-                  <a:srgbClr val="3F7F5F"/>
-                </a:solidFill>
-                <a:latin typeface="Courier New" panose="02070309020205020404" pitchFamily="49" charset="0"/>
-              </a:rPr>
-              <a:t>const</a:t>
-            </a:r>
-            <a:r>
-              <a:rPr lang="en-US" sz="1400" u="sng" dirty="0">
-                <a:solidFill>
-                  <a:srgbClr val="3F7F5F"/>
-                </a:solidFill>
-                <a:latin typeface="Courier New" panose="02070309020205020404" pitchFamily="49" charset="0"/>
-              </a:rPr>
-              <a:t> : the pointer </a:t>
-            </a:r>
-            <a:r>
-              <a:rPr lang="en-US" sz="1400" u="sng" dirty="0" err="1">
-                <a:solidFill>
-                  <a:srgbClr val="3F7F5F"/>
-                </a:solidFill>
-                <a:latin typeface="Courier New" panose="02070309020205020404" pitchFamily="49" charset="0"/>
-              </a:rPr>
-              <a:t>argcConst</a:t>
-            </a:r>
-            <a:r>
-              <a:rPr lang="en-US" sz="1400" u="sng" dirty="0">
-                <a:solidFill>
-                  <a:srgbClr val="3F7F5F"/>
-                </a:solidFill>
-                <a:latin typeface="Courier New" panose="02070309020205020404" pitchFamily="49" charset="0"/>
-              </a:rPr>
-              <a:t> cannot be changed</a:t>
-            </a:r>
-            <a:endParaRPr lang="en-US" sz="1400" dirty="0" smtClean="0">
-              <a:latin typeface="Consolas" panose="020B0609020204030204" pitchFamily="49" charset="0"/>
-              <a:cs typeface="Consolas" panose="020B0609020204030204" pitchFamily="49" charset="0"/>
-            </a:endParaRPr>
-          </a:p>
-          <a:p>
-            <a:pPr algn="l">
-              <a:tabLst>
-                <a:tab pos="174625" algn="l"/>
-              </a:tabLst>
-            </a:pPr>
-            <a:r>
-              <a:rPr lang="en-US" sz="1400" b="1" dirty="0" smtClean="0">
-                <a:solidFill>
-                  <a:srgbClr val="7F0055"/>
-                </a:solidFill>
-                <a:latin typeface="Consolas" panose="020B0609020204030204" pitchFamily="49" charset="0"/>
-                <a:cs typeface="Consolas" panose="020B0609020204030204" pitchFamily="49" charset="0"/>
-              </a:rPr>
-              <a:t>	char</a:t>
-            </a:r>
-            <a:r>
-              <a:rPr lang="en-US" sz="1400" b="1" dirty="0" smtClean="0">
-                <a:solidFill>
-                  <a:srgbClr val="000000"/>
-                </a:solidFill>
-                <a:latin typeface="Consolas" panose="020B0609020204030204" pitchFamily="49" charset="0"/>
-                <a:cs typeface="Consolas" panose="020B0609020204030204" pitchFamily="49" charset="0"/>
-              </a:rPr>
-              <a:t> </a:t>
-            </a:r>
-            <a:r>
-              <a:rPr lang="en-US" sz="1400" b="1" dirty="0" err="1">
-                <a:solidFill>
-                  <a:srgbClr val="7F0055"/>
-                </a:solidFill>
-                <a:latin typeface="Consolas" panose="020B0609020204030204" pitchFamily="49" charset="0"/>
-                <a:cs typeface="Consolas" panose="020B0609020204030204" pitchFamily="49" charset="0"/>
-              </a:rPr>
-              <a:t>const</a:t>
-            </a:r>
-            <a:r>
-              <a:rPr lang="en-US" sz="1400" b="1" dirty="0">
-                <a:solidFill>
-                  <a:srgbClr val="000000"/>
-                </a:solidFill>
-                <a:latin typeface="Consolas" panose="020B0609020204030204" pitchFamily="49" charset="0"/>
-                <a:cs typeface="Consolas" panose="020B0609020204030204" pitchFamily="49" charset="0"/>
-              </a:rPr>
-              <a:t> * </a:t>
-            </a:r>
-            <a:r>
-              <a:rPr lang="en-US" sz="1400" b="1" dirty="0" err="1">
-                <a:solidFill>
-                  <a:srgbClr val="7F0055"/>
-                </a:solidFill>
-                <a:latin typeface="Consolas" panose="020B0609020204030204" pitchFamily="49" charset="0"/>
-                <a:cs typeface="Consolas" panose="020B0609020204030204" pitchFamily="49" charset="0"/>
-              </a:rPr>
-              <a:t>const</a:t>
-            </a:r>
-            <a:r>
-              <a:rPr lang="en-US" sz="1400" b="1" dirty="0">
-                <a:solidFill>
-                  <a:srgbClr val="000000"/>
-                </a:solidFill>
-                <a:latin typeface="Consolas" panose="020B0609020204030204" pitchFamily="49" charset="0"/>
-                <a:cs typeface="Consolas" panose="020B0609020204030204" pitchFamily="49" charset="0"/>
-              </a:rPr>
-              <a:t> * </a:t>
-            </a:r>
-            <a:r>
-              <a:rPr lang="en-US" sz="1400" b="1" dirty="0" err="1">
-                <a:solidFill>
-                  <a:srgbClr val="7F0055"/>
-                </a:solidFill>
-                <a:latin typeface="Consolas" panose="020B0609020204030204" pitchFamily="49" charset="0"/>
-                <a:cs typeface="Consolas" panose="020B0609020204030204" pitchFamily="49" charset="0"/>
-              </a:rPr>
-              <a:t>const</a:t>
-            </a:r>
-            <a:r>
-              <a:rPr lang="en-US" sz="1400" b="1" dirty="0">
-                <a:solidFill>
-                  <a:srgbClr val="000000"/>
-                </a:solidFill>
-                <a:latin typeface="Consolas" panose="020B0609020204030204" pitchFamily="49" charset="0"/>
-                <a:cs typeface="Consolas" panose="020B0609020204030204" pitchFamily="49" charset="0"/>
-              </a:rPr>
-              <a:t> </a:t>
-            </a:r>
-            <a:r>
-              <a:rPr lang="en-US" sz="1400" b="1" dirty="0" err="1">
-                <a:solidFill>
-                  <a:srgbClr val="000000"/>
-                </a:solidFill>
-                <a:latin typeface="Consolas" panose="020B0609020204030204" pitchFamily="49" charset="0"/>
-                <a:cs typeface="Consolas" panose="020B0609020204030204" pitchFamily="49" charset="0"/>
-              </a:rPr>
-              <a:t>argcConst</a:t>
-            </a:r>
-            <a:r>
-              <a:rPr lang="en-US" sz="1400" b="1" dirty="0">
-                <a:solidFill>
-                  <a:srgbClr val="000000"/>
-                </a:solidFill>
-                <a:latin typeface="Consolas" panose="020B0609020204030204" pitchFamily="49" charset="0"/>
-                <a:cs typeface="Consolas" panose="020B0609020204030204" pitchFamily="49" charset="0"/>
-              </a:rPr>
-              <a:t> = </a:t>
-            </a:r>
-            <a:r>
-              <a:rPr lang="en-US" sz="1400" b="1" dirty="0" err="1">
-                <a:solidFill>
-                  <a:srgbClr val="000000"/>
-                </a:solidFill>
-                <a:latin typeface="Consolas" panose="020B0609020204030204" pitchFamily="49" charset="0"/>
-                <a:cs typeface="Consolas" panose="020B0609020204030204" pitchFamily="49" charset="0"/>
-              </a:rPr>
-              <a:t>argv</a:t>
-            </a:r>
-            <a:r>
-              <a:rPr lang="en-US" sz="1400" b="1" dirty="0" smtClean="0">
-                <a:solidFill>
-                  <a:srgbClr val="000000"/>
-                </a:solidFill>
-                <a:latin typeface="Consolas" panose="020B0609020204030204" pitchFamily="49" charset="0"/>
-                <a:cs typeface="Consolas" panose="020B0609020204030204" pitchFamily="49" charset="0"/>
-              </a:rPr>
-              <a:t>;</a:t>
-            </a:r>
-          </a:p>
-          <a:p>
-            <a:pPr algn="l">
-              <a:tabLst>
-                <a:tab pos="174625" algn="l"/>
-              </a:tabLst>
-            </a:pPr>
-            <a:r>
-              <a:rPr lang="en-US" sz="1400" dirty="0" smtClean="0">
-                <a:solidFill>
-                  <a:srgbClr val="000000"/>
-                </a:solidFill>
-                <a:latin typeface="Consolas" panose="020B0609020204030204" pitchFamily="49" charset="0"/>
-                <a:cs typeface="Consolas" panose="020B0609020204030204" pitchFamily="49" charset="0"/>
-              </a:rPr>
-              <a:t>}</a:t>
-            </a:r>
-            <a:endParaRPr lang="en-US" sz="1400" dirty="0">
-              <a:solidFill>
-                <a:srgbClr val="000000"/>
-              </a:solidFill>
-              <a:latin typeface="Consolas" panose="020B0609020204030204" pitchFamily="49" charset="0"/>
-              <a:cs typeface="Consolas" panose="020B0609020204030204" pitchFamily="49" charset="0"/>
-            </a:endParaRPr>
-          </a:p>
-          <a:p>
-            <a:pPr>
-              <a:tabLst>
-                <a:tab pos="174625" algn="l"/>
-              </a:tabLst>
-            </a:pPr>
-            <a:endParaRPr lang="en-US" sz="1400" dirty="0">
               <a:latin typeface="Consolas" panose="020B0609020204030204" pitchFamily="49" charset="0"/>
               <a:cs typeface="Consolas" panose="020B0609020204030204" pitchFamily="49" charset="0"/>
             </a:endParaRPr>

</xml_diff>

<commit_message>
Add slide that exemplifies inheritance (Base-Child example)
</commit_message>
<xml_diff>
--- a/2015/week2__recap_and_warmup_slides.pptx
+++ b/2015/week2__recap_and_warmup_slides.pptx
@@ -5,21 +5,20 @@
     <p:sldMasterId id="2147483650" r:id="rId1"/>
   </p:sldMasterIdLst>
   <p:notesMasterIdLst>
-    <p:notesMasterId r:id="rId11"/>
+    <p:notesMasterId r:id="rId10"/>
   </p:notesMasterIdLst>
   <p:handoutMasterIdLst>
-    <p:handoutMasterId r:id="rId12"/>
+    <p:handoutMasterId r:id="rId11"/>
   </p:handoutMasterIdLst>
   <p:sldIdLst>
     <p:sldId id="454" r:id="rId2"/>
     <p:sldId id="455" r:id="rId3"/>
     <p:sldId id="456" r:id="rId4"/>
     <p:sldId id="457" r:id="rId5"/>
-    <p:sldId id="458" r:id="rId6"/>
-    <p:sldId id="459" r:id="rId7"/>
-    <p:sldId id="460" r:id="rId8"/>
-    <p:sldId id="461" r:id="rId9"/>
-    <p:sldId id="462" r:id="rId10"/>
+    <p:sldId id="459" r:id="rId6"/>
+    <p:sldId id="460" r:id="rId7"/>
+    <p:sldId id="461" r:id="rId8"/>
+    <p:sldId id="462" r:id="rId9"/>
   </p:sldIdLst>
   <p:sldSz cx="9144000" cy="6858000" type="screen4x3"/>
   <p:notesSz cx="7099300" cy="10234613"/>
@@ -197,7 +196,6 @@
             <p14:sldId id="455"/>
             <p14:sldId id="456"/>
             <p14:sldId id="457"/>
-            <p14:sldId id="458"/>
             <p14:sldId id="459"/>
             <p14:sldId id="460"/>
             <p14:sldId id="461"/>
@@ -6102,7 +6100,7 @@
           <a:graphicData uri="http://schemas.openxmlformats.org/presentationml/2006/ole">
             <mc:AlternateContent xmlns:mc="http://schemas.openxmlformats.org/markup-compatibility/2006">
               <mc:Choice xmlns:v="urn:schemas-microsoft-com:vml" Requires="v">
-                <p:oleObj spid="_x0000_s1934" r:id="rId15" imgW="1038370" imgH="980952" progId="">
+                <p:oleObj spid="_x0000_s1936" r:id="rId15" imgW="1038370" imgH="980952" progId="">
                   <p:embed/>
                 </p:oleObj>
               </mc:Choice>
@@ -6540,7 +6538,7 @@
                 </a:lnSpc>
                 <a:defRPr/>
               </a:pPr>
-              <a:t>18.09.2015</a:t>
+              <a:t>21.09.2015</a:t>
             </a:fld>
             <a:r>
               <a:rPr lang="en-GB" altLang="de-DE" sz="1000" smtClean="0">
@@ -8468,11 +8466,7 @@
             </a:r>
             <a:r>
               <a:rPr lang="en-US" dirty="0" smtClean="0"/>
-              <a:t> </a:t>
-            </a:r>
-            <a:r>
-              <a:rPr lang="en-US" dirty="0" smtClean="0"/>
-              <a:t>am </a:t>
+              <a:t> am </a:t>
             </a:r>
             <a:r>
               <a:rPr lang="en-US" dirty="0" err="1" smtClean="0"/>
@@ -8738,207 +8732,6 @@
 </file>
 
 <file path=ppt/slides/slide5.xml><?xml version="1.0" encoding="utf-8"?>
-<p:sld xmlns:a="http://schemas.openxmlformats.org/drawingml/2006/main" xmlns:r="http://schemas.openxmlformats.org/officeDocument/2006/relationships" xmlns:p="http://schemas.openxmlformats.org/presentationml/2006/main">
-  <p:cSld>
-    <p:spTree>
-      <p:nvGrpSpPr>
-        <p:cNvPr id="1" name=""/>
-        <p:cNvGrpSpPr/>
-        <p:nvPr/>
-      </p:nvGrpSpPr>
-      <p:grpSpPr>
-        <a:xfrm>
-          <a:off x="0" y="0"/>
-          <a:ext cx="0" cy="0"/>
-          <a:chOff x="0" y="0"/>
-          <a:chExt cx="0" cy="0"/>
-        </a:xfrm>
-      </p:grpSpPr>
-      <p:sp>
-        <p:nvSpPr>
-          <p:cNvPr id="2" name="Titel 1"/>
-          <p:cNvSpPr>
-            <a:spLocks noGrp="1"/>
-          </p:cNvSpPr>
-          <p:nvPr>
-            <p:ph type="title"/>
-          </p:nvPr>
-        </p:nvSpPr>
-        <p:spPr/>
-        <p:txBody>
-          <a:bodyPr/>
-          <a:lstStyle/>
-          <a:p>
-            <a:r>
-              <a:rPr lang="en-US" dirty="0" smtClean="0"/>
-              <a:t>Tag 3: Rückschau und Warm Up </a:t>
-            </a:r>
-            <a:endParaRPr lang="en-US" dirty="0"/>
-          </a:p>
-        </p:txBody>
-      </p:sp>
-      <p:sp>
-        <p:nvSpPr>
-          <p:cNvPr id="3" name="Inhaltsplatzhalter 2"/>
-          <p:cNvSpPr>
-            <a:spLocks noGrp="1"/>
-          </p:cNvSpPr>
-          <p:nvPr>
-            <p:ph idx="1"/>
-          </p:nvPr>
-        </p:nvSpPr>
-        <p:spPr/>
-        <p:txBody>
-          <a:bodyPr/>
-          <a:lstStyle/>
-          <a:p>
-            <a:endParaRPr lang="en-US" sz="1600" dirty="0">
-              <a:latin typeface="Consolas" panose="020B0609020204030204" pitchFamily="49" charset="0"/>
-              <a:cs typeface="Consolas" panose="020B0609020204030204" pitchFamily="49" charset="0"/>
-            </a:endParaRPr>
-          </a:p>
-        </p:txBody>
-      </p:sp>
-      <p:sp>
-        <p:nvSpPr>
-          <p:cNvPr id="4" name="Rechteck 3"/>
-          <p:cNvSpPr/>
-          <p:nvPr/>
-        </p:nvSpPr>
-        <p:spPr bwMode="auto">
-          <a:xfrm>
-            <a:off x="1187624" y="2636912"/>
-            <a:ext cx="1080120" cy="288032"/>
-          </a:xfrm>
-          <a:prstGeom prst="rect">
-            <a:avLst/>
-          </a:prstGeom>
-          <a:solidFill>
-            <a:schemeClr val="bg1"/>
-          </a:solidFill>
-          <a:ln w="9525">
-            <a:noFill/>
-            <a:miter lim="800000"/>
-            <a:headEnd/>
-            <a:tailEnd/>
-          </a:ln>
-          <a:extLst/>
-        </p:spPr>
-        <p:txBody>
-          <a:bodyPr rtlCol="0" anchor="ctr">
-            <a:spAutoFit/>
-          </a:bodyPr>
-          <a:lstStyle/>
-          <a:p>
-            <a:pPr algn="ctr" eaLnBrk="1" hangingPunct="1">
-              <a:spcBef>
-                <a:spcPct val="0"/>
-              </a:spcBef>
-              <a:buSzTx/>
-              <a:buFont typeface="Arial" charset="0"/>
-              <a:buNone/>
-            </a:pPr>
-            <a:endParaRPr lang="en-US" sz="1400" dirty="0" err="1">
-              <a:solidFill>
-                <a:srgbClr val="7F0055"/>
-              </a:solidFill>
-              <a:latin typeface="Consolas" pitchFamily="49" charset="0"/>
-            </a:endParaRPr>
-          </a:p>
-        </p:txBody>
-      </p:sp>
-    </p:spTree>
-    <p:extLst>
-      <p:ext uri="{BB962C8B-B14F-4D97-AF65-F5344CB8AC3E}">
-        <p14:creationId xmlns:p14="http://schemas.microsoft.com/office/powerpoint/2010/main" val="1515927319"/>
-      </p:ext>
-    </p:extLst>
-  </p:cSld>
-  <p:clrMapOvr>
-    <a:masterClrMapping/>
-  </p:clrMapOvr>
-  <p:timing>
-    <p:tnLst>
-      <p:par>
-        <p:cTn id="1" dur="indefinite" restart="never" nodeType="tmRoot">
-          <p:childTnLst>
-            <p:seq concurrent="1" nextAc="seek">
-              <p:cTn id="2" dur="indefinite" nodeType="mainSeq">
-                <p:childTnLst>
-                  <p:par>
-                    <p:cTn id="3" fill="hold">
-                      <p:stCondLst>
-                        <p:cond delay="indefinite"/>
-                      </p:stCondLst>
-                      <p:childTnLst>
-                        <p:par>
-                          <p:cTn id="4" fill="hold">
-                            <p:stCondLst>
-                              <p:cond delay="0"/>
-                            </p:stCondLst>
-                            <p:childTnLst>
-                              <p:par>
-                                <p:cTn id="5" presetID="1" presetClass="exit" presetSubtype="0" fill="hold" grpId="0" nodeType="clickEffect">
-                                  <p:stCondLst>
-                                    <p:cond delay="0"/>
-                                  </p:stCondLst>
-                                  <p:childTnLst>
-                                    <p:set>
-                                      <p:cBhvr>
-                                        <p:cTn id="6" dur="1" fill="hold">
-                                          <p:stCondLst>
-                                            <p:cond delay="0"/>
-                                          </p:stCondLst>
-                                        </p:cTn>
-                                        <p:tgtEl>
-                                          <p:spTgt spid="4"/>
-                                        </p:tgtEl>
-                                        <p:attrNameLst>
-                                          <p:attrName>style.visibility</p:attrName>
-                                        </p:attrNameLst>
-                                      </p:cBhvr>
-                                      <p:to>
-                                        <p:strVal val="hidden"/>
-                                      </p:to>
-                                    </p:set>
-                                  </p:childTnLst>
-                                </p:cTn>
-                              </p:par>
-                            </p:childTnLst>
-                          </p:cTn>
-                        </p:par>
-                      </p:childTnLst>
-                    </p:cTn>
-                  </p:par>
-                </p:childTnLst>
-              </p:cTn>
-              <p:prevCondLst>
-                <p:cond evt="onPrev" delay="0">
-                  <p:tgtEl>
-                    <p:sldTgt/>
-                  </p:tgtEl>
-                </p:cond>
-              </p:prevCondLst>
-              <p:nextCondLst>
-                <p:cond evt="onNext" delay="0">
-                  <p:tgtEl>
-                    <p:sldTgt/>
-                  </p:tgtEl>
-                </p:cond>
-              </p:nextCondLst>
-            </p:seq>
-          </p:childTnLst>
-        </p:cTn>
-      </p:par>
-    </p:tnLst>
-    <p:bldLst>
-      <p:bldP spid="4" grpId="0" animBg="1"/>
-    </p:bldLst>
-  </p:timing>
-</p:sld>
-</file>
-
-<file path=ppt/slides/slide6.xml><?xml version="1.0" encoding="utf-8"?>
 <p:sld xmlns:a="http://schemas.openxmlformats.org/drawingml/2006/main" xmlns:r="http://schemas.openxmlformats.org/officeDocument/2006/relationships" xmlns:p="http://schemas.openxmlformats.org/presentationml/2006/main">
   <p:cSld>
     <p:spTree>
@@ -9105,7 +8898,7 @@
 </p:sld>
 </file>
 
-<file path=ppt/slides/slide7.xml><?xml version="1.0" encoding="utf-8"?>
+<file path=ppt/slides/slide6.xml><?xml version="1.0" encoding="utf-8"?>
 <p:sld xmlns:a="http://schemas.openxmlformats.org/drawingml/2006/main" xmlns:r="http://schemas.openxmlformats.org/officeDocument/2006/relationships" xmlns:p="http://schemas.openxmlformats.org/presentationml/2006/main">
   <p:cSld>
     <p:spTree>
@@ -9183,7 +8976,7 @@
 </p:sld>
 </file>
 
-<file path=ppt/slides/slide8.xml><?xml version="1.0" encoding="utf-8"?>
+<file path=ppt/slides/slide7.xml><?xml version="1.0" encoding="utf-8"?>
 <p:sld xmlns:a="http://schemas.openxmlformats.org/drawingml/2006/main" xmlns:r="http://schemas.openxmlformats.org/officeDocument/2006/relationships" xmlns:p="http://schemas.openxmlformats.org/presentationml/2006/main">
   <p:cSld>
     <p:spTree>
@@ -9346,7 +9139,7 @@
 </p:sld>
 </file>
 
-<file path=ppt/slides/slide9.xml><?xml version="1.0" encoding="utf-8"?>
+<file path=ppt/slides/slide8.xml><?xml version="1.0" encoding="utf-8"?>
 <p:sld xmlns:a="http://schemas.openxmlformats.org/drawingml/2006/main" xmlns:r="http://schemas.openxmlformats.org/officeDocument/2006/relationships" xmlns:p="http://schemas.openxmlformats.org/presentationml/2006/main">
   <p:cSld>
     <p:spTree>

</xml_diff>

<commit_message>
Update slides for Day 4
</commit_message>
<xml_diff>
--- a/2015/week2__recap_and_warmup_slides.pptx
+++ b/2015/week2__recap_and_warmup_slides.pptx
@@ -6100,7 +6100,7 @@
           <a:graphicData uri="http://schemas.openxmlformats.org/presentationml/2006/ole">
             <mc:AlternateContent xmlns:mc="http://schemas.openxmlformats.org/markup-compatibility/2006">
               <mc:Choice xmlns:v="urn:schemas-microsoft-com:vml" Requires="v">
-                <p:oleObj spid="_x0000_s1936" r:id="rId15" imgW="1038370" imgH="980952" progId="">
+                <p:oleObj spid="_x0000_s1938" r:id="rId15" imgW="1038370" imgH="980952" progId="">
                   <p:embed/>
                 </p:oleObj>
               </mc:Choice>
@@ -8450,6 +8450,14 @@
               <a:rPr lang="en-US" dirty="0" smtClean="0"/>
               <a:t>Tag 2: </a:t>
             </a:r>
+            <a:r>
+              <a:rPr lang="en-US" dirty="0" smtClean="0"/>
+              <a:t> 04</a:t>
+            </a:r>
+            <a:r>
+              <a:rPr lang="en-US" dirty="0" smtClean="0"/>
+              <a:t/>
+            </a:r>
             <a:br>
               <a:rPr lang="en-US" dirty="0" smtClean="0"/>
             </a:br>
@@ -8793,14 +8801,156 @@
           <a:bodyPr/>
           <a:lstStyle/>
           <a:p>
-            <a:pPr marL="342900" indent="-342900">
+            <a:pPr marL="342900" indent="-342900" defTabSz="842963">
               <a:buFontTx/>
               <a:buChar char="-"/>
+              <a:tabLst>
+                <a:tab pos="2243138" algn="l"/>
+              </a:tabLst>
             </a:pPr>
+            <a:r>
+              <a:rPr lang="en-US" dirty="0" err="1"/>
+              <a:t>Täglich</a:t>
+            </a:r>
+            <a:r>
+              <a:rPr lang="en-US" dirty="0"/>
+              <a:t> </a:t>
+            </a:r>
+            <a:r>
+              <a:rPr lang="en-US" b="1" dirty="0" err="1"/>
+              <a:t>git</a:t>
+            </a:r>
+            <a:r>
+              <a:rPr lang="en-US" b="1" dirty="0"/>
+              <a:t> pull </a:t>
+            </a:r>
+            <a:r>
+              <a:rPr lang="en-US" dirty="0"/>
+              <a:t>und </a:t>
+            </a:r>
+            <a:r>
+              <a:rPr lang="en-US" b="1" dirty="0" err="1"/>
+              <a:t>Schalter</a:t>
+            </a:r>
+            <a:r>
+              <a:rPr lang="en-US" b="1" dirty="0"/>
+              <a:t> auf 0</a:t>
+            </a:r>
+            <a:r>
+              <a:rPr lang="en-US" dirty="0"/>
+              <a:t> </a:t>
+            </a:r>
+            <a:r>
+              <a:rPr lang="en-US" dirty="0" err="1"/>
+              <a:t>nicht</a:t>
+            </a:r>
+            <a:r>
+              <a:rPr lang="en-US" dirty="0"/>
+              <a:t> </a:t>
+            </a:r>
+            <a:r>
+              <a:rPr lang="en-US" dirty="0" err="1"/>
+              <a:t>vergessen</a:t>
+            </a:r>
+            <a:endParaRPr lang="en-US" dirty="0"/>
+          </a:p>
+          <a:p>
+            <a:pPr marL="342900" indent="-342900" defTabSz="842963">
+              <a:buFontTx/>
+              <a:buChar char="-"/>
+              <a:tabLst>
+                <a:tab pos="2243138" algn="l"/>
+              </a:tabLst>
+            </a:pPr>
+            <a:r>
+              <a:rPr lang="en-US" b="1" dirty="0" err="1"/>
+              <a:t>Schalter</a:t>
+            </a:r>
+            <a:r>
+              <a:rPr lang="en-US" b="1" dirty="0"/>
+              <a:t>-Score</a:t>
+            </a:r>
+          </a:p>
+          <a:p>
+            <a:pPr marL="692150" lvl="1" indent="-342900" defTabSz="842963">
+              <a:buFontTx/>
+              <a:buChar char="-"/>
+              <a:tabLst>
+                <a:tab pos="2243138" algn="l"/>
+              </a:tabLst>
+            </a:pPr>
+            <a:r>
+              <a:rPr lang="en-US" dirty="0"/>
+              <a:t>Tag 1: 13</a:t>
+            </a:r>
+          </a:p>
+          <a:p>
+            <a:pPr marL="692150" lvl="1" indent="-342900" defTabSz="842963">
+              <a:buFontTx/>
+              <a:buChar char="-"/>
+              <a:tabLst>
+                <a:tab pos="2243138" algn="l"/>
+              </a:tabLst>
+            </a:pPr>
+            <a:r>
+              <a:rPr lang="en-US" dirty="0"/>
+              <a:t>Tag 2</a:t>
+            </a:r>
+            <a:r>
+              <a:rPr lang="en-US"/>
+              <a:t>:  </a:t>
+            </a:r>
+            <a:r>
+              <a:rPr lang="en-US"/>
+              <a:t>4</a:t>
+            </a:r>
+            <a:endParaRPr lang="en-US" smtClean="0"/>
+          </a:p>
+          <a:p>
+            <a:pPr marL="692150" lvl="1" indent="-342900" defTabSz="842963">
+              <a:buFontTx/>
+              <a:buChar char="-"/>
+              <a:tabLst>
+                <a:tab pos="2243138" algn="l"/>
+              </a:tabLst>
+            </a:pPr>
+            <a:r>
+              <a:rPr lang="en-US" dirty="0" smtClean="0"/>
+              <a:t>Tag 3: </a:t>
+            </a:r>
             <a:endParaRPr lang="en-US" dirty="0"/>
           </a:p>
         </p:txBody>
       </p:sp>
+      <p:pic>
+        <p:nvPicPr>
+          <p:cNvPr id="6" name="Grafik 5"/>
+          <p:cNvPicPr>
+            <a:picLocks noChangeAspect="1"/>
+          </p:cNvPicPr>
+          <p:nvPr/>
+        </p:nvPicPr>
+        <p:blipFill rotWithShape="1">
+          <a:blip r:embed="rId2" cstate="print">
+            <a:extLst>
+              <a:ext uri="{28A0092B-C50C-407E-A947-70E740481C1C}">
+                <a14:useLocalDpi xmlns:a14="http://schemas.microsoft.com/office/drawing/2010/main" val="0"/>
+              </a:ext>
+            </a:extLst>
+          </a:blip>
+          <a:srcRect l="29525" t="17348" r="31100" b="8001"/>
+          <a:stretch/>
+        </p:blipFill>
+        <p:spPr>
+          <a:xfrm>
+            <a:off x="3131840" y="1916832"/>
+            <a:ext cx="1150214" cy="1226667"/>
+          </a:xfrm>
+          <a:prstGeom prst="rect">
+            <a:avLst/>
+          </a:prstGeom>
+        </p:spPr>
+      </p:pic>
     </p:spTree>
     <p:extLst>
       <p:ext uri="{BB962C8B-B14F-4D97-AF65-F5344CB8AC3E}">
@@ -8832,15 +8982,10 @@
                             </p:stCondLst>
                             <p:childTnLst>
                               <p:par>
-                                <p:cTn id="5" presetID="1" presetClass="entr" presetSubtype="0" fill="hold" nodeType="clickEffect" nodePh="1">
+                                <p:cTn id="5" presetID="1" presetClass="entr" presetSubtype="0" fill="hold" nodeType="clickEffect">
                                   <p:stCondLst>
                                     <p:cond delay="0"/>
                                   </p:stCondLst>
-                                  <p:endCondLst>
-                                    <p:cond evt="begin" delay="0">
-                                      <p:tn val="5"/>
-                                    </p:cond>
-                                  </p:endCondLst>
                                   <p:childTnLst>
                                     <p:set>
                                       <p:cBhvr>
@@ -8853,6 +8998,202 @@
                                           <p:spTgt spid="3">
                                             <p:txEl>
                                               <p:pRg st="0" end="0"/>
+                                            </p:txEl>
+                                          </p:spTgt>
+                                        </p:tgtEl>
+                                        <p:attrNameLst>
+                                          <p:attrName>style.visibility</p:attrName>
+                                        </p:attrNameLst>
+                                      </p:cBhvr>
+                                      <p:to>
+                                        <p:strVal val="visible"/>
+                                      </p:to>
+                                    </p:set>
+                                  </p:childTnLst>
+                                </p:cTn>
+                              </p:par>
+                            </p:childTnLst>
+                          </p:cTn>
+                        </p:par>
+                      </p:childTnLst>
+                    </p:cTn>
+                  </p:par>
+                  <p:par>
+                    <p:cTn id="7" fill="hold">
+                      <p:stCondLst>
+                        <p:cond delay="indefinite"/>
+                      </p:stCondLst>
+                      <p:childTnLst>
+                        <p:par>
+                          <p:cTn id="8" fill="hold">
+                            <p:stCondLst>
+                              <p:cond delay="0"/>
+                            </p:stCondLst>
+                            <p:childTnLst>
+                              <p:par>
+                                <p:cTn id="9" presetID="1" presetClass="entr" presetSubtype="0" fill="hold" nodeType="clickEffect">
+                                  <p:stCondLst>
+                                    <p:cond delay="0"/>
+                                  </p:stCondLst>
+                                  <p:childTnLst>
+                                    <p:set>
+                                      <p:cBhvr>
+                                        <p:cTn id="10" dur="1" fill="hold">
+                                          <p:stCondLst>
+                                            <p:cond delay="0"/>
+                                          </p:stCondLst>
+                                        </p:cTn>
+                                        <p:tgtEl>
+                                          <p:spTgt spid="3">
+                                            <p:txEl>
+                                              <p:pRg st="1" end="1"/>
+                                            </p:txEl>
+                                          </p:spTgt>
+                                        </p:tgtEl>
+                                        <p:attrNameLst>
+                                          <p:attrName>style.visibility</p:attrName>
+                                        </p:attrNameLst>
+                                      </p:cBhvr>
+                                      <p:to>
+                                        <p:strVal val="visible"/>
+                                      </p:to>
+                                    </p:set>
+                                  </p:childTnLst>
+                                </p:cTn>
+                              </p:par>
+                            </p:childTnLst>
+                          </p:cTn>
+                        </p:par>
+                      </p:childTnLst>
+                    </p:cTn>
+                  </p:par>
+                  <p:par>
+                    <p:cTn id="11" fill="hold">
+                      <p:stCondLst>
+                        <p:cond delay="indefinite"/>
+                      </p:stCondLst>
+                      <p:childTnLst>
+                        <p:par>
+                          <p:cTn id="12" fill="hold">
+                            <p:stCondLst>
+                              <p:cond delay="0"/>
+                            </p:stCondLst>
+                            <p:childTnLst>
+                              <p:par>
+                                <p:cTn id="13" presetID="1" presetClass="entr" presetSubtype="0" fill="hold" nodeType="clickEffect">
+                                  <p:stCondLst>
+                                    <p:cond delay="0"/>
+                                  </p:stCondLst>
+                                  <p:childTnLst>
+                                    <p:set>
+                                      <p:cBhvr>
+                                        <p:cTn id="14" dur="1" fill="hold">
+                                          <p:stCondLst>
+                                            <p:cond delay="0"/>
+                                          </p:stCondLst>
+                                        </p:cTn>
+                                        <p:tgtEl>
+                                          <p:spTgt spid="3">
+                                            <p:txEl>
+                                              <p:pRg st="2" end="2"/>
+                                            </p:txEl>
+                                          </p:spTgt>
+                                        </p:tgtEl>
+                                        <p:attrNameLst>
+                                          <p:attrName>style.visibility</p:attrName>
+                                        </p:attrNameLst>
+                                      </p:cBhvr>
+                                      <p:to>
+                                        <p:strVal val="visible"/>
+                                      </p:to>
+                                    </p:set>
+                                  </p:childTnLst>
+                                </p:cTn>
+                              </p:par>
+                            </p:childTnLst>
+                          </p:cTn>
+                        </p:par>
+                      </p:childTnLst>
+                    </p:cTn>
+                  </p:par>
+                  <p:par>
+                    <p:cTn id="15" fill="hold">
+                      <p:stCondLst>
+                        <p:cond delay="indefinite"/>
+                      </p:stCondLst>
+                      <p:childTnLst>
+                        <p:par>
+                          <p:cTn id="16" fill="hold">
+                            <p:stCondLst>
+                              <p:cond delay="0"/>
+                            </p:stCondLst>
+                            <p:childTnLst>
+                              <p:par>
+                                <p:cTn id="17" presetID="1" presetClass="entr" presetSubtype="0" fill="hold" nodeType="clickEffect">
+                                  <p:stCondLst>
+                                    <p:cond delay="0"/>
+                                  </p:stCondLst>
+                                  <p:childTnLst>
+                                    <p:set>
+                                      <p:cBhvr>
+                                        <p:cTn id="18" dur="1" fill="hold">
+                                          <p:stCondLst>
+                                            <p:cond delay="0"/>
+                                          </p:stCondLst>
+                                        </p:cTn>
+                                        <p:tgtEl>
+                                          <p:spTgt spid="3">
+                                            <p:txEl>
+                                              <p:pRg st="3" end="3"/>
+                                            </p:txEl>
+                                          </p:spTgt>
+                                        </p:tgtEl>
+                                        <p:attrNameLst>
+                                          <p:attrName>style.visibility</p:attrName>
+                                        </p:attrNameLst>
+                                      </p:cBhvr>
+                                      <p:to>
+                                        <p:strVal val="visible"/>
+                                      </p:to>
+                                    </p:set>
+                                  </p:childTnLst>
+                                </p:cTn>
+                              </p:par>
+                            </p:childTnLst>
+                          </p:cTn>
+                        </p:par>
+                      </p:childTnLst>
+                    </p:cTn>
+                  </p:par>
+                  <p:par>
+                    <p:cTn id="19" fill="hold">
+                      <p:stCondLst>
+                        <p:cond delay="indefinite"/>
+                      </p:stCondLst>
+                      <p:childTnLst>
+                        <p:par>
+                          <p:cTn id="20" fill="hold">
+                            <p:stCondLst>
+                              <p:cond delay="0"/>
+                            </p:stCondLst>
+                            <p:childTnLst>
+                              <p:par>
+                                <p:cTn id="21" presetID="1" presetClass="entr" presetSubtype="0" fill="hold" nodeType="clickEffect">
+                                  <p:stCondLst>
+                                    <p:cond delay="0"/>
+                                  </p:stCondLst>
+                                  <p:childTnLst>
+                                    <p:set>
+                                      <p:cBhvr>
+                                        <p:cTn id="22" dur="1" fill="hold">
+                                          <p:stCondLst>
+                                            <p:cond delay="0"/>
+                                          </p:stCondLst>
+                                        </p:cTn>
+                                        <p:tgtEl>
+                                          <p:spTgt spid="3">
+                                            <p:txEl>
+                                              <p:pRg st="4" end="4"/>
                                             </p:txEl>
                                           </p:spTgt>
                                         </p:tgtEl>

</xml_diff>

<commit_message>
Minor bug fixes in slides
 - class -> typename
</commit_message>
<xml_diff>
--- a/2015/week2__recap_and_warmup_slides.pptx
+++ b/2015/week2__recap_and_warmup_slides.pptx
@@ -6100,7 +6100,7 @@
           <a:graphicData uri="http://schemas.openxmlformats.org/presentationml/2006/ole">
             <mc:AlternateContent xmlns:mc="http://schemas.openxmlformats.org/markup-compatibility/2006">
               <mc:Choice xmlns:v="urn:schemas-microsoft-com:vml" Requires="v">
-                <p:oleObj spid="_x0000_s1938" r:id="rId15" imgW="1038370" imgH="980952" progId="">
+                <p:oleObj spid="_x0000_s1948" r:id="rId15" imgW="1038370" imgH="980952" progId="">
                   <p:embed/>
                 </p:oleObj>
               </mc:Choice>
@@ -6538,7 +6538,7 @@
                 </a:lnSpc>
                 <a:defRPr/>
               </a:pPr>
-              <a:t>21.09.2015</a:t>
+              <a:t>22.09.2015</a:t>
             </a:fld>
             <a:r>
               <a:rPr lang="en-GB" altLang="de-DE" sz="1000" smtClean="0">
@@ -8448,15 +8448,7 @@
             </a:pPr>
             <a:r>
               <a:rPr lang="en-US" dirty="0" smtClean="0"/>
-              <a:t>Tag 2: </a:t>
-            </a:r>
-            <a:r>
-              <a:rPr lang="en-US" dirty="0" smtClean="0"/>
-              <a:t> 04</a:t>
-            </a:r>
-            <a:r>
-              <a:rPr lang="en-US" dirty="0" smtClean="0"/>
-              <a:t/>
+              <a:t>Tag 2:  04</a:t>
             </a:r>
             <a:br>
               <a:rPr lang="en-US" dirty="0" smtClean="0"/>
@@ -8849,9 +8841,23 @@
               <a:t> </a:t>
             </a:r>
             <a:r>
-              <a:rPr lang="en-US" dirty="0" err="1"/>
+              <a:rPr lang="en-US" dirty="0" err="1" smtClean="0"/>
               <a:t>vergessen</a:t>
             </a:r>
+            <a:r>
+              <a:rPr lang="en-US" dirty="0" smtClean="0"/>
+              <a:t/>
+            </a:r>
+            <a:br>
+              <a:rPr lang="en-US" dirty="0" smtClean="0"/>
+            </a:br>
+            <a:r>
+              <a:rPr lang="en-US" dirty="0" smtClean="0"/>
+              <a:t/>
+            </a:r>
+            <a:br>
+              <a:rPr lang="en-US" dirty="0" smtClean="0"/>
+            </a:br>
             <a:endParaRPr lang="en-US" dirty="0"/>
           </a:p>
           <a:p>
@@ -8863,13 +8869,14 @@
               </a:tabLst>
             </a:pPr>
             <a:r>
-              <a:rPr lang="en-US" b="1" dirty="0" err="1"/>
+              <a:rPr lang="en-US" b="1" dirty="0" err="1" smtClean="0"/>
               <a:t>Schalter</a:t>
             </a:r>
             <a:r>
-              <a:rPr lang="en-US" b="1" dirty="0"/>
+              <a:rPr lang="en-US" b="1" dirty="0" smtClean="0"/>
               <a:t>-Score</a:t>
             </a:r>
+            <a:endParaRPr lang="en-US" b="1" dirty="0"/>
           </a:p>
           <a:p>
             <a:pPr marL="692150" lvl="1" indent="-342900" defTabSz="842963">
@@ -8894,17 +8901,9 @@
             </a:pPr>
             <a:r>
               <a:rPr lang="en-US" dirty="0"/>
-              <a:t>Tag 2</a:t>
-            </a:r>
-            <a:r>
-              <a:rPr lang="en-US"/>
-              <a:t>:  </a:t>
-            </a:r>
-            <a:r>
-              <a:rPr lang="en-US"/>
-              <a:t>4</a:t>
-            </a:r>
-            <a:endParaRPr lang="en-US" smtClean="0"/>
+              <a:t>Tag 2:  4</a:t>
+            </a:r>
+            <a:endParaRPr lang="en-US" dirty="0" smtClean="0"/>
           </a:p>
           <a:p>
             <a:pPr marL="692150" lvl="1" indent="-342900" defTabSz="842963">
@@ -8918,7 +8917,151 @@
               <a:rPr lang="en-US" dirty="0" smtClean="0"/>
               <a:t>Tag 3: </a:t>
             </a:r>
-            <a:endParaRPr lang="en-US" dirty="0"/>
+            <a:r>
+              <a:rPr lang="en-US" dirty="0" smtClean="0"/>
+              <a:t> 3</a:t>
+            </a:r>
+            <a:r>
+              <a:rPr lang="en-US" dirty="0" smtClean="0"/>
+              <a:t/>
+            </a:r>
+            <a:br>
+              <a:rPr lang="en-US" dirty="0" smtClean="0"/>
+            </a:br>
+            <a:endParaRPr lang="en-US" dirty="0" smtClean="0"/>
+          </a:p>
+          <a:p>
+            <a:pPr marL="342900" indent="-342900" defTabSz="842963">
+              <a:buFontTx/>
+              <a:buChar char="-"/>
+              <a:tabLst>
+                <a:tab pos="2243138" algn="l"/>
+              </a:tabLst>
+            </a:pPr>
+            <a:r>
+              <a:rPr lang="en-US" dirty="0" err="1" smtClean="0"/>
+              <a:t>Bearbeitung</a:t>
+            </a:r>
+            <a:r>
+              <a:rPr lang="en-US" dirty="0" smtClean="0"/>
+              <a:t> der </a:t>
+            </a:r>
+            <a:r>
+              <a:rPr lang="en-US" dirty="0" err="1" smtClean="0"/>
+              <a:t>Übungsblätter</a:t>
+            </a:r>
+            <a:r>
+              <a:rPr lang="en-US" dirty="0" smtClean="0"/>
+              <a:t>: </a:t>
+            </a:r>
+            <a:r>
+              <a:rPr lang="en-US" b="1" dirty="0" err="1" smtClean="0"/>
+              <a:t>Eher</a:t>
+            </a:r>
+            <a:r>
+              <a:rPr lang="en-US" b="1" dirty="0" smtClean="0"/>
+              <a:t> </a:t>
+            </a:r>
+            <a:r>
+              <a:rPr lang="en-US" b="1" dirty="0" err="1" smtClean="0"/>
+              <a:t>mit</a:t>
+            </a:r>
+            <a:r>
+              <a:rPr lang="en-US" b="1" dirty="0" smtClean="0"/>
+              <a:t> Blatt 4 </a:t>
+            </a:r>
+            <a:r>
+              <a:rPr lang="en-US" b="1" dirty="0" err="1" smtClean="0"/>
+              <a:t>beginnen</a:t>
+            </a:r>
+            <a:r>
+              <a:rPr lang="en-US" b="1" dirty="0" smtClean="0"/>
+              <a:t> – </a:t>
+            </a:r>
+            <a:r>
+              <a:rPr lang="en-US" b="1" dirty="0" err="1" smtClean="0"/>
+              <a:t>Aufzug</a:t>
+            </a:r>
+            <a:r>
+              <a:rPr lang="en-US" b="1" dirty="0" smtClean="0"/>
+              <a:t> </a:t>
+            </a:r>
+            <a:r>
+              <a:rPr lang="en-US" b="1" dirty="0" err="1" smtClean="0"/>
+              <a:t>verschieben</a:t>
+            </a:r>
+            <a:r>
+              <a:rPr lang="en-US" b="1" dirty="0" smtClean="0"/>
+              <a:t>.</a:t>
+            </a:r>
+          </a:p>
+          <a:p>
+            <a:pPr marL="342900" indent="-342900" defTabSz="842963">
+              <a:buFontTx/>
+              <a:buChar char="-"/>
+              <a:tabLst>
+                <a:tab pos="2243138" algn="l"/>
+              </a:tabLst>
+            </a:pPr>
+            <a:endParaRPr lang="en-US" b="1" dirty="0" smtClean="0"/>
+          </a:p>
+          <a:p>
+            <a:pPr marL="342900" indent="-342900" defTabSz="842963">
+              <a:buFontTx/>
+              <a:buChar char="-"/>
+              <a:tabLst>
+                <a:tab pos="2243138" algn="l"/>
+              </a:tabLst>
+            </a:pPr>
+            <a:r>
+              <a:rPr lang="en-US" dirty="0" err="1" smtClean="0"/>
+              <a:t>Ansonsten</a:t>
+            </a:r>
+            <a:r>
+              <a:rPr lang="en-US" dirty="0" smtClean="0"/>
+              <a:t>: </a:t>
+            </a:r>
+            <a:r>
+              <a:rPr lang="en-US" b="1" dirty="0" err="1" smtClean="0"/>
+              <a:t>Gibt</a:t>
+            </a:r>
+            <a:r>
+              <a:rPr lang="en-US" b="1" dirty="0" smtClean="0"/>
+              <a:t> </a:t>
+            </a:r>
+            <a:r>
+              <a:rPr lang="en-US" b="1" dirty="0" err="1" smtClean="0"/>
+              <a:t>es</a:t>
+            </a:r>
+            <a:r>
+              <a:rPr lang="en-US" b="1" dirty="0" smtClean="0"/>
+              <a:t> </a:t>
+            </a:r>
+            <a:r>
+              <a:rPr lang="en-US" b="1" dirty="0" err="1" smtClean="0"/>
+              <a:t>Fragen</a:t>
+            </a:r>
+            <a:r>
+              <a:rPr lang="en-US" b="1" dirty="0" smtClean="0"/>
+              <a:t> von </a:t>
+            </a:r>
+            <a:r>
+              <a:rPr lang="en-US" b="1" dirty="0" err="1" smtClean="0"/>
+              <a:t>eurer</a:t>
+            </a:r>
+            <a:r>
+              <a:rPr lang="en-US" b="1" dirty="0" smtClean="0"/>
+              <a:t> </a:t>
+            </a:r>
+            <a:r>
+              <a:rPr lang="en-US" b="1" dirty="0" err="1" smtClean="0"/>
+              <a:t>Seite</a:t>
+            </a:r>
+            <a:r>
+              <a:rPr lang="en-US" b="1" dirty="0" smtClean="0"/>
+              <a:t>? </a:t>
+            </a:r>
+            <a:endParaRPr lang="en-US" b="1" dirty="0"/>
           </a:p>
         </p:txBody>
       </p:sp>
@@ -8943,7 +9086,7 @@
         </p:blipFill>
         <p:spPr>
           <a:xfrm>
-            <a:off x="3131840" y="1916832"/>
+            <a:off x="2771800" y="2636912"/>
             <a:ext cx="1150214" cy="1226667"/>
           </a:xfrm>
           <a:prstGeom prst="rect">
@@ -9214,6 +9357,104 @@
                       </p:childTnLst>
                     </p:cTn>
                   </p:par>
+                  <p:par>
+                    <p:cTn id="23" fill="hold">
+                      <p:stCondLst>
+                        <p:cond delay="indefinite"/>
+                      </p:stCondLst>
+                      <p:childTnLst>
+                        <p:par>
+                          <p:cTn id="24" fill="hold">
+                            <p:stCondLst>
+                              <p:cond delay="0"/>
+                            </p:stCondLst>
+                            <p:childTnLst>
+                              <p:par>
+                                <p:cTn id="25" presetID="1" presetClass="entr" presetSubtype="0" fill="hold" nodeType="clickEffect">
+                                  <p:stCondLst>
+                                    <p:cond delay="0"/>
+                                  </p:stCondLst>
+                                  <p:childTnLst>
+                                    <p:set>
+                                      <p:cBhvr>
+                                        <p:cTn id="26" dur="1" fill="hold">
+                                          <p:stCondLst>
+                                            <p:cond delay="0"/>
+                                          </p:stCondLst>
+                                        </p:cTn>
+                                        <p:tgtEl>
+                                          <p:spTgt spid="3">
+                                            <p:txEl>
+                                              <p:pRg st="5" end="5"/>
+                                            </p:txEl>
+                                          </p:spTgt>
+                                        </p:tgtEl>
+                                        <p:attrNameLst>
+                                          <p:attrName>style.visibility</p:attrName>
+                                        </p:attrNameLst>
+                                      </p:cBhvr>
+                                      <p:to>
+                                        <p:strVal val="visible"/>
+                                      </p:to>
+                                    </p:set>
+                                  </p:childTnLst>
+                                </p:cTn>
+                              </p:par>
+                            </p:childTnLst>
+                          </p:cTn>
+                        </p:par>
+                      </p:childTnLst>
+                    </p:cTn>
+                  </p:par>
+                  <p:par>
+                    <p:cTn id="27" fill="hold">
+                      <p:stCondLst>
+                        <p:cond delay="indefinite"/>
+                      </p:stCondLst>
+                      <p:childTnLst>
+                        <p:par>
+                          <p:cTn id="28" fill="hold">
+                            <p:stCondLst>
+                              <p:cond delay="0"/>
+                            </p:stCondLst>
+                            <p:childTnLst>
+                              <p:par>
+                                <p:cTn id="29" presetID="1" presetClass="entr" presetSubtype="0" fill="hold" nodeType="clickEffect">
+                                  <p:stCondLst>
+                                    <p:cond delay="0"/>
+                                  </p:stCondLst>
+                                  <p:childTnLst>
+                                    <p:set>
+                                      <p:cBhvr>
+                                        <p:cTn id="30" dur="1" fill="hold">
+                                          <p:stCondLst>
+                                            <p:cond delay="0"/>
+                                          </p:stCondLst>
+                                        </p:cTn>
+                                        <p:tgtEl>
+                                          <p:spTgt spid="3">
+                                            <p:txEl>
+                                              <p:pRg st="7" end="7"/>
+                                            </p:txEl>
+                                          </p:spTgt>
+                                        </p:tgtEl>
+                                        <p:attrNameLst>
+                                          <p:attrName>style.visibility</p:attrName>
+                                        </p:attrNameLst>
+                                      </p:cBhvr>
+                                      <p:to>
+                                        <p:strVal val="visible"/>
+                                      </p:to>
+                                    </p:set>
+                                  </p:childTnLst>
+                                </p:cTn>
+                              </p:par>
+                            </p:childTnLst>
+                          </p:cTn>
+                        </p:par>
+                      </p:childTnLst>
+                    </p:cTn>
+                  </p:par>
                 </p:childTnLst>
               </p:cTn>
               <p:prevCondLst>
@@ -9293,7 +9534,31 @@
           <a:bodyPr/>
           <a:lstStyle/>
           <a:p>
-            <a:endParaRPr lang="en-US"/>
+            <a:r>
+              <a:rPr lang="en-US" dirty="0" err="1" smtClean="0"/>
+              <a:t>Siehe</a:t>
+            </a:r>
+            <a:r>
+              <a:rPr lang="en-US" dirty="0" smtClean="0"/>
+              <a:t>: </a:t>
+            </a:r>
+            <a:r>
+              <a:rPr lang="en-US" dirty="0" err="1" smtClean="0"/>
+              <a:t>Implizite</a:t>
+            </a:r>
+            <a:r>
+              <a:rPr lang="en-US" dirty="0" smtClean="0"/>
+              <a:t> </a:t>
+            </a:r>
+            <a:r>
+              <a:rPr lang="en-US" dirty="0" err="1" smtClean="0"/>
+              <a:t>Typkonvertierun</a:t>
+            </a:r>
+            <a:r>
+              <a:rPr lang="en-US" dirty="0" err="1"/>
+              <a:t>g</a:t>
+            </a:r>
+            <a:endParaRPr lang="en-US" dirty="0"/>
           </a:p>
         </p:txBody>
       </p:sp>
@@ -9373,13 +9638,300 @@
           <a:lstStyle/>
           <a:p>
             <a:pPr marL="342900" indent="-342900">
-              <a:buFont typeface="Wingdings" panose="05000000000000000000" pitchFamily="2" charset="2"/>
-              <a:buChar char="§"/>
+              <a:buFontTx/>
+              <a:buChar char="-"/>
+            </a:pPr>
+            <a:r>
+              <a:rPr lang="en-US" b="1" dirty="0"/>
+              <a:t>Evaluation</a:t>
+            </a:r>
+            <a:r>
+              <a:rPr lang="en-US" dirty="0"/>
+              <a:t> </a:t>
+            </a:r>
+            <a:r>
+              <a:rPr lang="en-US" dirty="0" smtClean="0"/>
+              <a:t>morgen</a:t>
+            </a:r>
+            <a:endParaRPr lang="en-US" dirty="0"/>
+          </a:p>
+          <a:p>
+            <a:pPr lvl="1" indent="0">
+              <a:buNone/>
+            </a:pPr>
+            <a:r>
+              <a:rPr lang="en-US" b="1" dirty="0"/>
+              <a:t>	5.1 </a:t>
+            </a:r>
+            <a:r>
+              <a:rPr lang="en-US" dirty="0" err="1"/>
+              <a:t>Stärkerer</a:t>
+            </a:r>
+            <a:r>
+              <a:rPr lang="en-US" dirty="0"/>
+              <a:t> </a:t>
+            </a:r>
+            <a:r>
+              <a:rPr lang="en-US" dirty="0" err="1"/>
+              <a:t>Fokus</a:t>
+            </a:r>
+            <a:r>
+              <a:rPr lang="en-US" dirty="0"/>
+              <a:t> auf C++11 </a:t>
+            </a:r>
+            <a:r>
+              <a:rPr lang="en-US" dirty="0" err="1"/>
+              <a:t>legen</a:t>
+            </a:r>
+            <a:r>
+              <a:rPr lang="en-US" dirty="0"/>
+              <a:t>?</a:t>
+            </a:r>
+          </a:p>
+          <a:p>
+            <a:pPr lvl="1" indent="0">
+              <a:buNone/>
+            </a:pPr>
+            <a:r>
+              <a:rPr lang="en-US" b="1" dirty="0"/>
+              <a:t>	5.2 </a:t>
+            </a:r>
+            <a:r>
+              <a:rPr lang="en-US" dirty="0" err="1"/>
+              <a:t>Stärkerer</a:t>
+            </a:r>
+            <a:r>
+              <a:rPr lang="en-US" dirty="0"/>
+              <a:t> </a:t>
+            </a:r>
+            <a:r>
+              <a:rPr lang="en-US" dirty="0" err="1"/>
+              <a:t>Fokus</a:t>
+            </a:r>
+            <a:r>
+              <a:rPr lang="en-US" dirty="0"/>
+              <a:t> auf C-</a:t>
+            </a:r>
+            <a:r>
+              <a:rPr lang="en-US" dirty="0" err="1"/>
+              <a:t>Programmierung</a:t>
+            </a:r>
+            <a:r>
+              <a:rPr lang="en-US" dirty="0"/>
+              <a:t> </a:t>
+            </a:r>
+            <a:r>
+              <a:rPr lang="en-US" dirty="0" err="1"/>
+              <a:t>legen</a:t>
+            </a:r>
+            <a:r>
+              <a:rPr lang="en-US" dirty="0" smtClean="0"/>
+              <a:t>?</a:t>
+            </a:r>
+            <a:endParaRPr lang="en-US" dirty="0"/>
+          </a:p>
+          <a:p>
+            <a:pPr marL="342900" indent="-342900">
+              <a:buFontTx/>
+              <a:buChar char="-"/>
+            </a:pPr>
+            <a:r>
+              <a:rPr lang="en-US" b="1" dirty="0" err="1"/>
+              <a:t>Gastvortrag</a:t>
+            </a:r>
+            <a:r>
+              <a:rPr lang="en-US" b="1" dirty="0"/>
+              <a:t> </a:t>
+            </a:r>
+            <a:r>
+              <a:rPr lang="en-US" b="1" dirty="0" smtClean="0"/>
+              <a:t>morgen</a:t>
+            </a:r>
+            <a:r>
+              <a:rPr lang="en-US" dirty="0" smtClean="0"/>
+              <a:t>: </a:t>
+            </a:r>
+            <a:r>
+              <a:rPr lang="en-US" dirty="0"/>
+              <a:t>Holger Wech von </a:t>
+            </a:r>
+            <a:r>
+              <a:rPr lang="en-US" dirty="0" smtClean="0"/>
+              <a:t>Cypress/</a:t>
+            </a:r>
+            <a:r>
+              <a:rPr lang="en-US" dirty="0" err="1" smtClean="0"/>
+              <a:t>Spansion</a:t>
+            </a:r>
+            <a:endParaRPr lang="en-US" dirty="0" smtClean="0"/>
+          </a:p>
+          <a:p>
+            <a:pPr marL="342900" indent="-342900">
+              <a:buFontTx/>
+              <a:buChar char="-"/>
+            </a:pPr>
+            <a:endParaRPr lang="en-US" b="1" dirty="0"/>
+          </a:p>
+          <a:p>
+            <a:pPr marL="342900" indent="-342900">
+              <a:buFontTx/>
+              <a:buChar char="-"/>
             </a:pPr>
             <a:endParaRPr lang="en-US" b="1" dirty="0" smtClean="0"/>
           </a:p>
+          <a:p>
+            <a:pPr marL="342900" indent="-342900">
+              <a:buFontTx/>
+              <a:buChar char="-"/>
+            </a:pPr>
+            <a:endParaRPr lang="en-US" b="1" dirty="0"/>
+          </a:p>
+          <a:p>
+            <a:pPr marL="342900" indent="-342900">
+              <a:buFontTx/>
+              <a:buChar char="-"/>
+            </a:pPr>
+            <a:endParaRPr lang="en-US" b="1" dirty="0" smtClean="0"/>
+          </a:p>
+          <a:p>
+            <a:pPr marL="342900" indent="-342900">
+              <a:buFontTx/>
+              <a:buChar char="-"/>
+            </a:pPr>
+            <a:endParaRPr lang="en-US" b="1" dirty="0"/>
+          </a:p>
+          <a:p>
+            <a:pPr marL="342900" indent="-342900">
+              <a:buFontTx/>
+              <a:buChar char="-"/>
+            </a:pPr>
+            <a:r>
+              <a:rPr lang="en-US" b="1" dirty="0" err="1" smtClean="0"/>
+              <a:t>Ein</a:t>
+            </a:r>
+            <a:r>
+              <a:rPr lang="en-US" b="1" dirty="0" smtClean="0"/>
+              <a:t> </a:t>
+            </a:r>
+            <a:r>
+              <a:rPr lang="en-US" b="1" dirty="0" err="1" smtClean="0"/>
+              <a:t>paar</a:t>
+            </a:r>
+            <a:r>
+              <a:rPr lang="en-US" b="1" dirty="0" smtClean="0"/>
+              <a:t> </a:t>
+            </a:r>
+            <a:r>
+              <a:rPr lang="en-US" b="1" dirty="0" err="1" smtClean="0"/>
+              <a:t>Worte</a:t>
+            </a:r>
+            <a:r>
+              <a:rPr lang="en-US" b="1" dirty="0" smtClean="0"/>
+              <a:t> </a:t>
+            </a:r>
+            <a:r>
+              <a:rPr lang="en-US" b="1" dirty="0" err="1" smtClean="0"/>
+              <a:t>zur</a:t>
+            </a:r>
+            <a:r>
+              <a:rPr lang="en-US" b="1" dirty="0" smtClean="0"/>
+              <a:t> </a:t>
+            </a:r>
+            <a:r>
+              <a:rPr lang="en-US" b="1" dirty="0" err="1" smtClean="0"/>
+              <a:t>Klausur</a:t>
+            </a:r>
+            <a:endParaRPr lang="en-US" b="1" dirty="0" smtClean="0"/>
+          </a:p>
         </p:txBody>
       </p:sp>
+      <p:grpSp>
+        <p:nvGrpSpPr>
+          <p:cNvPr id="4" name="Gruppieren 3"/>
+          <p:cNvGrpSpPr/>
+          <p:nvPr/>
+        </p:nvGrpSpPr>
+        <p:grpSpPr>
+          <a:xfrm>
+            <a:off x="2482974" y="2996952"/>
+            <a:ext cx="4176464" cy="1560588"/>
+            <a:chOff x="1475656" y="4521395"/>
+            <a:chExt cx="4992961" cy="1865682"/>
+          </a:xfrm>
+        </p:grpSpPr>
+        <p:pic>
+          <p:nvPicPr>
+            <p:cNvPr id="5" name="Grafik 4"/>
+            <p:cNvPicPr>
+              <a:picLocks noChangeAspect="1"/>
+            </p:cNvPicPr>
+            <p:nvPr/>
+          </p:nvPicPr>
+          <p:blipFill>
+            <a:blip r:embed="rId2"/>
+            <a:stretch>
+              <a:fillRect/>
+            </a:stretch>
+          </p:blipFill>
+          <p:spPr>
+            <a:xfrm>
+              <a:off x="1475656" y="4521395"/>
+              <a:ext cx="4824536" cy="1865682"/>
+            </a:xfrm>
+            <a:prstGeom prst="rect">
+              <a:avLst/>
+            </a:prstGeom>
+          </p:spPr>
+        </p:pic>
+        <p:sp>
+          <p:nvSpPr>
+            <p:cNvPr id="6" name="Rechteck 5"/>
+            <p:cNvSpPr/>
+            <p:nvPr/>
+          </p:nvSpPr>
+          <p:spPr bwMode="auto">
+            <a:xfrm>
+              <a:off x="4139952" y="5805264"/>
+              <a:ext cx="2328665" cy="170166"/>
+            </a:xfrm>
+            <a:prstGeom prst="rect">
+              <a:avLst/>
+            </a:prstGeom>
+            <a:solidFill>
+              <a:schemeClr val="bg1"/>
+            </a:solidFill>
+            <a:ln w="9525">
+              <a:noFill/>
+              <a:miter lim="800000"/>
+              <a:headEnd/>
+              <a:tailEnd/>
+            </a:ln>
+            <a:extLst/>
+          </p:spPr>
+          <p:txBody>
+            <a:bodyPr wrap="square" rtlCol="0" anchor="ctr">
+              <a:spAutoFit/>
+            </a:bodyPr>
+            <a:lstStyle/>
+            <a:p>
+              <a:pPr algn="ctr" eaLnBrk="1" hangingPunct="1">
+                <a:spcBef>
+                  <a:spcPct val="0"/>
+                </a:spcBef>
+                <a:buSzTx/>
+                <a:buFont typeface="Arial" charset="0"/>
+                <a:buNone/>
+              </a:pPr>
+              <a:endParaRPr lang="en-US" sz="1400" dirty="0" err="1">
+                <a:solidFill>
+                  <a:srgbClr val="7F0055"/>
+                </a:solidFill>
+                <a:latin typeface="Consolas" pitchFamily="49" charset="0"/>
+              </a:endParaRPr>
+            </a:p>
+          </p:txBody>
+        </p:sp>
+      </p:grpSp>
     </p:spTree>
     <p:extLst>
       <p:ext uri="{BB962C8B-B14F-4D97-AF65-F5344CB8AC3E}">
@@ -9411,15 +9963,10 @@
                             </p:stCondLst>
                             <p:childTnLst>
                               <p:par>
-                                <p:cTn id="5" presetID="1" presetClass="entr" presetSubtype="0" fill="hold" grpId="0" nodeType="clickEffect" nodePh="1">
+                                <p:cTn id="5" presetID="1" presetClass="entr" presetSubtype="0" fill="hold" grpId="0" nodeType="clickEffect">
                                   <p:stCondLst>
                                     <p:cond delay="0"/>
                                   </p:stCondLst>
-                                  <p:endCondLst>
-                                    <p:cond evt="begin" delay="0">
-                                      <p:tn val="5"/>
-                                    </p:cond>
-                                  </p:endCondLst>
                                   <p:childTnLst>
                                     <p:set>
                                       <p:cBhvr>
@@ -9432,6 +9979,166 @@
                                           <p:spTgt spid="3">
                                             <p:txEl>
                                               <p:pRg st="0" end="0"/>
+                                            </p:txEl>
+                                          </p:spTgt>
+                                        </p:tgtEl>
+                                        <p:attrNameLst>
+                                          <p:attrName>style.visibility</p:attrName>
+                                        </p:attrNameLst>
+                                      </p:cBhvr>
+                                      <p:to>
+                                        <p:strVal val="visible"/>
+                                      </p:to>
+                                    </p:set>
+                                  </p:childTnLst>
+                                </p:cTn>
+                              </p:par>
+                              <p:par>
+                                <p:cTn id="7" presetID="1" presetClass="entr" presetSubtype="0" fill="hold" grpId="0" nodeType="withEffect">
+                                  <p:stCondLst>
+                                    <p:cond delay="0"/>
+                                  </p:stCondLst>
+                                  <p:childTnLst>
+                                    <p:set>
+                                      <p:cBhvr>
+                                        <p:cTn id="8" dur="1" fill="hold">
+                                          <p:stCondLst>
+                                            <p:cond delay="0"/>
+                                          </p:stCondLst>
+                                        </p:cTn>
+                                        <p:tgtEl>
+                                          <p:spTgt spid="3">
+                                            <p:txEl>
+                                              <p:pRg st="1" end="1"/>
+                                            </p:txEl>
+                                          </p:spTgt>
+                                        </p:tgtEl>
+                                        <p:attrNameLst>
+                                          <p:attrName>style.visibility</p:attrName>
+                                        </p:attrNameLst>
+                                      </p:cBhvr>
+                                      <p:to>
+                                        <p:strVal val="visible"/>
+                                      </p:to>
+                                    </p:set>
+                                  </p:childTnLst>
+                                </p:cTn>
+                              </p:par>
+                              <p:par>
+                                <p:cTn id="9" presetID="1" presetClass="entr" presetSubtype="0" fill="hold" grpId="0" nodeType="withEffect">
+                                  <p:stCondLst>
+                                    <p:cond delay="0"/>
+                                  </p:stCondLst>
+                                  <p:childTnLst>
+                                    <p:set>
+                                      <p:cBhvr>
+                                        <p:cTn id="10" dur="1" fill="hold">
+                                          <p:stCondLst>
+                                            <p:cond delay="0"/>
+                                          </p:stCondLst>
+                                        </p:cTn>
+                                        <p:tgtEl>
+                                          <p:spTgt spid="3">
+                                            <p:txEl>
+                                              <p:pRg st="2" end="2"/>
+                                            </p:txEl>
+                                          </p:spTgt>
+                                        </p:tgtEl>
+                                        <p:attrNameLst>
+                                          <p:attrName>style.visibility</p:attrName>
+                                        </p:attrNameLst>
+                                      </p:cBhvr>
+                                      <p:to>
+                                        <p:strVal val="visible"/>
+                                      </p:to>
+                                    </p:set>
+                                  </p:childTnLst>
+                                </p:cTn>
+                              </p:par>
+                            </p:childTnLst>
+                          </p:cTn>
+                        </p:par>
+                      </p:childTnLst>
+                    </p:cTn>
+                  </p:par>
+                  <p:par>
+                    <p:cTn id="11" fill="hold">
+                      <p:stCondLst>
+                        <p:cond delay="indefinite"/>
+                      </p:stCondLst>
+                      <p:childTnLst>
+                        <p:par>
+                          <p:cTn id="12" fill="hold">
+                            <p:stCondLst>
+                              <p:cond delay="0"/>
+                            </p:stCondLst>
+                            <p:childTnLst>
+                              <p:par>
+                                <p:cTn id="13" presetID="1" presetClass="entr" presetSubtype="0" fill="hold" grpId="0" nodeType="clickEffect">
+                                  <p:stCondLst>
+                                    <p:cond delay="0"/>
+                                  </p:stCondLst>
+                                  <p:childTnLst>
+                                    <p:set>
+                                      <p:cBhvr>
+                                        <p:cTn id="14" dur="1" fill="hold">
+                                          <p:stCondLst>
+                                            <p:cond delay="0"/>
+                                          </p:stCondLst>
+                                        </p:cTn>
+                                        <p:tgtEl>
+                                          <p:spTgt spid="3">
+                                            <p:txEl>
+                                              <p:pRg st="3" end="3"/>
+                                            </p:txEl>
+                                          </p:spTgt>
+                                        </p:tgtEl>
+                                        <p:attrNameLst>
+                                          <p:attrName>style.visibility</p:attrName>
+                                        </p:attrNameLst>
+                                      </p:cBhvr>
+                                      <p:to>
+                                        <p:strVal val="visible"/>
+                                      </p:to>
+                                    </p:set>
+                                  </p:childTnLst>
+                                </p:cTn>
+                              </p:par>
+                            </p:childTnLst>
+                          </p:cTn>
+                        </p:par>
+                      </p:childTnLst>
+                    </p:cTn>
+                  </p:par>
+                  <p:par>
+                    <p:cTn id="15" fill="hold">
+                      <p:stCondLst>
+                        <p:cond delay="indefinite"/>
+                      </p:stCondLst>
+                      <p:childTnLst>
+                        <p:par>
+                          <p:cTn id="16" fill="hold">
+                            <p:stCondLst>
+                              <p:cond delay="0"/>
+                            </p:stCondLst>
+                            <p:childTnLst>
+                              <p:par>
+                                <p:cTn id="17" presetID="1" presetClass="entr" presetSubtype="0" fill="hold" grpId="0" nodeType="clickEffect">
+                                  <p:stCondLst>
+                                    <p:cond delay="0"/>
+                                  </p:stCondLst>
+                                  <p:childTnLst>
+                                    <p:set>
+                                      <p:cBhvr>
+                                        <p:cTn id="18" dur="1" fill="hold">
+                                          <p:stCondLst>
+                                            <p:cond delay="0"/>
+                                          </p:stCondLst>
+                                        </p:cTn>
+                                        <p:tgtEl>
+                                          <p:spTgt spid="3">
+                                            <p:txEl>
+                                              <p:pRg st="9" end="9"/>
                                             </p:txEl>
                                           </p:spTgt>
                                         </p:tgtEl>

</xml_diff>

<commit_message>
Add some technical notes to micro-controller slides
</commit_message>
<xml_diff>
--- a/2015/week2__recap_and_warmup_slides.pptx
+++ b/2015/week2__recap_and_warmup_slides.pptx
@@ -6100,7 +6100,7 @@
           <a:graphicData uri="http://schemas.openxmlformats.org/presentationml/2006/ole">
             <mc:AlternateContent xmlns:mc="http://schemas.openxmlformats.org/markup-compatibility/2006">
               <mc:Choice xmlns:v="urn:schemas-microsoft-com:vml" Requires="v">
-                <p:oleObj spid="_x0000_s1948" r:id="rId15" imgW="1038370" imgH="980952" progId="">
+                <p:oleObj spid="_x0000_s1952" r:id="rId15" imgW="1038370" imgH="980952" progId="">
                   <p:embed/>
                 </p:oleObj>
               </mc:Choice>
@@ -6538,7 +6538,7 @@
                 </a:lnSpc>
                 <a:defRPr/>
               </a:pPr>
-              <a:t>22.09.2015</a:t>
+              <a:t>23.09.2015</a:t>
             </a:fld>
             <a:r>
               <a:rPr lang="en-GB" altLang="de-DE" sz="1000" smtClean="0">
@@ -8915,15 +8915,7 @@
             </a:pPr>
             <a:r>
               <a:rPr lang="en-US" dirty="0" smtClean="0"/>
-              <a:t>Tag 3: </a:t>
-            </a:r>
-            <a:r>
-              <a:rPr lang="en-US" dirty="0" smtClean="0"/>
-              <a:t> 3</a:t>
-            </a:r>
-            <a:r>
-              <a:rPr lang="en-US" dirty="0" smtClean="0"/>
-              <a:t/>
+              <a:t>Tag 3:  3</a:t>
             </a:r>
             <a:br>
               <a:rPr lang="en-US" dirty="0" smtClean="0"/>
@@ -9107,373 +9099,7 @@
   <p:timing>
     <p:tnLst>
       <p:par>
-        <p:cTn id="1" dur="indefinite" restart="never" nodeType="tmRoot">
-          <p:childTnLst>
-            <p:seq concurrent="1" nextAc="seek">
-              <p:cTn id="2" dur="indefinite" nodeType="mainSeq">
-                <p:childTnLst>
-                  <p:par>
-                    <p:cTn id="3" fill="hold">
-                      <p:stCondLst>
-                        <p:cond delay="indefinite"/>
-                      </p:stCondLst>
-                      <p:childTnLst>
-                        <p:par>
-                          <p:cTn id="4" fill="hold">
-                            <p:stCondLst>
-                              <p:cond delay="0"/>
-                            </p:stCondLst>
-                            <p:childTnLst>
-                              <p:par>
-                                <p:cTn id="5" presetID="1" presetClass="entr" presetSubtype="0" fill="hold" nodeType="clickEffect">
-                                  <p:stCondLst>
-                                    <p:cond delay="0"/>
-                                  </p:stCondLst>
-                                  <p:childTnLst>
-                                    <p:set>
-                                      <p:cBhvr>
-                                        <p:cTn id="6" dur="1" fill="hold">
-                                          <p:stCondLst>
-                                            <p:cond delay="0"/>
-                                          </p:stCondLst>
-                                        </p:cTn>
-                                        <p:tgtEl>
-                                          <p:spTgt spid="3">
-                                            <p:txEl>
-                                              <p:pRg st="0" end="0"/>
-                                            </p:txEl>
-                                          </p:spTgt>
-                                        </p:tgtEl>
-                                        <p:attrNameLst>
-                                          <p:attrName>style.visibility</p:attrName>
-                                        </p:attrNameLst>
-                                      </p:cBhvr>
-                                      <p:to>
-                                        <p:strVal val="visible"/>
-                                      </p:to>
-                                    </p:set>
-                                  </p:childTnLst>
-                                </p:cTn>
-                              </p:par>
-                            </p:childTnLst>
-                          </p:cTn>
-                        </p:par>
-                      </p:childTnLst>
-                    </p:cTn>
-                  </p:par>
-                  <p:par>
-                    <p:cTn id="7" fill="hold">
-                      <p:stCondLst>
-                        <p:cond delay="indefinite"/>
-                      </p:stCondLst>
-                      <p:childTnLst>
-                        <p:par>
-                          <p:cTn id="8" fill="hold">
-                            <p:stCondLst>
-                              <p:cond delay="0"/>
-                            </p:stCondLst>
-                            <p:childTnLst>
-                              <p:par>
-                                <p:cTn id="9" presetID="1" presetClass="entr" presetSubtype="0" fill="hold" nodeType="clickEffect">
-                                  <p:stCondLst>
-                                    <p:cond delay="0"/>
-                                  </p:stCondLst>
-                                  <p:childTnLst>
-                                    <p:set>
-                                      <p:cBhvr>
-                                        <p:cTn id="10" dur="1" fill="hold">
-                                          <p:stCondLst>
-                                            <p:cond delay="0"/>
-                                          </p:stCondLst>
-                                        </p:cTn>
-                                        <p:tgtEl>
-                                          <p:spTgt spid="3">
-                                            <p:txEl>
-                                              <p:pRg st="1" end="1"/>
-                                            </p:txEl>
-                                          </p:spTgt>
-                                        </p:tgtEl>
-                                        <p:attrNameLst>
-                                          <p:attrName>style.visibility</p:attrName>
-                                        </p:attrNameLst>
-                                      </p:cBhvr>
-                                      <p:to>
-                                        <p:strVal val="visible"/>
-                                      </p:to>
-                                    </p:set>
-                                  </p:childTnLst>
-                                </p:cTn>
-                              </p:par>
-                            </p:childTnLst>
-                          </p:cTn>
-                        </p:par>
-                      </p:childTnLst>
-                    </p:cTn>
-                  </p:par>
-                  <p:par>
-                    <p:cTn id="11" fill="hold">
-                      <p:stCondLst>
-                        <p:cond delay="indefinite"/>
-                      </p:stCondLst>
-                      <p:childTnLst>
-                        <p:par>
-                          <p:cTn id="12" fill="hold">
-                            <p:stCondLst>
-                              <p:cond delay="0"/>
-                            </p:stCondLst>
-                            <p:childTnLst>
-                              <p:par>
-                                <p:cTn id="13" presetID="1" presetClass="entr" presetSubtype="0" fill="hold" nodeType="clickEffect">
-                                  <p:stCondLst>
-                                    <p:cond delay="0"/>
-                                  </p:stCondLst>
-                                  <p:childTnLst>
-                                    <p:set>
-                                      <p:cBhvr>
-                                        <p:cTn id="14" dur="1" fill="hold">
-                                          <p:stCondLst>
-                                            <p:cond delay="0"/>
-                                          </p:stCondLst>
-                                        </p:cTn>
-                                        <p:tgtEl>
-                                          <p:spTgt spid="3">
-                                            <p:txEl>
-                                              <p:pRg st="2" end="2"/>
-                                            </p:txEl>
-                                          </p:spTgt>
-                                        </p:tgtEl>
-                                        <p:attrNameLst>
-                                          <p:attrName>style.visibility</p:attrName>
-                                        </p:attrNameLst>
-                                      </p:cBhvr>
-                                      <p:to>
-                                        <p:strVal val="visible"/>
-                                      </p:to>
-                                    </p:set>
-                                  </p:childTnLst>
-                                </p:cTn>
-                              </p:par>
-                            </p:childTnLst>
-                          </p:cTn>
-                        </p:par>
-                      </p:childTnLst>
-                    </p:cTn>
-                  </p:par>
-                  <p:par>
-                    <p:cTn id="15" fill="hold">
-                      <p:stCondLst>
-                        <p:cond delay="indefinite"/>
-                      </p:stCondLst>
-                      <p:childTnLst>
-                        <p:par>
-                          <p:cTn id="16" fill="hold">
-                            <p:stCondLst>
-                              <p:cond delay="0"/>
-                            </p:stCondLst>
-                            <p:childTnLst>
-                              <p:par>
-                                <p:cTn id="17" presetID="1" presetClass="entr" presetSubtype="0" fill="hold" nodeType="clickEffect">
-                                  <p:stCondLst>
-                                    <p:cond delay="0"/>
-                                  </p:stCondLst>
-                                  <p:childTnLst>
-                                    <p:set>
-                                      <p:cBhvr>
-                                        <p:cTn id="18" dur="1" fill="hold">
-                                          <p:stCondLst>
-                                            <p:cond delay="0"/>
-                                          </p:stCondLst>
-                                        </p:cTn>
-                                        <p:tgtEl>
-                                          <p:spTgt spid="3">
-                                            <p:txEl>
-                                              <p:pRg st="3" end="3"/>
-                                            </p:txEl>
-                                          </p:spTgt>
-                                        </p:tgtEl>
-                                        <p:attrNameLst>
-                                          <p:attrName>style.visibility</p:attrName>
-                                        </p:attrNameLst>
-                                      </p:cBhvr>
-                                      <p:to>
-                                        <p:strVal val="visible"/>
-                                      </p:to>
-                                    </p:set>
-                                  </p:childTnLst>
-                                </p:cTn>
-                              </p:par>
-                            </p:childTnLst>
-                          </p:cTn>
-                        </p:par>
-                      </p:childTnLst>
-                    </p:cTn>
-                  </p:par>
-                  <p:par>
-                    <p:cTn id="19" fill="hold">
-                      <p:stCondLst>
-                        <p:cond delay="indefinite"/>
-                      </p:stCondLst>
-                      <p:childTnLst>
-                        <p:par>
-                          <p:cTn id="20" fill="hold">
-                            <p:stCondLst>
-                              <p:cond delay="0"/>
-                            </p:stCondLst>
-                            <p:childTnLst>
-                              <p:par>
-                                <p:cTn id="21" presetID="1" presetClass="entr" presetSubtype="0" fill="hold" nodeType="clickEffect">
-                                  <p:stCondLst>
-                                    <p:cond delay="0"/>
-                                  </p:stCondLst>
-                                  <p:childTnLst>
-                                    <p:set>
-                                      <p:cBhvr>
-                                        <p:cTn id="22" dur="1" fill="hold">
-                                          <p:stCondLst>
-                                            <p:cond delay="0"/>
-                                          </p:stCondLst>
-                                        </p:cTn>
-                                        <p:tgtEl>
-                                          <p:spTgt spid="3">
-                                            <p:txEl>
-                                              <p:pRg st="4" end="4"/>
-                                            </p:txEl>
-                                          </p:spTgt>
-                                        </p:tgtEl>
-                                        <p:attrNameLst>
-                                          <p:attrName>style.visibility</p:attrName>
-                                        </p:attrNameLst>
-                                      </p:cBhvr>
-                                      <p:to>
-                                        <p:strVal val="visible"/>
-                                      </p:to>
-                                    </p:set>
-                                  </p:childTnLst>
-                                </p:cTn>
-                              </p:par>
-                            </p:childTnLst>
-                          </p:cTn>
-                        </p:par>
-                      </p:childTnLst>
-                    </p:cTn>
-                  </p:par>
-                  <p:par>
-                    <p:cTn id="23" fill="hold">
-                      <p:stCondLst>
-                        <p:cond delay="indefinite"/>
-                      </p:stCondLst>
-                      <p:childTnLst>
-                        <p:par>
-                          <p:cTn id="24" fill="hold">
-                            <p:stCondLst>
-                              <p:cond delay="0"/>
-                            </p:stCondLst>
-                            <p:childTnLst>
-                              <p:par>
-                                <p:cTn id="25" presetID="1" presetClass="entr" presetSubtype="0" fill="hold" nodeType="clickEffect">
-                                  <p:stCondLst>
-                                    <p:cond delay="0"/>
-                                  </p:stCondLst>
-                                  <p:childTnLst>
-                                    <p:set>
-                                      <p:cBhvr>
-                                        <p:cTn id="26" dur="1" fill="hold">
-                                          <p:stCondLst>
-                                            <p:cond delay="0"/>
-                                          </p:stCondLst>
-                                        </p:cTn>
-                                        <p:tgtEl>
-                                          <p:spTgt spid="3">
-                                            <p:txEl>
-                                              <p:pRg st="5" end="5"/>
-                                            </p:txEl>
-                                          </p:spTgt>
-                                        </p:tgtEl>
-                                        <p:attrNameLst>
-                                          <p:attrName>style.visibility</p:attrName>
-                                        </p:attrNameLst>
-                                      </p:cBhvr>
-                                      <p:to>
-                                        <p:strVal val="visible"/>
-                                      </p:to>
-                                    </p:set>
-                                  </p:childTnLst>
-                                </p:cTn>
-                              </p:par>
-                            </p:childTnLst>
-                          </p:cTn>
-                        </p:par>
-                      </p:childTnLst>
-                    </p:cTn>
-                  </p:par>
-                  <p:par>
-                    <p:cTn id="27" fill="hold">
-                      <p:stCondLst>
-                        <p:cond delay="indefinite"/>
-                      </p:stCondLst>
-                      <p:childTnLst>
-                        <p:par>
-                          <p:cTn id="28" fill="hold">
-                            <p:stCondLst>
-                              <p:cond delay="0"/>
-                            </p:stCondLst>
-                            <p:childTnLst>
-                              <p:par>
-                                <p:cTn id="29" presetID="1" presetClass="entr" presetSubtype="0" fill="hold" nodeType="clickEffect">
-                                  <p:stCondLst>
-                                    <p:cond delay="0"/>
-                                  </p:stCondLst>
-                                  <p:childTnLst>
-                                    <p:set>
-                                      <p:cBhvr>
-                                        <p:cTn id="30" dur="1" fill="hold">
-                                          <p:stCondLst>
-                                            <p:cond delay="0"/>
-                                          </p:stCondLst>
-                                        </p:cTn>
-                                        <p:tgtEl>
-                                          <p:spTgt spid="3">
-                                            <p:txEl>
-                                              <p:pRg st="7" end="7"/>
-                                            </p:txEl>
-                                          </p:spTgt>
-                                        </p:tgtEl>
-                                        <p:attrNameLst>
-                                          <p:attrName>style.visibility</p:attrName>
-                                        </p:attrNameLst>
-                                      </p:cBhvr>
-                                      <p:to>
-                                        <p:strVal val="visible"/>
-                                      </p:to>
-                                    </p:set>
-                                  </p:childTnLst>
-                                </p:cTn>
-                              </p:par>
-                            </p:childTnLst>
-                          </p:cTn>
-                        </p:par>
-                      </p:childTnLst>
-                    </p:cTn>
-                  </p:par>
-                </p:childTnLst>
-              </p:cTn>
-              <p:prevCondLst>
-                <p:cond evt="onPrev" delay="0">
-                  <p:tgtEl>
-                    <p:sldTgt/>
-                  </p:tgtEl>
-                </p:cond>
-              </p:prevCondLst>
-              <p:nextCondLst>
-                <p:cond evt="onNext" delay="0">
-                  <p:tgtEl>
-                    <p:sldTgt/>
-                  </p:tgtEl>
-                </p:cond>
-              </p:nextCondLst>
-            </p:seq>
-          </p:childTnLst>
-        </p:cTn>
+        <p:cTn id="1" dur="indefinite" restart="never" nodeType="tmRoot"/>
       </p:par>
     </p:tnLst>
   </p:timing>
@@ -9541,6 +9167,20 @@
             <a:r>
               <a:rPr lang="en-US" dirty="0" smtClean="0"/>
               <a:t>: </a:t>
+            </a:r>
+            <a:r>
+              <a:rPr lang="en-US" dirty="0" smtClean="0"/>
+              <a:t>“lecture.pptx” </a:t>
+            </a:r>
+            <a:r>
+              <a:rPr lang="en-US" dirty="0" smtClean="0">
+                <a:sym typeface="Wingdings" panose="05000000000000000000" pitchFamily="2" charset="2"/>
+              </a:rPr>
+              <a:t></a:t>
+            </a:r>
+            <a:r>
+              <a:rPr lang="en-US" dirty="0" smtClean="0"/>
+              <a:t> </a:t>
             </a:r>
             <a:r>
               <a:rPr lang="en-US" dirty="0" err="1" smtClean="0"/>
@@ -9945,244 +9585,9 @@
   <p:timing>
     <p:tnLst>
       <p:par>
-        <p:cTn id="1" dur="indefinite" restart="never" nodeType="tmRoot">
-          <p:childTnLst>
-            <p:seq concurrent="1" nextAc="seek">
-              <p:cTn id="2" dur="indefinite" nodeType="mainSeq">
-                <p:childTnLst>
-                  <p:par>
-                    <p:cTn id="3" fill="hold">
-                      <p:stCondLst>
-                        <p:cond delay="indefinite"/>
-                      </p:stCondLst>
-                      <p:childTnLst>
-                        <p:par>
-                          <p:cTn id="4" fill="hold">
-                            <p:stCondLst>
-                              <p:cond delay="0"/>
-                            </p:stCondLst>
-                            <p:childTnLst>
-                              <p:par>
-                                <p:cTn id="5" presetID="1" presetClass="entr" presetSubtype="0" fill="hold" grpId="0" nodeType="clickEffect">
-                                  <p:stCondLst>
-                                    <p:cond delay="0"/>
-                                  </p:stCondLst>
-                                  <p:childTnLst>
-                                    <p:set>
-                                      <p:cBhvr>
-                                        <p:cTn id="6" dur="1" fill="hold">
-                                          <p:stCondLst>
-                                            <p:cond delay="0"/>
-                                          </p:stCondLst>
-                                        </p:cTn>
-                                        <p:tgtEl>
-                                          <p:spTgt spid="3">
-                                            <p:txEl>
-                                              <p:pRg st="0" end="0"/>
-                                            </p:txEl>
-                                          </p:spTgt>
-                                        </p:tgtEl>
-                                        <p:attrNameLst>
-                                          <p:attrName>style.visibility</p:attrName>
-                                        </p:attrNameLst>
-                                      </p:cBhvr>
-                                      <p:to>
-                                        <p:strVal val="visible"/>
-                                      </p:to>
-                                    </p:set>
-                                  </p:childTnLst>
-                                </p:cTn>
-                              </p:par>
-                              <p:par>
-                                <p:cTn id="7" presetID="1" presetClass="entr" presetSubtype="0" fill="hold" grpId="0" nodeType="withEffect">
-                                  <p:stCondLst>
-                                    <p:cond delay="0"/>
-                                  </p:stCondLst>
-                                  <p:childTnLst>
-                                    <p:set>
-                                      <p:cBhvr>
-                                        <p:cTn id="8" dur="1" fill="hold">
-                                          <p:stCondLst>
-                                            <p:cond delay="0"/>
-                                          </p:stCondLst>
-                                        </p:cTn>
-                                        <p:tgtEl>
-                                          <p:spTgt spid="3">
-                                            <p:txEl>
-                                              <p:pRg st="1" end="1"/>
-                                            </p:txEl>
-                                          </p:spTgt>
-                                        </p:tgtEl>
-                                        <p:attrNameLst>
-                                          <p:attrName>style.visibility</p:attrName>
-                                        </p:attrNameLst>
-                                      </p:cBhvr>
-                                      <p:to>
-                                        <p:strVal val="visible"/>
-                                      </p:to>
-                                    </p:set>
-                                  </p:childTnLst>
-                                </p:cTn>
-                              </p:par>
-                              <p:par>
-                                <p:cTn id="9" presetID="1" presetClass="entr" presetSubtype="0" fill="hold" grpId="0" nodeType="withEffect">
-                                  <p:stCondLst>
-                                    <p:cond delay="0"/>
-                                  </p:stCondLst>
-                                  <p:childTnLst>
-                                    <p:set>
-                                      <p:cBhvr>
-                                        <p:cTn id="10" dur="1" fill="hold">
-                                          <p:stCondLst>
-                                            <p:cond delay="0"/>
-                                          </p:stCondLst>
-                                        </p:cTn>
-                                        <p:tgtEl>
-                                          <p:spTgt spid="3">
-                                            <p:txEl>
-                                              <p:pRg st="2" end="2"/>
-                                            </p:txEl>
-                                          </p:spTgt>
-                                        </p:tgtEl>
-                                        <p:attrNameLst>
-                                          <p:attrName>style.visibility</p:attrName>
-                                        </p:attrNameLst>
-                                      </p:cBhvr>
-                                      <p:to>
-                                        <p:strVal val="visible"/>
-                                      </p:to>
-                                    </p:set>
-                                  </p:childTnLst>
-                                </p:cTn>
-                              </p:par>
-                            </p:childTnLst>
-                          </p:cTn>
-                        </p:par>
-                      </p:childTnLst>
-                    </p:cTn>
-                  </p:par>
-                  <p:par>
-                    <p:cTn id="11" fill="hold">
-                      <p:stCondLst>
-                        <p:cond delay="indefinite"/>
-                      </p:stCondLst>
-                      <p:childTnLst>
-                        <p:par>
-                          <p:cTn id="12" fill="hold">
-                            <p:stCondLst>
-                              <p:cond delay="0"/>
-                            </p:stCondLst>
-                            <p:childTnLst>
-                              <p:par>
-                                <p:cTn id="13" presetID="1" presetClass="entr" presetSubtype="0" fill="hold" grpId="0" nodeType="clickEffect">
-                                  <p:stCondLst>
-                                    <p:cond delay="0"/>
-                                  </p:stCondLst>
-                                  <p:childTnLst>
-                                    <p:set>
-                                      <p:cBhvr>
-                                        <p:cTn id="14" dur="1" fill="hold">
-                                          <p:stCondLst>
-                                            <p:cond delay="0"/>
-                                          </p:stCondLst>
-                                        </p:cTn>
-                                        <p:tgtEl>
-                                          <p:spTgt spid="3">
-                                            <p:txEl>
-                                              <p:pRg st="3" end="3"/>
-                                            </p:txEl>
-                                          </p:spTgt>
-                                        </p:tgtEl>
-                                        <p:attrNameLst>
-                                          <p:attrName>style.visibility</p:attrName>
-                                        </p:attrNameLst>
-                                      </p:cBhvr>
-                                      <p:to>
-                                        <p:strVal val="visible"/>
-                                      </p:to>
-                                    </p:set>
-                                  </p:childTnLst>
-                                </p:cTn>
-                              </p:par>
-                            </p:childTnLst>
-                          </p:cTn>
-                        </p:par>
-                      </p:childTnLst>
-                    </p:cTn>
-                  </p:par>
-                  <p:par>
-                    <p:cTn id="15" fill="hold">
-                      <p:stCondLst>
-                        <p:cond delay="indefinite"/>
-                      </p:stCondLst>
-                      <p:childTnLst>
-                        <p:par>
-                          <p:cTn id="16" fill="hold">
-                            <p:stCondLst>
-                              <p:cond delay="0"/>
-                            </p:stCondLst>
-                            <p:childTnLst>
-                              <p:par>
-                                <p:cTn id="17" presetID="1" presetClass="entr" presetSubtype="0" fill="hold" grpId="0" nodeType="clickEffect">
-                                  <p:stCondLst>
-                                    <p:cond delay="0"/>
-                                  </p:stCondLst>
-                                  <p:childTnLst>
-                                    <p:set>
-                                      <p:cBhvr>
-                                        <p:cTn id="18" dur="1" fill="hold">
-                                          <p:stCondLst>
-                                            <p:cond delay="0"/>
-                                          </p:stCondLst>
-                                        </p:cTn>
-                                        <p:tgtEl>
-                                          <p:spTgt spid="3">
-                                            <p:txEl>
-                                              <p:pRg st="9" end="9"/>
-                                            </p:txEl>
-                                          </p:spTgt>
-                                        </p:tgtEl>
-                                        <p:attrNameLst>
-                                          <p:attrName>style.visibility</p:attrName>
-                                        </p:attrNameLst>
-                                      </p:cBhvr>
-                                      <p:to>
-                                        <p:strVal val="visible"/>
-                                      </p:to>
-                                    </p:set>
-                                  </p:childTnLst>
-                                </p:cTn>
-                              </p:par>
-                            </p:childTnLst>
-                          </p:cTn>
-                        </p:par>
-                      </p:childTnLst>
-                    </p:cTn>
-                  </p:par>
-                </p:childTnLst>
-              </p:cTn>
-              <p:prevCondLst>
-                <p:cond evt="onPrev" delay="0">
-                  <p:tgtEl>
-                    <p:sldTgt/>
-                  </p:tgtEl>
-                </p:cond>
-              </p:prevCondLst>
-              <p:nextCondLst>
-                <p:cond evt="onNext" delay="0">
-                  <p:tgtEl>
-                    <p:sldTgt/>
-                  </p:tgtEl>
-                </p:cond>
-              </p:nextCondLst>
-            </p:seq>
-          </p:childTnLst>
-        </p:cTn>
+        <p:cTn id="1" dur="indefinite" restart="never" nodeType="tmRoot"/>
       </p:par>
     </p:tnLst>
-    <p:bldLst>
-      <p:bldP spid="3" grpId="0" build="p"/>
-    </p:bldLst>
   </p:timing>
 </p:sld>
 </file>

</xml_diff>